<commit_message>
iets met Mentimeter toegevoegd
</commit_message>
<xml_diff>
--- a/Presentatie/Docker-based microservices.pptx
+++ b/Presentatie/Docker-based microservices.pptx
@@ -5,10 +5,10 @@
     <p:sldMasterId id="2147483648" r:id="rId4"/>
   </p:sldMasterIdLst>
   <p:notesMasterIdLst>
-    <p:notesMasterId r:id="rId20"/>
+    <p:notesMasterId r:id="rId21"/>
   </p:notesMasterIdLst>
   <p:handoutMasterIdLst>
-    <p:handoutMasterId r:id="rId21"/>
+    <p:handoutMasterId r:id="rId22"/>
   </p:handoutMasterIdLst>
   <p:sldIdLst>
     <p:sldId id="257" r:id="rId5"/>
@@ -25,7 +25,8 @@
     <p:sldId id="271" r:id="rId16"/>
     <p:sldId id="263" r:id="rId17"/>
     <p:sldId id="277" r:id="rId18"/>
-    <p:sldId id="264" r:id="rId19"/>
+    <p:sldId id="278" r:id="rId19"/>
+    <p:sldId id="264" r:id="rId20"/>
   </p:sldIdLst>
   <p:sldSz cx="9144000" cy="6858000" type="screen4x3"/>
   <p:notesSz cx="6858000" cy="9144000"/>
@@ -1402,6 +1403,1781 @@
       <dsp:cNvGrpSpPr/>
     </dsp:nvGrpSpPr>
     <dsp:grpSpPr/>
+    <dsp:sp modelId="{96D99B90-21EE-4E24-8C68-E8F3C02FA384}">
+      <dsp:nvSpPr>
+        <dsp:cNvPr id="0" name=""/>
+        <dsp:cNvSpPr/>
+      </dsp:nvSpPr>
+      <dsp:spPr>
+        <a:xfrm>
+          <a:off x="5921044" y="2179040"/>
+          <a:ext cx="174955" cy="174952"/>
+        </a:xfrm>
+        <a:prstGeom prst="ellipse">
+          <a:avLst/>
+        </a:prstGeom>
+        <a:solidFill>
+          <a:schemeClr val="accent1">
+            <a:hueOff val="0"/>
+            <a:satOff val="0"/>
+            <a:lumOff val="0"/>
+            <a:alphaOff val="0"/>
+          </a:schemeClr>
+        </a:solidFill>
+        <a:ln w="25400" cap="flat" cmpd="sng" algn="ctr">
+          <a:solidFill>
+            <a:schemeClr val="accent1">
+              <a:hueOff val="0"/>
+              <a:satOff val="0"/>
+              <a:lumOff val="0"/>
+              <a:alphaOff val="0"/>
+            </a:schemeClr>
+          </a:solidFill>
+          <a:prstDash val="solid"/>
+        </a:ln>
+        <a:effectLst/>
+      </dsp:spPr>
+      <dsp:style>
+        <a:lnRef idx="2">
+          <a:scrgbClr r="0" g="0" b="0"/>
+        </a:lnRef>
+        <a:fillRef idx="1">
+          <a:scrgbClr r="0" g="0" b="0"/>
+        </a:fillRef>
+        <a:effectRef idx="0">
+          <a:scrgbClr r="0" g="0" b="0"/>
+        </a:effectRef>
+        <a:fontRef idx="minor">
+          <a:schemeClr val="lt1"/>
+        </a:fontRef>
+      </dsp:style>
+    </dsp:sp>
+    <dsp:sp modelId="{24B979A6-B208-475D-B160-2781C8806C1A}">
+      <dsp:nvSpPr>
+        <dsp:cNvPr id="0" name=""/>
+        <dsp:cNvSpPr/>
+      </dsp:nvSpPr>
+      <dsp:spPr>
+        <a:xfrm>
+          <a:off x="5600395" y="2179040"/>
+          <a:ext cx="174955" cy="174952"/>
+        </a:xfrm>
+        <a:prstGeom prst="ellipse">
+          <a:avLst/>
+        </a:prstGeom>
+        <a:solidFill>
+          <a:schemeClr val="accent1">
+            <a:hueOff val="0"/>
+            <a:satOff val="0"/>
+            <a:lumOff val="0"/>
+            <a:alphaOff val="0"/>
+          </a:schemeClr>
+        </a:solidFill>
+        <a:ln w="25400" cap="flat" cmpd="sng" algn="ctr">
+          <a:solidFill>
+            <a:schemeClr val="accent1">
+              <a:hueOff val="0"/>
+              <a:satOff val="0"/>
+              <a:lumOff val="0"/>
+              <a:alphaOff val="0"/>
+            </a:schemeClr>
+          </a:solidFill>
+          <a:prstDash val="solid"/>
+        </a:ln>
+        <a:effectLst/>
+      </dsp:spPr>
+      <dsp:style>
+        <a:lnRef idx="2">
+          <a:scrgbClr r="0" g="0" b="0"/>
+        </a:lnRef>
+        <a:fillRef idx="1">
+          <a:scrgbClr r="0" g="0" b="0"/>
+        </a:fillRef>
+        <a:effectRef idx="0">
+          <a:scrgbClr r="0" g="0" b="0"/>
+        </a:effectRef>
+        <a:fontRef idx="minor">
+          <a:schemeClr val="lt1"/>
+        </a:fontRef>
+      </dsp:style>
+    </dsp:sp>
+    <dsp:sp modelId="{924296ED-8C75-48CB-9626-593904B92C58}">
+      <dsp:nvSpPr>
+        <dsp:cNvPr id="0" name=""/>
+        <dsp:cNvSpPr/>
+      </dsp:nvSpPr>
+      <dsp:spPr>
+        <a:xfrm>
+          <a:off x="5279745" y="2179040"/>
+          <a:ext cx="174955" cy="174952"/>
+        </a:xfrm>
+        <a:prstGeom prst="ellipse">
+          <a:avLst/>
+        </a:prstGeom>
+        <a:solidFill>
+          <a:schemeClr val="accent1">
+            <a:hueOff val="0"/>
+            <a:satOff val="0"/>
+            <a:lumOff val="0"/>
+            <a:alphaOff val="0"/>
+          </a:schemeClr>
+        </a:solidFill>
+        <a:ln w="25400" cap="flat" cmpd="sng" algn="ctr">
+          <a:solidFill>
+            <a:schemeClr val="accent1">
+              <a:hueOff val="0"/>
+              <a:satOff val="0"/>
+              <a:lumOff val="0"/>
+              <a:alphaOff val="0"/>
+            </a:schemeClr>
+          </a:solidFill>
+          <a:prstDash val="solid"/>
+        </a:ln>
+        <a:effectLst/>
+      </dsp:spPr>
+      <dsp:style>
+        <a:lnRef idx="2">
+          <a:scrgbClr r="0" g="0" b="0"/>
+        </a:lnRef>
+        <a:fillRef idx="1">
+          <a:scrgbClr r="0" g="0" b="0"/>
+        </a:fillRef>
+        <a:effectRef idx="0">
+          <a:scrgbClr r="0" g="0" b="0"/>
+        </a:effectRef>
+        <a:fontRef idx="minor">
+          <a:schemeClr val="lt1"/>
+        </a:fontRef>
+      </dsp:style>
+    </dsp:sp>
+    <dsp:sp modelId="{F6C4B849-D477-4825-A5C9-458488C8189D}">
+      <dsp:nvSpPr>
+        <dsp:cNvPr id="0" name=""/>
+        <dsp:cNvSpPr/>
+      </dsp:nvSpPr>
+      <dsp:spPr>
+        <a:xfrm>
+          <a:off x="4959705" y="2179040"/>
+          <a:ext cx="174955" cy="174952"/>
+        </a:xfrm>
+        <a:prstGeom prst="ellipse">
+          <a:avLst/>
+        </a:prstGeom>
+        <a:solidFill>
+          <a:schemeClr val="accent1">
+            <a:hueOff val="0"/>
+            <a:satOff val="0"/>
+            <a:lumOff val="0"/>
+            <a:alphaOff val="0"/>
+          </a:schemeClr>
+        </a:solidFill>
+        <a:ln w="25400" cap="flat" cmpd="sng" algn="ctr">
+          <a:solidFill>
+            <a:schemeClr val="accent1">
+              <a:hueOff val="0"/>
+              <a:satOff val="0"/>
+              <a:lumOff val="0"/>
+              <a:alphaOff val="0"/>
+            </a:schemeClr>
+          </a:solidFill>
+          <a:prstDash val="solid"/>
+        </a:ln>
+        <a:effectLst/>
+      </dsp:spPr>
+      <dsp:style>
+        <a:lnRef idx="2">
+          <a:scrgbClr r="0" g="0" b="0"/>
+        </a:lnRef>
+        <a:fillRef idx="1">
+          <a:scrgbClr r="0" g="0" b="0"/>
+        </a:fillRef>
+        <a:effectRef idx="0">
+          <a:scrgbClr r="0" g="0" b="0"/>
+        </a:effectRef>
+        <a:fontRef idx="minor">
+          <a:schemeClr val="lt1"/>
+        </a:fontRef>
+      </dsp:style>
+    </dsp:sp>
+    <dsp:sp modelId="{EFB3D377-7B34-4DF0-9D5E-FE52B7446D4E}">
+      <dsp:nvSpPr>
+        <dsp:cNvPr id="0" name=""/>
+        <dsp:cNvSpPr/>
+      </dsp:nvSpPr>
+      <dsp:spPr>
+        <a:xfrm>
+          <a:off x="4639056" y="2179040"/>
+          <a:ext cx="174955" cy="174952"/>
+        </a:xfrm>
+        <a:prstGeom prst="ellipse">
+          <a:avLst/>
+        </a:prstGeom>
+        <a:solidFill>
+          <a:schemeClr val="accent1">
+            <a:hueOff val="0"/>
+            <a:satOff val="0"/>
+            <a:lumOff val="0"/>
+            <a:alphaOff val="0"/>
+          </a:schemeClr>
+        </a:solidFill>
+        <a:ln w="25400" cap="flat" cmpd="sng" algn="ctr">
+          <a:solidFill>
+            <a:schemeClr val="accent1">
+              <a:hueOff val="0"/>
+              <a:satOff val="0"/>
+              <a:lumOff val="0"/>
+              <a:alphaOff val="0"/>
+            </a:schemeClr>
+          </a:solidFill>
+          <a:prstDash val="solid"/>
+        </a:ln>
+        <a:effectLst/>
+      </dsp:spPr>
+      <dsp:style>
+        <a:lnRef idx="2">
+          <a:scrgbClr r="0" g="0" b="0"/>
+        </a:lnRef>
+        <a:fillRef idx="1">
+          <a:scrgbClr r="0" g="0" b="0"/>
+        </a:fillRef>
+        <a:effectRef idx="0">
+          <a:scrgbClr r="0" g="0" b="0"/>
+        </a:effectRef>
+        <a:fontRef idx="minor">
+          <a:schemeClr val="lt1"/>
+        </a:fontRef>
+      </dsp:style>
+    </dsp:sp>
+    <dsp:sp modelId="{9663AE31-D203-463D-B0E8-0ADB3E3EED3A}">
+      <dsp:nvSpPr>
+        <dsp:cNvPr id="0" name=""/>
+        <dsp:cNvSpPr/>
+      </dsp:nvSpPr>
+      <dsp:spPr>
+        <a:xfrm>
+          <a:off x="4143451" y="2091564"/>
+          <a:ext cx="349910" cy="350192"/>
+        </a:xfrm>
+        <a:prstGeom prst="ellipse">
+          <a:avLst/>
+        </a:prstGeom>
+        <a:solidFill>
+          <a:schemeClr val="accent1">
+            <a:hueOff val="0"/>
+            <a:satOff val="0"/>
+            <a:lumOff val="0"/>
+            <a:alphaOff val="0"/>
+          </a:schemeClr>
+        </a:solidFill>
+        <a:ln w="25400" cap="flat" cmpd="sng" algn="ctr">
+          <a:solidFill>
+            <a:schemeClr val="accent1">
+              <a:hueOff val="0"/>
+              <a:satOff val="0"/>
+              <a:lumOff val="0"/>
+              <a:alphaOff val="0"/>
+            </a:schemeClr>
+          </a:solidFill>
+          <a:prstDash val="solid"/>
+        </a:ln>
+        <a:effectLst/>
+      </dsp:spPr>
+      <dsp:style>
+        <a:lnRef idx="2">
+          <a:scrgbClr r="0" g="0" b="0"/>
+        </a:lnRef>
+        <a:fillRef idx="1">
+          <a:scrgbClr r="0" g="0" b="0"/>
+        </a:fillRef>
+        <a:effectRef idx="0">
+          <a:scrgbClr r="0" g="0" b="0"/>
+        </a:effectRef>
+        <a:fontRef idx="minor">
+          <a:schemeClr val="lt1"/>
+        </a:fontRef>
+      </dsp:style>
+    </dsp:sp>
+    <dsp:sp modelId="{D796DF2B-46CF-47E1-A697-73B8BB91A50E}">
+      <dsp:nvSpPr>
+        <dsp:cNvPr id="0" name=""/>
+        <dsp:cNvSpPr/>
+      </dsp:nvSpPr>
+      <dsp:spPr>
+        <a:xfrm>
+          <a:off x="5635752" y="1817625"/>
+          <a:ext cx="174955" cy="174952"/>
+        </a:xfrm>
+        <a:prstGeom prst="ellipse">
+          <a:avLst/>
+        </a:prstGeom>
+        <a:solidFill>
+          <a:schemeClr val="accent1">
+            <a:hueOff val="0"/>
+            <a:satOff val="0"/>
+            <a:lumOff val="0"/>
+            <a:alphaOff val="0"/>
+          </a:schemeClr>
+        </a:solidFill>
+        <a:ln w="25400" cap="flat" cmpd="sng" algn="ctr">
+          <a:solidFill>
+            <a:schemeClr val="accent1">
+              <a:hueOff val="0"/>
+              <a:satOff val="0"/>
+              <a:lumOff val="0"/>
+              <a:alphaOff val="0"/>
+            </a:schemeClr>
+          </a:solidFill>
+          <a:prstDash val="solid"/>
+        </a:ln>
+        <a:effectLst/>
+      </dsp:spPr>
+      <dsp:style>
+        <a:lnRef idx="2">
+          <a:scrgbClr r="0" g="0" b="0"/>
+        </a:lnRef>
+        <a:fillRef idx="1">
+          <a:scrgbClr r="0" g="0" b="0"/>
+        </a:fillRef>
+        <a:effectRef idx="0">
+          <a:scrgbClr r="0" g="0" b="0"/>
+        </a:effectRef>
+        <a:fontRef idx="minor">
+          <a:schemeClr val="lt1"/>
+        </a:fontRef>
+      </dsp:style>
+    </dsp:sp>
+    <dsp:sp modelId="{D98CC950-624E-407F-949E-58C3FABF5F61}">
+      <dsp:nvSpPr>
+        <dsp:cNvPr id="0" name=""/>
+        <dsp:cNvSpPr/>
+      </dsp:nvSpPr>
+      <dsp:spPr>
+        <a:xfrm>
+          <a:off x="5635752" y="2543045"/>
+          <a:ext cx="174955" cy="174952"/>
+        </a:xfrm>
+        <a:prstGeom prst="ellipse">
+          <a:avLst/>
+        </a:prstGeom>
+        <a:solidFill>
+          <a:schemeClr val="accent1">
+            <a:hueOff val="0"/>
+            <a:satOff val="0"/>
+            <a:lumOff val="0"/>
+            <a:alphaOff val="0"/>
+          </a:schemeClr>
+        </a:solidFill>
+        <a:ln w="25400" cap="flat" cmpd="sng" algn="ctr">
+          <a:solidFill>
+            <a:schemeClr val="accent1">
+              <a:hueOff val="0"/>
+              <a:satOff val="0"/>
+              <a:lumOff val="0"/>
+              <a:alphaOff val="0"/>
+            </a:schemeClr>
+          </a:solidFill>
+          <a:prstDash val="solid"/>
+        </a:ln>
+        <a:effectLst/>
+      </dsp:spPr>
+      <dsp:style>
+        <a:lnRef idx="2">
+          <a:scrgbClr r="0" g="0" b="0"/>
+        </a:lnRef>
+        <a:fillRef idx="1">
+          <a:scrgbClr r="0" g="0" b="0"/>
+        </a:fillRef>
+        <a:effectRef idx="0">
+          <a:scrgbClr r="0" g="0" b="0"/>
+        </a:effectRef>
+        <a:fontRef idx="minor">
+          <a:schemeClr val="lt1"/>
+        </a:fontRef>
+      </dsp:style>
+    </dsp:sp>
+    <dsp:sp modelId="{3F6C78E2-8E9C-4489-9FF3-B304ABD248BA}">
+      <dsp:nvSpPr>
+        <dsp:cNvPr id="0" name=""/>
+        <dsp:cNvSpPr/>
+      </dsp:nvSpPr>
+      <dsp:spPr>
+        <a:xfrm>
+          <a:off x="5791809" y="1974737"/>
+          <a:ext cx="174955" cy="174952"/>
+        </a:xfrm>
+        <a:prstGeom prst="ellipse">
+          <a:avLst/>
+        </a:prstGeom>
+        <a:solidFill>
+          <a:schemeClr val="accent1">
+            <a:hueOff val="0"/>
+            <a:satOff val="0"/>
+            <a:lumOff val="0"/>
+            <a:alphaOff val="0"/>
+          </a:schemeClr>
+        </a:solidFill>
+        <a:ln w="25400" cap="flat" cmpd="sng" algn="ctr">
+          <a:solidFill>
+            <a:schemeClr val="accent1">
+              <a:hueOff val="0"/>
+              <a:satOff val="0"/>
+              <a:lumOff val="0"/>
+              <a:alphaOff val="0"/>
+            </a:schemeClr>
+          </a:solidFill>
+          <a:prstDash val="solid"/>
+        </a:ln>
+        <a:effectLst/>
+      </dsp:spPr>
+      <dsp:style>
+        <a:lnRef idx="2">
+          <a:scrgbClr r="0" g="0" b="0"/>
+        </a:lnRef>
+        <a:fillRef idx="1">
+          <a:scrgbClr r="0" g="0" b="0"/>
+        </a:fillRef>
+        <a:effectRef idx="0">
+          <a:scrgbClr r="0" g="0" b="0"/>
+        </a:effectRef>
+        <a:fontRef idx="minor">
+          <a:schemeClr val="lt1"/>
+        </a:fontRef>
+      </dsp:style>
+    </dsp:sp>
+    <dsp:sp modelId="{43443363-FF73-4056-9BE0-9C981662E2F1}">
+      <dsp:nvSpPr>
+        <dsp:cNvPr id="0" name=""/>
+        <dsp:cNvSpPr/>
+      </dsp:nvSpPr>
+      <dsp:spPr>
+        <a:xfrm>
+          <a:off x="5802172" y="2386796"/>
+          <a:ext cx="174955" cy="174952"/>
+        </a:xfrm>
+        <a:prstGeom prst="ellipse">
+          <a:avLst/>
+        </a:prstGeom>
+        <a:solidFill>
+          <a:schemeClr val="accent1">
+            <a:hueOff val="0"/>
+            <a:satOff val="0"/>
+            <a:lumOff val="0"/>
+            <a:alphaOff val="0"/>
+          </a:schemeClr>
+        </a:solidFill>
+        <a:ln w="25400" cap="flat" cmpd="sng" algn="ctr">
+          <a:solidFill>
+            <a:schemeClr val="accent1">
+              <a:hueOff val="0"/>
+              <a:satOff val="0"/>
+              <a:lumOff val="0"/>
+              <a:alphaOff val="0"/>
+            </a:schemeClr>
+          </a:solidFill>
+          <a:prstDash val="solid"/>
+        </a:ln>
+        <a:effectLst/>
+      </dsp:spPr>
+      <dsp:style>
+        <a:lnRef idx="2">
+          <a:scrgbClr r="0" g="0" b="0"/>
+        </a:lnRef>
+        <a:fillRef idx="1">
+          <a:scrgbClr r="0" g="0" b="0"/>
+        </a:fillRef>
+        <a:effectRef idx="0">
+          <a:scrgbClr r="0" g="0" b="0"/>
+        </a:effectRef>
+        <a:fontRef idx="minor">
+          <a:schemeClr val="lt1"/>
+        </a:fontRef>
+      </dsp:style>
+    </dsp:sp>
+    <dsp:sp modelId="{FE8ADDBD-AE7C-4F88-9D69-EE22066B3EB4}">
+      <dsp:nvSpPr>
+        <dsp:cNvPr id="0" name=""/>
+        <dsp:cNvSpPr/>
+      </dsp:nvSpPr>
+      <dsp:spPr>
+        <a:xfrm>
+          <a:off x="2226868" y="1380820"/>
+          <a:ext cx="1771497" cy="1771681"/>
+        </a:xfrm>
+        <a:prstGeom prst="ellipse">
+          <a:avLst/>
+        </a:prstGeom>
+        <a:solidFill>
+          <a:schemeClr val="accent1">
+            <a:hueOff val="0"/>
+            <a:satOff val="0"/>
+            <a:lumOff val="0"/>
+            <a:alphaOff val="0"/>
+          </a:schemeClr>
+        </a:solidFill>
+        <a:ln w="25400" cap="flat" cmpd="sng" algn="ctr">
+          <a:solidFill>
+            <a:schemeClr val="accent1">
+              <a:hueOff val="0"/>
+              <a:satOff val="0"/>
+              <a:lumOff val="0"/>
+              <a:alphaOff val="0"/>
+            </a:schemeClr>
+          </a:solidFill>
+          <a:prstDash val="solid"/>
+        </a:ln>
+        <a:effectLst/>
+      </dsp:spPr>
+      <dsp:style>
+        <a:lnRef idx="2">
+          <a:scrgbClr r="0" g="0" b="0"/>
+        </a:lnRef>
+        <a:fillRef idx="1">
+          <a:scrgbClr r="0" g="0" b="0"/>
+        </a:fillRef>
+        <a:effectRef idx="0">
+          <a:scrgbClr r="0" g="0" b="0"/>
+        </a:effectRef>
+        <a:fontRef idx="minor">
+          <a:schemeClr val="lt1"/>
+        </a:fontRef>
+      </dsp:style>
+      <dsp:txBody>
+        <a:bodyPr spcFirstLastPara="0" vert="horz" wrap="square" lIns="26670" tIns="26670" rIns="26670" bIns="26670" numCol="1" spcCol="1270" anchor="ctr" anchorCtr="0">
+          <a:noAutofit/>
+        </a:bodyPr>
+        <a:lstStyle/>
+        <a:p>
+          <a:pPr lvl="0" algn="ctr" defTabSz="933450">
+            <a:lnSpc>
+              <a:spcPct val="90000"/>
+            </a:lnSpc>
+            <a:spcBef>
+              <a:spcPct val="0"/>
+            </a:spcBef>
+            <a:spcAft>
+              <a:spcPct val="35000"/>
+            </a:spcAft>
+          </a:pPr>
+          <a:r>
+            <a:rPr lang="en-US" sz="2100" kern="1200" dirty="0" smtClean="0"/>
+            <a:t>Dashboard</a:t>
+          </a:r>
+          <a:endParaRPr lang="nl-NL" sz="2100" kern="1200" dirty="0"/>
+        </a:p>
+      </dsp:txBody>
+      <dsp:txXfrm>
+        <a:off x="2486298" y="1640277"/>
+        <a:ext cx="1252637" cy="1252767"/>
+      </dsp:txXfrm>
+    </dsp:sp>
+    <dsp:sp modelId="{42B92DFB-23E2-4426-A3C7-B81C964B6868}">
+      <dsp:nvSpPr>
+        <dsp:cNvPr id="0" name=""/>
+        <dsp:cNvSpPr/>
+      </dsp:nvSpPr>
+      <dsp:spPr>
+        <a:xfrm>
+          <a:off x="2094585" y="1229463"/>
+          <a:ext cx="349910" cy="350192"/>
+        </a:xfrm>
+        <a:prstGeom prst="ellipse">
+          <a:avLst/>
+        </a:prstGeom>
+        <a:solidFill>
+          <a:schemeClr val="accent1">
+            <a:hueOff val="0"/>
+            <a:satOff val="0"/>
+            <a:lumOff val="0"/>
+            <a:alphaOff val="0"/>
+          </a:schemeClr>
+        </a:solidFill>
+        <a:ln w="25400" cap="flat" cmpd="sng" algn="ctr">
+          <a:solidFill>
+            <a:schemeClr val="accent1">
+              <a:hueOff val="0"/>
+              <a:satOff val="0"/>
+              <a:lumOff val="0"/>
+              <a:alphaOff val="0"/>
+            </a:schemeClr>
+          </a:solidFill>
+          <a:prstDash val="solid"/>
+        </a:ln>
+        <a:effectLst/>
+      </dsp:spPr>
+      <dsp:style>
+        <a:lnRef idx="2">
+          <a:scrgbClr r="0" g="0" b="0"/>
+        </a:lnRef>
+        <a:fillRef idx="1">
+          <a:scrgbClr r="0" g="0" b="0"/>
+        </a:fillRef>
+        <a:effectRef idx="0">
+          <a:scrgbClr r="0" g="0" b="0"/>
+        </a:effectRef>
+        <a:fontRef idx="minor">
+          <a:schemeClr val="lt1"/>
+        </a:fontRef>
+      </dsp:style>
+    </dsp:sp>
+    <dsp:sp modelId="{AC10DCC2-C73B-41DE-A332-6D26A393474B}">
+      <dsp:nvSpPr>
+        <dsp:cNvPr id="0" name=""/>
+        <dsp:cNvSpPr/>
+      </dsp:nvSpPr>
+      <dsp:spPr>
+        <a:xfrm>
+          <a:off x="1870252" y="1044727"/>
+          <a:ext cx="174955" cy="174952"/>
+        </a:xfrm>
+        <a:prstGeom prst="ellipse">
+          <a:avLst/>
+        </a:prstGeom>
+        <a:solidFill>
+          <a:schemeClr val="accent1">
+            <a:hueOff val="0"/>
+            <a:satOff val="0"/>
+            <a:lumOff val="0"/>
+            <a:alphaOff val="0"/>
+          </a:schemeClr>
+        </a:solidFill>
+        <a:ln w="25400" cap="flat" cmpd="sng" algn="ctr">
+          <a:solidFill>
+            <a:schemeClr val="accent1">
+              <a:hueOff val="0"/>
+              <a:satOff val="0"/>
+              <a:lumOff val="0"/>
+              <a:alphaOff val="0"/>
+            </a:schemeClr>
+          </a:solidFill>
+          <a:prstDash val="solid"/>
+        </a:ln>
+        <a:effectLst/>
+      </dsp:spPr>
+      <dsp:style>
+        <a:lnRef idx="2">
+          <a:scrgbClr r="0" g="0" b="0"/>
+        </a:lnRef>
+        <a:fillRef idx="1">
+          <a:scrgbClr r="0" g="0" b="0"/>
+        </a:fillRef>
+        <a:effectRef idx="0">
+          <a:scrgbClr r="0" g="0" b="0"/>
+        </a:effectRef>
+        <a:fontRef idx="minor">
+          <a:schemeClr val="lt1"/>
+        </a:fontRef>
+      </dsp:style>
+    </dsp:sp>
+    <dsp:sp modelId="{81DB3B92-9940-4E01-832E-B4A0F9509294}">
+      <dsp:nvSpPr>
+        <dsp:cNvPr id="0" name=""/>
+        <dsp:cNvSpPr/>
+      </dsp:nvSpPr>
+      <dsp:spPr>
+        <a:xfrm>
+          <a:off x="1496568" y="1044727"/>
+          <a:ext cx="174955" cy="174952"/>
+        </a:xfrm>
+        <a:prstGeom prst="ellipse">
+          <a:avLst/>
+        </a:prstGeom>
+        <a:solidFill>
+          <a:schemeClr val="accent1">
+            <a:hueOff val="0"/>
+            <a:satOff val="0"/>
+            <a:lumOff val="0"/>
+            <a:alphaOff val="0"/>
+          </a:schemeClr>
+        </a:solidFill>
+        <a:ln w="25400" cap="flat" cmpd="sng" algn="ctr">
+          <a:solidFill>
+            <a:schemeClr val="accent1">
+              <a:hueOff val="0"/>
+              <a:satOff val="0"/>
+              <a:lumOff val="0"/>
+              <a:alphaOff val="0"/>
+            </a:schemeClr>
+          </a:solidFill>
+          <a:prstDash val="solid"/>
+        </a:ln>
+        <a:effectLst/>
+      </dsp:spPr>
+      <dsp:style>
+        <a:lnRef idx="2">
+          <a:scrgbClr r="0" g="0" b="0"/>
+        </a:lnRef>
+        <a:fillRef idx="1">
+          <a:scrgbClr r="0" g="0" b="0"/>
+        </a:fillRef>
+        <a:effectRef idx="0">
+          <a:scrgbClr r="0" g="0" b="0"/>
+        </a:effectRef>
+        <a:fontRef idx="minor">
+          <a:schemeClr val="lt1"/>
+        </a:fontRef>
+      </dsp:style>
+    </dsp:sp>
+    <dsp:sp modelId="{D24A4C1A-4DBB-42C8-BB64-FD9F5D5E7713}">
+      <dsp:nvSpPr>
+        <dsp:cNvPr id="0" name=""/>
+        <dsp:cNvSpPr/>
+      </dsp:nvSpPr>
+      <dsp:spPr>
+        <a:xfrm>
+          <a:off x="1122883" y="1044727"/>
+          <a:ext cx="174955" cy="174952"/>
+        </a:xfrm>
+        <a:prstGeom prst="ellipse">
+          <a:avLst/>
+        </a:prstGeom>
+        <a:solidFill>
+          <a:schemeClr val="accent1">
+            <a:hueOff val="0"/>
+            <a:satOff val="0"/>
+            <a:lumOff val="0"/>
+            <a:alphaOff val="0"/>
+          </a:schemeClr>
+        </a:solidFill>
+        <a:ln w="25400" cap="flat" cmpd="sng" algn="ctr">
+          <a:solidFill>
+            <a:schemeClr val="accent1">
+              <a:hueOff val="0"/>
+              <a:satOff val="0"/>
+              <a:lumOff val="0"/>
+              <a:alphaOff val="0"/>
+            </a:schemeClr>
+          </a:solidFill>
+          <a:prstDash val="solid"/>
+        </a:ln>
+        <a:effectLst/>
+      </dsp:spPr>
+      <dsp:style>
+        <a:lnRef idx="2">
+          <a:scrgbClr r="0" g="0" b="0"/>
+        </a:lnRef>
+        <a:fillRef idx="1">
+          <a:scrgbClr r="0" g="0" b="0"/>
+        </a:fillRef>
+        <a:effectRef idx="0">
+          <a:scrgbClr r="0" g="0" b="0"/>
+        </a:effectRef>
+        <a:fontRef idx="minor">
+          <a:schemeClr val="lt1"/>
+        </a:fontRef>
+      </dsp:style>
+    </dsp:sp>
+    <dsp:sp modelId="{9E373060-98F2-4DB3-B18D-A0715B652954}">
+      <dsp:nvSpPr>
+        <dsp:cNvPr id="0" name=""/>
+        <dsp:cNvSpPr/>
+      </dsp:nvSpPr>
+      <dsp:spPr>
+        <a:xfrm>
+          <a:off x="749198" y="1044727"/>
+          <a:ext cx="174955" cy="174952"/>
+        </a:xfrm>
+        <a:prstGeom prst="ellipse">
+          <a:avLst/>
+        </a:prstGeom>
+        <a:solidFill>
+          <a:schemeClr val="accent1">
+            <a:hueOff val="0"/>
+            <a:satOff val="0"/>
+            <a:lumOff val="0"/>
+            <a:alphaOff val="0"/>
+          </a:schemeClr>
+        </a:solidFill>
+        <a:ln w="25400" cap="flat" cmpd="sng" algn="ctr">
+          <a:solidFill>
+            <a:schemeClr val="accent1">
+              <a:hueOff val="0"/>
+              <a:satOff val="0"/>
+              <a:lumOff val="0"/>
+              <a:alphaOff val="0"/>
+            </a:schemeClr>
+          </a:solidFill>
+          <a:prstDash val="solid"/>
+        </a:ln>
+        <a:effectLst/>
+      </dsp:spPr>
+      <dsp:style>
+        <a:lnRef idx="2">
+          <a:scrgbClr r="0" g="0" b="0"/>
+        </a:lnRef>
+        <a:fillRef idx="1">
+          <a:scrgbClr r="0" g="0" b="0"/>
+        </a:fillRef>
+        <a:effectRef idx="0">
+          <a:scrgbClr r="0" g="0" b="0"/>
+        </a:effectRef>
+        <a:fontRef idx="minor">
+          <a:schemeClr val="lt1"/>
+        </a:fontRef>
+      </dsp:style>
+    </dsp:sp>
+    <dsp:sp modelId="{465197CF-44BD-4408-9EE4-50E3CDB85F69}">
+      <dsp:nvSpPr>
+        <dsp:cNvPr id="0" name=""/>
+        <dsp:cNvSpPr/>
+      </dsp:nvSpPr>
+      <dsp:spPr>
+        <a:xfrm>
+          <a:off x="374904" y="1044727"/>
+          <a:ext cx="174955" cy="174952"/>
+        </a:xfrm>
+        <a:prstGeom prst="ellipse">
+          <a:avLst/>
+        </a:prstGeom>
+        <a:solidFill>
+          <a:schemeClr val="accent1">
+            <a:hueOff val="0"/>
+            <a:satOff val="0"/>
+            <a:lumOff val="0"/>
+            <a:alphaOff val="0"/>
+          </a:schemeClr>
+        </a:solidFill>
+        <a:ln w="25400" cap="flat" cmpd="sng" algn="ctr">
+          <a:solidFill>
+            <a:schemeClr val="accent1">
+              <a:hueOff val="0"/>
+              <a:satOff val="0"/>
+              <a:lumOff val="0"/>
+              <a:alphaOff val="0"/>
+            </a:schemeClr>
+          </a:solidFill>
+          <a:prstDash val="solid"/>
+        </a:ln>
+        <a:effectLst/>
+      </dsp:spPr>
+      <dsp:style>
+        <a:lnRef idx="2">
+          <a:scrgbClr r="0" g="0" b="0"/>
+        </a:lnRef>
+        <a:fillRef idx="1">
+          <a:scrgbClr r="0" g="0" b="0"/>
+        </a:fillRef>
+        <a:effectRef idx="0">
+          <a:scrgbClr r="0" g="0" b="0"/>
+        </a:effectRef>
+        <a:fontRef idx="minor">
+          <a:schemeClr val="lt1"/>
+        </a:fontRef>
+      </dsp:style>
+    </dsp:sp>
+    <dsp:sp modelId="{744C965E-C9A9-4668-BA15-5F3979E52EB7}">
+      <dsp:nvSpPr>
+        <dsp:cNvPr id="0" name=""/>
+        <dsp:cNvSpPr/>
+      </dsp:nvSpPr>
+      <dsp:spPr>
+        <a:xfrm>
+          <a:off x="1219" y="1044727"/>
+          <a:ext cx="174955" cy="174952"/>
+        </a:xfrm>
+        <a:prstGeom prst="ellipse">
+          <a:avLst/>
+        </a:prstGeom>
+        <a:solidFill>
+          <a:schemeClr val="accent1">
+            <a:hueOff val="0"/>
+            <a:satOff val="0"/>
+            <a:lumOff val="0"/>
+            <a:alphaOff val="0"/>
+          </a:schemeClr>
+        </a:solidFill>
+        <a:ln w="25400" cap="flat" cmpd="sng" algn="ctr">
+          <a:solidFill>
+            <a:schemeClr val="accent1">
+              <a:hueOff val="0"/>
+              <a:satOff val="0"/>
+              <a:lumOff val="0"/>
+              <a:alphaOff val="0"/>
+            </a:schemeClr>
+          </a:solidFill>
+          <a:prstDash val="solid"/>
+        </a:ln>
+        <a:effectLst/>
+      </dsp:spPr>
+      <dsp:style>
+        <a:lnRef idx="2">
+          <a:scrgbClr r="0" g="0" b="0"/>
+        </a:lnRef>
+        <a:fillRef idx="1">
+          <a:scrgbClr r="0" g="0" b="0"/>
+        </a:fillRef>
+        <a:effectRef idx="0">
+          <a:scrgbClr r="0" g="0" b="0"/>
+        </a:effectRef>
+        <a:fontRef idx="minor">
+          <a:schemeClr val="lt1"/>
+        </a:fontRef>
+      </dsp:style>
+    </dsp:sp>
+    <dsp:sp modelId="{43DB5D80-8976-4381-91FF-CBEC941B2256}">
+      <dsp:nvSpPr>
+        <dsp:cNvPr id="0" name=""/>
+        <dsp:cNvSpPr/>
+      </dsp:nvSpPr>
+      <dsp:spPr>
+        <a:xfrm>
+          <a:off x="0" y="593246"/>
+          <a:ext cx="2050694" cy="450042"/>
+        </a:xfrm>
+        <a:prstGeom prst="rect">
+          <a:avLst/>
+        </a:prstGeom>
+        <a:noFill/>
+        <a:ln>
+          <a:noFill/>
+        </a:ln>
+        <a:effectLst/>
+      </dsp:spPr>
+      <dsp:style>
+        <a:lnRef idx="0">
+          <a:scrgbClr r="0" g="0" b="0"/>
+        </a:lnRef>
+        <a:fillRef idx="0">
+          <a:scrgbClr r="0" g="0" b="0"/>
+        </a:fillRef>
+        <a:effectRef idx="0">
+          <a:scrgbClr r="0" g="0" b="0"/>
+        </a:effectRef>
+        <a:fontRef idx="minor"/>
+      </dsp:style>
+      <dsp:txBody>
+        <a:bodyPr spcFirstLastPara="0" vert="horz" wrap="square" lIns="0" tIns="0" rIns="0" bIns="0" numCol="1" spcCol="1270" anchor="b" anchorCtr="0">
+          <a:noAutofit/>
+        </a:bodyPr>
+        <a:lstStyle/>
+        <a:p>
+          <a:pPr lvl="0" algn="l" defTabSz="933450">
+            <a:lnSpc>
+              <a:spcPct val="90000"/>
+            </a:lnSpc>
+            <a:spcBef>
+              <a:spcPct val="0"/>
+            </a:spcBef>
+            <a:spcAft>
+              <a:spcPct val="35000"/>
+            </a:spcAft>
+          </a:pPr>
+          <a:r>
+            <a:rPr lang="en-US" sz="2100" kern="1200" dirty="0" err="1" smtClean="0">
+              <a:solidFill>
+                <a:schemeClr val="bg1"/>
+              </a:solidFill>
+            </a:rPr>
+            <a:t>Groep</a:t>
+          </a:r>
+          <a:r>
+            <a:rPr lang="en-US" sz="2100" kern="1200" dirty="0" smtClean="0">
+              <a:solidFill>
+                <a:schemeClr val="bg1"/>
+              </a:solidFill>
+            </a:rPr>
+            <a:t> 1</a:t>
+          </a:r>
+          <a:endParaRPr lang="nl-NL" sz="2100" kern="1200" dirty="0">
+            <a:solidFill>
+              <a:schemeClr val="bg1"/>
+            </a:solidFill>
+          </a:endParaRPr>
+        </a:p>
+      </dsp:txBody>
+      <dsp:txXfrm>
+        <a:off x="0" y="593246"/>
+        <a:ext cx="2050694" cy="450042"/>
+      </dsp:txXfrm>
+    </dsp:sp>
+    <dsp:sp modelId="{170DFC02-5FD5-4939-932D-B31E9D41551B}">
+      <dsp:nvSpPr>
+        <dsp:cNvPr id="0" name=""/>
+        <dsp:cNvSpPr/>
+      </dsp:nvSpPr>
+      <dsp:spPr>
+        <a:xfrm>
+          <a:off x="1731264" y="2091564"/>
+          <a:ext cx="349910" cy="350192"/>
+        </a:xfrm>
+        <a:prstGeom prst="ellipse">
+          <a:avLst/>
+        </a:prstGeom>
+        <a:solidFill>
+          <a:schemeClr val="accent1">
+            <a:hueOff val="0"/>
+            <a:satOff val="0"/>
+            <a:lumOff val="0"/>
+            <a:alphaOff val="0"/>
+          </a:schemeClr>
+        </a:solidFill>
+        <a:ln w="25400" cap="flat" cmpd="sng" algn="ctr">
+          <a:solidFill>
+            <a:schemeClr val="accent1">
+              <a:hueOff val="0"/>
+              <a:satOff val="0"/>
+              <a:lumOff val="0"/>
+              <a:alphaOff val="0"/>
+            </a:schemeClr>
+          </a:solidFill>
+          <a:prstDash val="solid"/>
+        </a:ln>
+        <a:effectLst/>
+      </dsp:spPr>
+      <dsp:style>
+        <a:lnRef idx="2">
+          <a:scrgbClr r="0" g="0" b="0"/>
+        </a:lnRef>
+        <a:fillRef idx="1">
+          <a:scrgbClr r="0" g="0" b="0"/>
+        </a:fillRef>
+        <a:effectRef idx="0">
+          <a:scrgbClr r="0" g="0" b="0"/>
+        </a:effectRef>
+        <a:fontRef idx="minor">
+          <a:schemeClr val="lt1"/>
+        </a:fontRef>
+      </dsp:style>
+    </dsp:sp>
+    <dsp:sp modelId="{274877CC-D2A6-4630-A881-F16C3BA8E592}">
+      <dsp:nvSpPr>
+        <dsp:cNvPr id="0" name=""/>
+        <dsp:cNvSpPr/>
+      </dsp:nvSpPr>
+      <dsp:spPr>
+        <a:xfrm>
+          <a:off x="1385011" y="2179040"/>
+          <a:ext cx="174955" cy="174952"/>
+        </a:xfrm>
+        <a:prstGeom prst="ellipse">
+          <a:avLst/>
+        </a:prstGeom>
+        <a:solidFill>
+          <a:schemeClr val="accent1">
+            <a:hueOff val="0"/>
+            <a:satOff val="0"/>
+            <a:lumOff val="0"/>
+            <a:alphaOff val="0"/>
+          </a:schemeClr>
+        </a:solidFill>
+        <a:ln w="25400" cap="flat" cmpd="sng" algn="ctr">
+          <a:solidFill>
+            <a:schemeClr val="accent1">
+              <a:hueOff val="0"/>
+              <a:satOff val="0"/>
+              <a:lumOff val="0"/>
+              <a:alphaOff val="0"/>
+            </a:schemeClr>
+          </a:solidFill>
+          <a:prstDash val="solid"/>
+        </a:ln>
+        <a:effectLst/>
+      </dsp:spPr>
+      <dsp:style>
+        <a:lnRef idx="2">
+          <a:scrgbClr r="0" g="0" b="0"/>
+        </a:lnRef>
+        <a:fillRef idx="1">
+          <a:scrgbClr r="0" g="0" b="0"/>
+        </a:fillRef>
+        <a:effectRef idx="0">
+          <a:scrgbClr r="0" g="0" b="0"/>
+        </a:effectRef>
+        <a:fontRef idx="minor">
+          <a:schemeClr val="lt1"/>
+        </a:fontRef>
+      </dsp:style>
+    </dsp:sp>
+    <dsp:sp modelId="{5F1EB30C-D8A9-4A61-AA6D-06450E9764D9}">
+      <dsp:nvSpPr>
+        <dsp:cNvPr id="0" name=""/>
+        <dsp:cNvSpPr/>
+      </dsp:nvSpPr>
+      <dsp:spPr>
+        <a:xfrm>
+          <a:off x="1039368" y="2179040"/>
+          <a:ext cx="174955" cy="174952"/>
+        </a:xfrm>
+        <a:prstGeom prst="ellipse">
+          <a:avLst/>
+        </a:prstGeom>
+        <a:solidFill>
+          <a:schemeClr val="accent1">
+            <a:hueOff val="0"/>
+            <a:satOff val="0"/>
+            <a:lumOff val="0"/>
+            <a:alphaOff val="0"/>
+          </a:schemeClr>
+        </a:solidFill>
+        <a:ln w="25400" cap="flat" cmpd="sng" algn="ctr">
+          <a:solidFill>
+            <a:schemeClr val="accent1">
+              <a:hueOff val="0"/>
+              <a:satOff val="0"/>
+              <a:lumOff val="0"/>
+              <a:alphaOff val="0"/>
+            </a:schemeClr>
+          </a:solidFill>
+          <a:prstDash val="solid"/>
+        </a:ln>
+        <a:effectLst/>
+      </dsp:spPr>
+      <dsp:style>
+        <a:lnRef idx="2">
+          <a:scrgbClr r="0" g="0" b="0"/>
+        </a:lnRef>
+        <a:fillRef idx="1">
+          <a:scrgbClr r="0" g="0" b="0"/>
+        </a:fillRef>
+        <a:effectRef idx="0">
+          <a:scrgbClr r="0" g="0" b="0"/>
+        </a:effectRef>
+        <a:fontRef idx="minor">
+          <a:schemeClr val="lt1"/>
+        </a:fontRef>
+      </dsp:style>
+    </dsp:sp>
+    <dsp:sp modelId="{01CB21BE-9E3B-449B-9180-580F275EB109}">
+      <dsp:nvSpPr>
+        <dsp:cNvPr id="0" name=""/>
+        <dsp:cNvSpPr/>
+      </dsp:nvSpPr>
+      <dsp:spPr>
+        <a:xfrm>
+          <a:off x="693115" y="2179040"/>
+          <a:ext cx="174955" cy="174952"/>
+        </a:xfrm>
+        <a:prstGeom prst="ellipse">
+          <a:avLst/>
+        </a:prstGeom>
+        <a:solidFill>
+          <a:schemeClr val="accent1">
+            <a:hueOff val="0"/>
+            <a:satOff val="0"/>
+            <a:lumOff val="0"/>
+            <a:alphaOff val="0"/>
+          </a:schemeClr>
+        </a:solidFill>
+        <a:ln w="25400" cap="flat" cmpd="sng" algn="ctr">
+          <a:solidFill>
+            <a:schemeClr val="accent1">
+              <a:hueOff val="0"/>
+              <a:satOff val="0"/>
+              <a:lumOff val="0"/>
+              <a:alphaOff val="0"/>
+            </a:schemeClr>
+          </a:solidFill>
+          <a:prstDash val="solid"/>
+        </a:ln>
+        <a:effectLst/>
+      </dsp:spPr>
+      <dsp:style>
+        <a:lnRef idx="2">
+          <a:scrgbClr r="0" g="0" b="0"/>
+        </a:lnRef>
+        <a:fillRef idx="1">
+          <a:scrgbClr r="0" g="0" b="0"/>
+        </a:fillRef>
+        <a:effectRef idx="0">
+          <a:scrgbClr r="0" g="0" b="0"/>
+        </a:effectRef>
+        <a:fontRef idx="minor">
+          <a:schemeClr val="lt1"/>
+        </a:fontRef>
+      </dsp:style>
+    </dsp:sp>
+    <dsp:sp modelId="{FD02767C-038B-46FB-9BF4-A4F15041AA08}">
+      <dsp:nvSpPr>
+        <dsp:cNvPr id="0" name=""/>
+        <dsp:cNvSpPr/>
+      </dsp:nvSpPr>
+      <dsp:spPr>
+        <a:xfrm>
+          <a:off x="347472" y="2179040"/>
+          <a:ext cx="174955" cy="174952"/>
+        </a:xfrm>
+        <a:prstGeom prst="ellipse">
+          <a:avLst/>
+        </a:prstGeom>
+        <a:solidFill>
+          <a:schemeClr val="accent1">
+            <a:hueOff val="0"/>
+            <a:satOff val="0"/>
+            <a:lumOff val="0"/>
+            <a:alphaOff val="0"/>
+          </a:schemeClr>
+        </a:solidFill>
+        <a:ln w="25400" cap="flat" cmpd="sng" algn="ctr">
+          <a:solidFill>
+            <a:schemeClr val="accent1">
+              <a:hueOff val="0"/>
+              <a:satOff val="0"/>
+              <a:lumOff val="0"/>
+              <a:alphaOff val="0"/>
+            </a:schemeClr>
+          </a:solidFill>
+          <a:prstDash val="solid"/>
+        </a:ln>
+        <a:effectLst/>
+      </dsp:spPr>
+      <dsp:style>
+        <a:lnRef idx="2">
+          <a:scrgbClr r="0" g="0" b="0"/>
+        </a:lnRef>
+        <a:fillRef idx="1">
+          <a:scrgbClr r="0" g="0" b="0"/>
+        </a:fillRef>
+        <a:effectRef idx="0">
+          <a:scrgbClr r="0" g="0" b="0"/>
+        </a:effectRef>
+        <a:fontRef idx="minor">
+          <a:schemeClr val="lt1"/>
+        </a:fontRef>
+      </dsp:style>
+    </dsp:sp>
+    <dsp:sp modelId="{55780283-2ECB-4133-BFB8-0078BC02CD62}">
+      <dsp:nvSpPr>
+        <dsp:cNvPr id="0" name=""/>
+        <dsp:cNvSpPr/>
+      </dsp:nvSpPr>
+      <dsp:spPr>
+        <a:xfrm>
+          <a:off x="1219" y="2179040"/>
+          <a:ext cx="174955" cy="174952"/>
+        </a:xfrm>
+        <a:prstGeom prst="ellipse">
+          <a:avLst/>
+        </a:prstGeom>
+        <a:solidFill>
+          <a:schemeClr val="accent1">
+            <a:hueOff val="0"/>
+            <a:satOff val="0"/>
+            <a:lumOff val="0"/>
+            <a:alphaOff val="0"/>
+          </a:schemeClr>
+        </a:solidFill>
+        <a:ln w="25400" cap="flat" cmpd="sng" algn="ctr">
+          <a:solidFill>
+            <a:schemeClr val="accent1">
+              <a:hueOff val="0"/>
+              <a:satOff val="0"/>
+              <a:lumOff val="0"/>
+              <a:alphaOff val="0"/>
+            </a:schemeClr>
+          </a:solidFill>
+          <a:prstDash val="solid"/>
+        </a:ln>
+        <a:effectLst/>
+      </dsp:spPr>
+      <dsp:style>
+        <a:lnRef idx="2">
+          <a:scrgbClr r="0" g="0" b="0"/>
+        </a:lnRef>
+        <a:fillRef idx="1">
+          <a:scrgbClr r="0" g="0" b="0"/>
+        </a:fillRef>
+        <a:effectRef idx="0">
+          <a:scrgbClr r="0" g="0" b="0"/>
+        </a:effectRef>
+        <a:fontRef idx="minor">
+          <a:schemeClr val="lt1"/>
+        </a:fontRef>
+      </dsp:style>
+    </dsp:sp>
+    <dsp:sp modelId="{4A8CB79D-8090-4A56-9245-0792E3B4A2E0}">
+      <dsp:nvSpPr>
+        <dsp:cNvPr id="0" name=""/>
+        <dsp:cNvSpPr/>
+      </dsp:nvSpPr>
+      <dsp:spPr>
+        <a:xfrm>
+          <a:off x="0" y="1731300"/>
+          <a:ext cx="1550822" cy="450042"/>
+        </a:xfrm>
+        <a:prstGeom prst="rect">
+          <a:avLst/>
+        </a:prstGeom>
+        <a:noFill/>
+        <a:ln>
+          <a:noFill/>
+        </a:ln>
+        <a:effectLst/>
+      </dsp:spPr>
+      <dsp:style>
+        <a:lnRef idx="0">
+          <a:scrgbClr r="0" g="0" b="0"/>
+        </a:lnRef>
+        <a:fillRef idx="0">
+          <a:scrgbClr r="0" g="0" b="0"/>
+        </a:fillRef>
+        <a:effectRef idx="0">
+          <a:scrgbClr r="0" g="0" b="0"/>
+        </a:effectRef>
+        <a:fontRef idx="minor"/>
+      </dsp:style>
+      <dsp:txBody>
+        <a:bodyPr spcFirstLastPara="0" vert="horz" wrap="square" lIns="0" tIns="0" rIns="0" bIns="0" numCol="1" spcCol="1270" anchor="b" anchorCtr="0">
+          <a:noAutofit/>
+        </a:bodyPr>
+        <a:lstStyle/>
+        <a:p>
+          <a:pPr lvl="0" algn="l" defTabSz="933450">
+            <a:lnSpc>
+              <a:spcPct val="90000"/>
+            </a:lnSpc>
+            <a:spcBef>
+              <a:spcPct val="0"/>
+            </a:spcBef>
+            <a:spcAft>
+              <a:spcPct val="35000"/>
+            </a:spcAft>
+          </a:pPr>
+          <a:r>
+            <a:rPr lang="en-US" sz="2100" kern="1200" dirty="0" err="1" smtClean="0">
+              <a:solidFill>
+                <a:schemeClr val="bg1"/>
+              </a:solidFill>
+            </a:rPr>
+            <a:t>Groep</a:t>
+          </a:r>
+          <a:r>
+            <a:rPr lang="en-US" sz="2100" kern="1200" dirty="0" smtClean="0">
+              <a:solidFill>
+                <a:schemeClr val="bg1"/>
+              </a:solidFill>
+            </a:rPr>
+            <a:t> 2</a:t>
+          </a:r>
+          <a:endParaRPr lang="nl-NL" sz="2100" kern="1200" dirty="0">
+            <a:solidFill>
+              <a:schemeClr val="bg1"/>
+            </a:solidFill>
+          </a:endParaRPr>
+        </a:p>
+      </dsp:txBody>
+      <dsp:txXfrm>
+        <a:off x="0" y="1731300"/>
+        <a:ext cx="1550822" cy="450042"/>
+      </dsp:txXfrm>
+    </dsp:sp>
+    <dsp:sp modelId="{97DA29A6-CF53-40EA-8167-4875DE395972}">
+      <dsp:nvSpPr>
+        <dsp:cNvPr id="0" name=""/>
+        <dsp:cNvSpPr/>
+      </dsp:nvSpPr>
+      <dsp:spPr>
+        <a:xfrm>
+          <a:off x="2094585" y="2939278"/>
+          <a:ext cx="349910" cy="350192"/>
+        </a:xfrm>
+        <a:prstGeom prst="ellipse">
+          <a:avLst/>
+        </a:prstGeom>
+        <a:solidFill>
+          <a:schemeClr val="accent1">
+            <a:hueOff val="0"/>
+            <a:satOff val="0"/>
+            <a:lumOff val="0"/>
+            <a:alphaOff val="0"/>
+          </a:schemeClr>
+        </a:solidFill>
+        <a:ln w="25400" cap="flat" cmpd="sng" algn="ctr">
+          <a:solidFill>
+            <a:schemeClr val="accent1">
+              <a:hueOff val="0"/>
+              <a:satOff val="0"/>
+              <a:lumOff val="0"/>
+              <a:alphaOff val="0"/>
+            </a:schemeClr>
+          </a:solidFill>
+          <a:prstDash val="solid"/>
+        </a:ln>
+        <a:effectLst/>
+      </dsp:spPr>
+      <dsp:style>
+        <a:lnRef idx="2">
+          <a:scrgbClr r="0" g="0" b="0"/>
+        </a:lnRef>
+        <a:fillRef idx="1">
+          <a:scrgbClr r="0" g="0" b="0"/>
+        </a:fillRef>
+        <a:effectRef idx="0">
+          <a:scrgbClr r="0" g="0" b="0"/>
+        </a:effectRef>
+        <a:fontRef idx="minor">
+          <a:schemeClr val="lt1"/>
+        </a:fontRef>
+      </dsp:style>
+    </dsp:sp>
+    <dsp:sp modelId="{F3279A43-D68B-47FE-AD95-F69CBDFA4F5E}">
+      <dsp:nvSpPr>
+        <dsp:cNvPr id="0" name=""/>
+        <dsp:cNvSpPr/>
+      </dsp:nvSpPr>
+      <dsp:spPr>
+        <a:xfrm>
+          <a:off x="1870252" y="3295801"/>
+          <a:ext cx="174955" cy="174952"/>
+        </a:xfrm>
+        <a:prstGeom prst="ellipse">
+          <a:avLst/>
+        </a:prstGeom>
+        <a:solidFill>
+          <a:schemeClr val="accent1">
+            <a:hueOff val="0"/>
+            <a:satOff val="0"/>
+            <a:lumOff val="0"/>
+            <a:alphaOff val="0"/>
+          </a:schemeClr>
+        </a:solidFill>
+        <a:ln w="25400" cap="flat" cmpd="sng" algn="ctr">
+          <a:solidFill>
+            <a:schemeClr val="accent1">
+              <a:hueOff val="0"/>
+              <a:satOff val="0"/>
+              <a:lumOff val="0"/>
+              <a:alphaOff val="0"/>
+            </a:schemeClr>
+          </a:solidFill>
+          <a:prstDash val="solid"/>
+        </a:ln>
+        <a:effectLst/>
+      </dsp:spPr>
+      <dsp:style>
+        <a:lnRef idx="2">
+          <a:scrgbClr r="0" g="0" b="0"/>
+        </a:lnRef>
+        <a:fillRef idx="1">
+          <a:scrgbClr r="0" g="0" b="0"/>
+        </a:fillRef>
+        <a:effectRef idx="0">
+          <a:scrgbClr r="0" g="0" b="0"/>
+        </a:effectRef>
+        <a:fontRef idx="minor">
+          <a:schemeClr val="lt1"/>
+        </a:fontRef>
+      </dsp:style>
+    </dsp:sp>
+    <dsp:sp modelId="{DBABF39F-3927-4607-98E5-56B7F8AB08BC}">
+      <dsp:nvSpPr>
+        <dsp:cNvPr id="0" name=""/>
+        <dsp:cNvSpPr/>
+      </dsp:nvSpPr>
+      <dsp:spPr>
+        <a:xfrm>
+          <a:off x="1496568" y="3295801"/>
+          <a:ext cx="174955" cy="174952"/>
+        </a:xfrm>
+        <a:prstGeom prst="ellipse">
+          <a:avLst/>
+        </a:prstGeom>
+        <a:solidFill>
+          <a:schemeClr val="accent1">
+            <a:hueOff val="0"/>
+            <a:satOff val="0"/>
+            <a:lumOff val="0"/>
+            <a:alphaOff val="0"/>
+          </a:schemeClr>
+        </a:solidFill>
+        <a:ln w="25400" cap="flat" cmpd="sng" algn="ctr">
+          <a:solidFill>
+            <a:schemeClr val="accent1">
+              <a:hueOff val="0"/>
+              <a:satOff val="0"/>
+              <a:lumOff val="0"/>
+              <a:alphaOff val="0"/>
+            </a:schemeClr>
+          </a:solidFill>
+          <a:prstDash val="solid"/>
+        </a:ln>
+        <a:effectLst/>
+      </dsp:spPr>
+      <dsp:style>
+        <a:lnRef idx="2">
+          <a:scrgbClr r="0" g="0" b="0"/>
+        </a:lnRef>
+        <a:fillRef idx="1">
+          <a:scrgbClr r="0" g="0" b="0"/>
+        </a:fillRef>
+        <a:effectRef idx="0">
+          <a:scrgbClr r="0" g="0" b="0"/>
+        </a:effectRef>
+        <a:fontRef idx="minor">
+          <a:schemeClr val="lt1"/>
+        </a:fontRef>
+      </dsp:style>
+    </dsp:sp>
+    <dsp:sp modelId="{B92E45C0-2FDD-4103-8A22-824EE6F91626}">
+      <dsp:nvSpPr>
+        <dsp:cNvPr id="0" name=""/>
+        <dsp:cNvSpPr/>
+      </dsp:nvSpPr>
+      <dsp:spPr>
+        <a:xfrm>
+          <a:off x="1122883" y="3295801"/>
+          <a:ext cx="174955" cy="174952"/>
+        </a:xfrm>
+        <a:prstGeom prst="ellipse">
+          <a:avLst/>
+        </a:prstGeom>
+        <a:solidFill>
+          <a:schemeClr val="accent1">
+            <a:hueOff val="0"/>
+            <a:satOff val="0"/>
+            <a:lumOff val="0"/>
+            <a:alphaOff val="0"/>
+          </a:schemeClr>
+        </a:solidFill>
+        <a:ln w="25400" cap="flat" cmpd="sng" algn="ctr">
+          <a:solidFill>
+            <a:schemeClr val="accent1">
+              <a:hueOff val="0"/>
+              <a:satOff val="0"/>
+              <a:lumOff val="0"/>
+              <a:alphaOff val="0"/>
+            </a:schemeClr>
+          </a:solidFill>
+          <a:prstDash val="solid"/>
+        </a:ln>
+        <a:effectLst/>
+      </dsp:spPr>
+      <dsp:style>
+        <a:lnRef idx="2">
+          <a:scrgbClr r="0" g="0" b="0"/>
+        </a:lnRef>
+        <a:fillRef idx="1">
+          <a:scrgbClr r="0" g="0" b="0"/>
+        </a:fillRef>
+        <a:effectRef idx="0">
+          <a:scrgbClr r="0" g="0" b="0"/>
+        </a:effectRef>
+        <a:fontRef idx="minor">
+          <a:schemeClr val="lt1"/>
+        </a:fontRef>
+      </dsp:style>
+    </dsp:sp>
+    <dsp:sp modelId="{52A8FE42-DD1B-4EF0-94DE-618ADE769CE9}">
+      <dsp:nvSpPr>
+        <dsp:cNvPr id="0" name=""/>
+        <dsp:cNvSpPr/>
+      </dsp:nvSpPr>
+      <dsp:spPr>
+        <a:xfrm>
+          <a:off x="749198" y="3295801"/>
+          <a:ext cx="174955" cy="174952"/>
+        </a:xfrm>
+        <a:prstGeom prst="ellipse">
+          <a:avLst/>
+        </a:prstGeom>
+        <a:solidFill>
+          <a:schemeClr val="accent1">
+            <a:hueOff val="0"/>
+            <a:satOff val="0"/>
+            <a:lumOff val="0"/>
+            <a:alphaOff val="0"/>
+          </a:schemeClr>
+        </a:solidFill>
+        <a:ln w="25400" cap="flat" cmpd="sng" algn="ctr">
+          <a:solidFill>
+            <a:schemeClr val="accent1">
+              <a:hueOff val="0"/>
+              <a:satOff val="0"/>
+              <a:lumOff val="0"/>
+              <a:alphaOff val="0"/>
+            </a:schemeClr>
+          </a:solidFill>
+          <a:prstDash val="solid"/>
+        </a:ln>
+        <a:effectLst/>
+      </dsp:spPr>
+      <dsp:style>
+        <a:lnRef idx="2">
+          <a:scrgbClr r="0" g="0" b="0"/>
+        </a:lnRef>
+        <a:fillRef idx="1">
+          <a:scrgbClr r="0" g="0" b="0"/>
+        </a:fillRef>
+        <a:effectRef idx="0">
+          <a:scrgbClr r="0" g="0" b="0"/>
+        </a:effectRef>
+        <a:fontRef idx="minor">
+          <a:schemeClr val="lt1"/>
+        </a:fontRef>
+      </dsp:style>
+    </dsp:sp>
+    <dsp:sp modelId="{5A9AF302-1185-486E-90D0-45CD6A57B261}">
+      <dsp:nvSpPr>
+        <dsp:cNvPr id="0" name=""/>
+        <dsp:cNvSpPr/>
+      </dsp:nvSpPr>
+      <dsp:spPr>
+        <a:xfrm>
+          <a:off x="374904" y="3295801"/>
+          <a:ext cx="174955" cy="174952"/>
+        </a:xfrm>
+        <a:prstGeom prst="ellipse">
+          <a:avLst/>
+        </a:prstGeom>
+        <a:solidFill>
+          <a:schemeClr val="accent1">
+            <a:hueOff val="0"/>
+            <a:satOff val="0"/>
+            <a:lumOff val="0"/>
+            <a:alphaOff val="0"/>
+          </a:schemeClr>
+        </a:solidFill>
+        <a:ln w="25400" cap="flat" cmpd="sng" algn="ctr">
+          <a:solidFill>
+            <a:schemeClr val="accent1">
+              <a:hueOff val="0"/>
+              <a:satOff val="0"/>
+              <a:lumOff val="0"/>
+              <a:alphaOff val="0"/>
+            </a:schemeClr>
+          </a:solidFill>
+          <a:prstDash val="solid"/>
+        </a:ln>
+        <a:effectLst/>
+      </dsp:spPr>
+      <dsp:style>
+        <a:lnRef idx="2">
+          <a:scrgbClr r="0" g="0" b="0"/>
+        </a:lnRef>
+        <a:fillRef idx="1">
+          <a:scrgbClr r="0" g="0" b="0"/>
+        </a:fillRef>
+        <a:effectRef idx="0">
+          <a:scrgbClr r="0" g="0" b="0"/>
+        </a:effectRef>
+        <a:fontRef idx="minor">
+          <a:schemeClr val="lt1"/>
+        </a:fontRef>
+      </dsp:style>
+    </dsp:sp>
+    <dsp:sp modelId="{4126ABD2-5CCE-44F1-A201-FEF5E427F5D4}">
+      <dsp:nvSpPr>
+        <dsp:cNvPr id="0" name=""/>
+        <dsp:cNvSpPr/>
+      </dsp:nvSpPr>
+      <dsp:spPr>
+        <a:xfrm>
+          <a:off x="1219" y="3295801"/>
+          <a:ext cx="174955" cy="174952"/>
+        </a:xfrm>
+        <a:prstGeom prst="ellipse">
+          <a:avLst/>
+        </a:prstGeom>
+        <a:solidFill>
+          <a:schemeClr val="accent1">
+            <a:hueOff val="0"/>
+            <a:satOff val="0"/>
+            <a:lumOff val="0"/>
+            <a:alphaOff val="0"/>
+          </a:schemeClr>
+        </a:solidFill>
+        <a:ln w="25400" cap="flat" cmpd="sng" algn="ctr">
+          <a:solidFill>
+            <a:schemeClr val="accent1">
+              <a:hueOff val="0"/>
+              <a:satOff val="0"/>
+              <a:lumOff val="0"/>
+              <a:alphaOff val="0"/>
+            </a:schemeClr>
+          </a:solidFill>
+          <a:prstDash val="solid"/>
+        </a:ln>
+        <a:effectLst/>
+      </dsp:spPr>
+      <dsp:style>
+        <a:lnRef idx="2">
+          <a:scrgbClr r="0" g="0" b="0"/>
+        </a:lnRef>
+        <a:fillRef idx="1">
+          <a:scrgbClr r="0" g="0" b="0"/>
+        </a:fillRef>
+        <a:effectRef idx="0">
+          <a:scrgbClr r="0" g="0" b="0"/>
+        </a:effectRef>
+        <a:fontRef idx="minor">
+          <a:schemeClr val="lt1"/>
+        </a:fontRef>
+      </dsp:style>
+    </dsp:sp>
+    <dsp:sp modelId="{54B5F346-661D-4B57-9FF9-2BC495ECE97A}">
+      <dsp:nvSpPr>
+        <dsp:cNvPr id="0" name=""/>
+        <dsp:cNvSpPr/>
+      </dsp:nvSpPr>
+      <dsp:spPr>
+        <a:xfrm>
+          <a:off x="0" y="2844032"/>
+          <a:ext cx="2050694" cy="450042"/>
+        </a:xfrm>
+        <a:prstGeom prst="rect">
+          <a:avLst/>
+        </a:prstGeom>
+        <a:noFill/>
+        <a:ln>
+          <a:noFill/>
+        </a:ln>
+        <a:effectLst/>
+      </dsp:spPr>
+      <dsp:style>
+        <a:lnRef idx="0">
+          <a:scrgbClr r="0" g="0" b="0"/>
+        </a:lnRef>
+        <a:fillRef idx="0">
+          <a:scrgbClr r="0" g="0" b="0"/>
+        </a:fillRef>
+        <a:effectRef idx="0">
+          <a:scrgbClr r="0" g="0" b="0"/>
+        </a:effectRef>
+        <a:fontRef idx="minor"/>
+      </dsp:style>
+      <dsp:txBody>
+        <a:bodyPr spcFirstLastPara="0" vert="horz" wrap="square" lIns="0" tIns="0" rIns="0" bIns="0" numCol="1" spcCol="1270" anchor="b" anchorCtr="0">
+          <a:noAutofit/>
+        </a:bodyPr>
+        <a:lstStyle/>
+        <a:p>
+          <a:pPr lvl="0" algn="l" defTabSz="933450">
+            <a:lnSpc>
+              <a:spcPct val="90000"/>
+            </a:lnSpc>
+            <a:spcBef>
+              <a:spcPct val="0"/>
+            </a:spcBef>
+            <a:spcAft>
+              <a:spcPct val="35000"/>
+            </a:spcAft>
+          </a:pPr>
+          <a:r>
+            <a:rPr lang="en-US" sz="2100" kern="1200" dirty="0" err="1" smtClean="0">
+              <a:solidFill>
+                <a:schemeClr val="bg1"/>
+              </a:solidFill>
+            </a:rPr>
+            <a:t>Groep</a:t>
+          </a:r>
+          <a:r>
+            <a:rPr lang="en-US" sz="2100" kern="1200" dirty="0" smtClean="0">
+              <a:solidFill>
+                <a:schemeClr val="bg1"/>
+              </a:solidFill>
+            </a:rPr>
+            <a:t> …</a:t>
+          </a:r>
+          <a:endParaRPr lang="nl-NL" sz="2100" kern="1200" dirty="0">
+            <a:solidFill>
+              <a:schemeClr val="bg1"/>
+            </a:solidFill>
+          </a:endParaRPr>
+        </a:p>
+      </dsp:txBody>
+      <dsp:txXfrm>
+        <a:off x="0" y="2844032"/>
+        <a:ext cx="2050694" cy="450042"/>
+      </dsp:txXfrm>
+    </dsp:sp>
   </dsp:spTree>
 </dsp:drawing>
 </file>
@@ -4905,7 +6681,7 @@
           <a:p>
             <a:fld id="{4FDA5BBF-9A9E-E34C-87D2-CD6D1CA60245}" type="datetime1">
               <a:rPr lang="en-US" smtClean="0"/>
-              <a:t>7/12/2017</a:t>
+              <a:t>7/16/2017</a:t>
             </a:fld>
             <a:endParaRPr lang="en-US" dirty="0"/>
           </a:p>
@@ -5071,7 +6847,7 @@
           <a:p>
             <a:fld id="{FE5FB5CF-D153-1544-8329-2FC1F4ABF24D}" type="datetime1">
               <a:rPr lang="en-US" smtClean="0"/>
-              <a:t>7/12/2017</a:t>
+              <a:t>7/16/2017</a:t>
             </a:fld>
             <a:endParaRPr lang="nl-NL" dirty="0"/>
           </a:p>
@@ -5527,6 +7303,90 @@
       </p:grpSpPr>
       <p:sp>
         <p:nvSpPr>
+          <p:cNvPr id="2" name="Slide Image Placeholder 1"/>
+          <p:cNvSpPr>
+            <a:spLocks noGrp="1" noRot="1" noChangeAspect="1"/>
+          </p:cNvSpPr>
+          <p:nvPr>
+            <p:ph type="sldImg"/>
+          </p:nvPr>
+        </p:nvSpPr>
+        <p:spPr/>
+      </p:sp>
+      <p:sp>
+        <p:nvSpPr>
+          <p:cNvPr id="3" name="Notes Placeholder 2"/>
+          <p:cNvSpPr>
+            <a:spLocks noGrp="1"/>
+          </p:cNvSpPr>
+          <p:nvPr>
+            <p:ph type="body" idx="1"/>
+          </p:nvPr>
+        </p:nvSpPr>
+        <p:spPr/>
+        <p:txBody>
+          <a:bodyPr/>
+          <a:lstStyle/>
+          <a:p>
+            <a:endParaRPr lang="nl-NL" dirty="0"/>
+          </a:p>
+        </p:txBody>
+      </p:sp>
+      <p:sp>
+        <p:nvSpPr>
+          <p:cNvPr id="4" name="Slide Number Placeholder 3"/>
+          <p:cNvSpPr>
+            <a:spLocks noGrp="1"/>
+          </p:cNvSpPr>
+          <p:nvPr>
+            <p:ph type="sldNum" sz="quarter" idx="10"/>
+          </p:nvPr>
+        </p:nvSpPr>
+        <p:spPr/>
+        <p:txBody>
+          <a:bodyPr/>
+          <a:lstStyle/>
+          <a:p>
+            <a:fld id="{2DB1139D-5AC7-4B0B-A715-E40E0591EF82}" type="slidenum">
+              <a:rPr lang="nl-NL" smtClean="0"/>
+              <a:t>15</a:t>
+            </a:fld>
+            <a:endParaRPr lang="nl-NL" dirty="0"/>
+          </a:p>
+        </p:txBody>
+      </p:sp>
+    </p:spTree>
+    <p:extLst>
+      <p:ext uri="{BB962C8B-B14F-4D97-AF65-F5344CB8AC3E}">
+        <p14:creationId xmlns:p14="http://schemas.microsoft.com/office/powerpoint/2010/main" val="2476626132"/>
+      </p:ext>
+    </p:extLst>
+  </p:cSld>
+  <p:clrMapOvr>
+    <a:masterClrMapping/>
+  </p:clrMapOvr>
+</p:notes>
+</file>
+
+<file path=ppt/notesSlides/notesSlide12.xml><?xml version="1.0" encoding="utf-8"?>
+<p:notes xmlns:a="http://schemas.openxmlformats.org/drawingml/2006/main" xmlns:r="http://schemas.openxmlformats.org/officeDocument/2006/relationships" xmlns:p="http://schemas.openxmlformats.org/presentationml/2006/main">
+  <p:cSld>
+    <p:spTree>
+      <p:nvGrpSpPr>
+        <p:cNvPr id="1" name=""/>
+        <p:cNvGrpSpPr/>
+        <p:nvPr/>
+      </p:nvGrpSpPr>
+      <p:grpSpPr>
+        <a:xfrm>
+          <a:off x="0" y="0"/>
+          <a:ext cx="0" cy="0"/>
+          <a:chOff x="0" y="0"/>
+          <a:chExt cx="0" cy="0"/>
+        </a:xfrm>
+      </p:grpSpPr>
+      <p:sp>
+        <p:nvSpPr>
           <p:cNvPr id="2" name="Tijdelijke aanduiding voor dia-afbeelding 1"/>
           <p:cNvSpPr>
             <a:spLocks noGrp="1" noRot="1" noChangeAspect="1"/>
@@ -5631,7 +7491,7 @@
           <a:p>
             <a:fld id="{2DB1139D-5AC7-4B0B-A715-E40E0591EF82}" type="slidenum">
               <a:rPr lang="nl-NL" smtClean="0"/>
-              <a:t>15</a:t>
+              <a:t>16</a:t>
             </a:fld>
             <a:endParaRPr lang="nl-NL" dirty="0"/>
           </a:p>
@@ -7033,7 +8893,7 @@
           <a:p>
             <a:fld id="{F6146A49-396F-4422-B80E-A51B1B6A1D89}" type="datetime4">
               <a:rPr lang="nl-NL" smtClean="0"/>
-              <a:t>12 juli 2017</a:t>
+              <a:t>16 juli 2017</a:t>
             </a:fld>
             <a:endParaRPr lang="nl-NL" dirty="0"/>
           </a:p>
@@ -7158,7 +9018,7 @@
           <a:p>
             <a:fld id="{906BF8AE-89E8-4026-950D-4651008C2D15}" type="datetime4">
               <a:rPr lang="nl-NL" smtClean="0"/>
-              <a:t>12 juli 2017</a:t>
+              <a:t>16 juli 2017</a:t>
             </a:fld>
             <a:endParaRPr lang="nl-NL" dirty="0"/>
           </a:p>
@@ -7389,7 +9249,7 @@
           <a:p>
             <a:fld id="{B8D8CA3F-F000-4641-83AD-70C0DA34B9EC}" type="datetime4">
               <a:rPr lang="nl-NL" smtClean="0"/>
-              <a:t>12 juli 2017</a:t>
+              <a:t>16 juli 2017</a:t>
             </a:fld>
             <a:endParaRPr lang="nl-NL" dirty="0"/>
           </a:p>
@@ -7653,7 +9513,7 @@
           <a:p>
             <a:fld id="{D09A5720-7772-40F6-9BF7-6C09B4878A89}" type="datetime4">
               <a:rPr lang="nl-NL" smtClean="0"/>
-              <a:t>12 juli 2017</a:t>
+              <a:t>16 juli 2017</a:t>
             </a:fld>
             <a:endParaRPr lang="nl-NL" dirty="0"/>
           </a:p>
@@ -7749,7 +9609,7 @@
           <a:p>
             <a:fld id="{AECD9B9C-FEF2-40F2-9E9B-B7865E4F9E63}" type="datetime4">
               <a:rPr lang="nl-NL" smtClean="0"/>
-              <a:t>12 juli 2017</a:t>
+              <a:t>16 juli 2017</a:t>
             </a:fld>
             <a:endParaRPr lang="nl-NL" dirty="0"/>
           </a:p>
@@ -7968,7 +9828,7 @@
           <a:p>
             <a:fld id="{71A18568-1449-461F-B5D6-9D1ADC76B857}" type="datetime4">
               <a:rPr lang="nl-NL" smtClean="0"/>
-              <a:t>12 juli 2017</a:t>
+              <a:t>16 juli 2017</a:t>
             </a:fld>
             <a:endParaRPr lang="nl-NL" dirty="0"/>
           </a:p>
@@ -8157,7 +10017,7 @@
           <a:p>
             <a:fld id="{F86B242A-376D-4342-B11F-3D5EA631C525}" type="datetime4">
               <a:rPr lang="nl-NL" smtClean="0"/>
-              <a:t>12 juli 2017</a:t>
+              <a:t>16 juli 2017</a:t>
             </a:fld>
             <a:endParaRPr lang="nl-NL" dirty="0"/>
           </a:p>
@@ -8381,7 +10241,7 @@
           <a:p>
             <a:fld id="{EB33009C-FD37-4B5F-AF0A-69B7D4780F1C}" type="datetime4">
               <a:rPr lang="nl-NL" smtClean="0"/>
-              <a:t>12 juli 2017</a:t>
+              <a:t>16 juli 2017</a:t>
             </a:fld>
             <a:endParaRPr lang="nl-NL" dirty="0"/>
           </a:p>
@@ -8601,7 +10461,7 @@
           <a:p>
             <a:fld id="{54C2F801-9BFD-4E03-8768-44E997ED2817}" type="datetime4">
               <a:rPr lang="nl-NL" smtClean="0"/>
-              <a:t>12 juli 2017</a:t>
+              <a:t>16 juli 2017</a:t>
             </a:fld>
             <a:endParaRPr lang="nl-NL" dirty="0"/>
           </a:p>
@@ -8824,7 +10684,7 @@
           <a:p>
             <a:fld id="{03E018C2-35E1-488A-AAD2-6F80D661AD97}" type="datetime4">
               <a:rPr lang="nl-NL" smtClean="0"/>
-              <a:t>12 juli 2017</a:t>
+              <a:t>16 juli 2017</a:t>
             </a:fld>
             <a:endParaRPr lang="nl-NL" dirty="0"/>
           </a:p>
@@ -9024,7 +10884,7 @@
           <a:p>
             <a:fld id="{0DE0354D-C261-4001-9A7C-D976C5F539B3}" type="datetime4">
               <a:rPr lang="nl-NL" smtClean="0"/>
-              <a:t>12 juli 2017</a:t>
+              <a:t>16 juli 2017</a:t>
             </a:fld>
             <a:endParaRPr lang="nl-NL" dirty="0"/>
           </a:p>
@@ -9235,7 +11095,7 @@
           <a:p>
             <a:fld id="{42F0BFAD-BB40-438F-8CCA-C252ECCF380E}" type="datetime4">
               <a:rPr lang="nl-NL" smtClean="0"/>
-              <a:t>12 juli 2017</a:t>
+              <a:t>16 juli 2017</a:t>
             </a:fld>
             <a:r>
               <a:rPr lang="en-US" smtClean="0"/>
@@ -9780,7 +11640,7 @@
           <a:p>
             <a:fld id="{AE7E4A36-26F8-4526-865B-CB6411AF2FED}" type="datetime4">
               <a:rPr lang="nl-NL" smtClean="0"/>
-              <a:t>12 juli 2017</a:t>
+              <a:t>16 juli 2017</a:t>
             </a:fld>
             <a:endParaRPr lang="nl-NL" dirty="0"/>
           </a:p>
@@ -9808,7 +11668,17 @@
           <a:p>
             <a:r>
               <a:rPr lang="en-US" dirty="0" smtClean="0"/>
-              <a:t>Johannes Sim &amp; Renzo </a:t>
+              <a:t>Johannes Sim </a:t>
+            </a:r>
+            <a:r>
+              <a:rPr lang="en-US" dirty="0" smtClean="0"/>
+              <a:t>&amp;</a:t>
+            </a:r>
+          </a:p>
+          <a:p>
+            <a:r>
+              <a:rPr lang="en-US" dirty="0" smtClean="0"/>
+              <a:t>Renzo </a:t>
             </a:r>
             <a:r>
               <a:rPr lang="en-US" dirty="0" err="1" smtClean="0"/>
@@ -9918,7 +11788,7 @@
                   <a:srgbClr val="009036"/>
                 </a:solidFill>
               </a:rPr>
-              <a:t>12 juli 2017</a:t>
+              <a:t>16 juli 2017</a:t>
             </a:fld>
             <a:endParaRPr lang="nl-NL" sz="900" cap="all" dirty="0">
               <a:solidFill>
@@ -10067,7 +11937,7 @@
                   <a:srgbClr val="009036"/>
                 </a:solidFill>
               </a:rPr>
-              <a:t>12 juli 2017</a:t>
+              <a:t>16 juli 2017</a:t>
             </a:fld>
             <a:endParaRPr lang="nl-NL" sz="900" cap="all" dirty="0">
               <a:solidFill>
@@ -10296,7 +12166,7 @@
                   <a:srgbClr val="009036"/>
                 </a:solidFill>
               </a:rPr>
-              <a:t>12 juli 2017</a:t>
+              <a:t>16 juli 2017</a:t>
             </a:fld>
             <a:endParaRPr lang="nl-NL" sz="900" cap="all" dirty="0">
               <a:solidFill>
@@ -10520,7 +12390,7 @@
           <a:p>
             <a:fld id="{3FE45E52-56C7-4F1E-B008-5AF242529B37}" type="datetime4">
               <a:rPr lang="nl-NL" smtClean="0"/>
-              <a:t>12 juli 2017</a:t>
+              <a:t>16 juli 2017</a:t>
             </a:fld>
             <a:endParaRPr lang="nl-NL" dirty="0"/>
           </a:p>
@@ -10744,7 +12614,7 @@
           <a:p>
             <a:fld id="{D37297A6-6894-43EF-9493-A236700900A9}" type="datetime4">
               <a:rPr lang="nl-NL" smtClean="0"/>
-              <a:t>12 juli 2017</a:t>
+              <a:t>16 juli 2017</a:t>
             </a:fld>
             <a:endParaRPr lang="nl-NL" dirty="0"/>
           </a:p>
@@ -10822,6 +12692,122 @@
       </p:grpSpPr>
       <p:sp>
         <p:nvSpPr>
+          <p:cNvPr id="6" name="Title 5"/>
+          <p:cNvSpPr>
+            <a:spLocks noGrp="1"/>
+          </p:cNvSpPr>
+          <p:nvPr>
+            <p:ph type="ctrTitle"/>
+          </p:nvPr>
+        </p:nvSpPr>
+        <p:spPr/>
+        <p:txBody>
+          <a:bodyPr/>
+          <a:lstStyle/>
+          <a:p>
+            <a:r>
+              <a:rPr lang="en-US" dirty="0" err="1" smtClean="0"/>
+              <a:t>Iets</a:t>
+            </a:r>
+            <a:r>
+              <a:rPr lang="en-US" dirty="0" smtClean="0"/>
+              <a:t> met </a:t>
+            </a:r>
+            <a:r>
+              <a:rPr lang="en-US" dirty="0" err="1" smtClean="0"/>
+              <a:t>mentimeter</a:t>
+            </a:r>
+            <a:endParaRPr lang="nl-NL" dirty="0"/>
+          </a:p>
+        </p:txBody>
+      </p:sp>
+      <p:sp>
+        <p:nvSpPr>
+          <p:cNvPr id="5" name="Footer Placeholder 4"/>
+          <p:cNvSpPr>
+            <a:spLocks noGrp="1"/>
+          </p:cNvSpPr>
+          <p:nvPr>
+            <p:ph type="ftr" sz="quarter" idx="11"/>
+          </p:nvPr>
+        </p:nvSpPr>
+        <p:spPr>
+          <a:xfrm>
+            <a:off x="634402" y="5849141"/>
+            <a:ext cx="1711233" cy="467568"/>
+          </a:xfrm>
+        </p:spPr>
+        <p:txBody>
+          <a:bodyPr/>
+          <a:lstStyle/>
+          <a:p>
+            <a:r>
+              <a:rPr lang="nl-NL" dirty="0" smtClean="0"/>
+              <a:t>Johannes Sim &amp; Renzo </a:t>
+            </a:r>
+            <a:r>
+              <a:rPr lang="nl-NL" dirty="0" err="1" smtClean="0"/>
+              <a:t>veldkamp</a:t>
+            </a:r>
+            <a:endParaRPr lang="nl-NL" dirty="0"/>
+          </a:p>
+        </p:txBody>
+      </p:sp>
+      <p:sp>
+        <p:nvSpPr>
+          <p:cNvPr id="4" name="Date Placeholder 3"/>
+          <p:cNvSpPr>
+            <a:spLocks noGrp="1"/>
+          </p:cNvSpPr>
+          <p:nvPr>
+            <p:ph type="dt" sz="half" idx="10"/>
+          </p:nvPr>
+        </p:nvSpPr>
+        <p:spPr/>
+        <p:txBody>
+          <a:bodyPr/>
+          <a:lstStyle/>
+          <a:p>
+            <a:fld id="{D09A5720-7772-40F6-9BF7-6C09B4878A89}" type="datetime4">
+              <a:rPr lang="nl-NL" smtClean="0"/>
+              <a:t>16 juli 2017</a:t>
+            </a:fld>
+            <a:endParaRPr lang="nl-NL" dirty="0"/>
+          </a:p>
+        </p:txBody>
+      </p:sp>
+    </p:spTree>
+    <p:extLst>
+      <p:ext uri="{BB962C8B-B14F-4D97-AF65-F5344CB8AC3E}">
+        <p14:creationId xmlns:p14="http://schemas.microsoft.com/office/powerpoint/2010/main" val="2447069800"/>
+      </p:ext>
+    </p:extLst>
+  </p:cSld>
+  <p:clrMapOvr>
+    <a:masterClrMapping/>
+  </p:clrMapOvr>
+</p:sld>
+</file>
+
+<file path=ppt/slides/slide16.xml><?xml version="1.0" encoding="utf-8"?>
+<p:sld xmlns:a="http://schemas.openxmlformats.org/drawingml/2006/main" xmlns:r="http://schemas.openxmlformats.org/officeDocument/2006/relationships" xmlns:p="http://schemas.openxmlformats.org/presentationml/2006/main">
+  <p:cSld>
+    <p:spTree>
+      <p:nvGrpSpPr>
+        <p:cNvPr id="1" name=""/>
+        <p:cNvGrpSpPr/>
+        <p:nvPr/>
+      </p:nvGrpSpPr>
+      <p:grpSpPr>
+        <a:xfrm>
+          <a:off x="0" y="0"/>
+          <a:ext cx="0" cy="0"/>
+          <a:chOff x="0" y="0"/>
+          <a:chExt cx="0" cy="0"/>
+        </a:xfrm>
+      </p:grpSpPr>
+      <p:sp>
+        <p:nvSpPr>
           <p:cNvPr id="2" name="Title 1"/>
           <p:cNvSpPr>
             <a:spLocks noGrp="1"/>
@@ -10949,7 +12935,7 @@
                   <a:srgbClr val="009036"/>
                 </a:solidFill>
               </a:rPr>
-              <a:t>12 juli 2017</a:t>
+              <a:t>16 juli 2017</a:t>
             </a:fld>
             <a:endParaRPr lang="nl-NL" sz="900" cap="all" dirty="0">
               <a:solidFill>
@@ -11378,7 +13364,7 @@
                   <a:srgbClr val="009036"/>
                 </a:solidFill>
               </a:rPr>
-              <a:t>12 juli 2017</a:t>
+              <a:t>16 juli 2017</a:t>
             </a:fld>
             <a:endParaRPr lang="nl-NL" sz="900" cap="all" dirty="0">
               <a:solidFill>
@@ -11876,7 +13862,7 @@
                   <a:srgbClr val="009036"/>
                 </a:solidFill>
               </a:rPr>
-              <a:t>12 juli 2017</a:t>
+              <a:t>16 juli 2017</a:t>
             </a:fld>
             <a:endParaRPr lang="nl-NL" sz="900" cap="all" dirty="0">
               <a:solidFill>
@@ -14829,7 +16815,7 @@
                   <a:srgbClr val="009036"/>
                 </a:solidFill>
               </a:rPr>
-              <a:t>12 juli 2017</a:t>
+              <a:t>16 juli 2017</a:t>
             </a:fld>
             <a:endParaRPr lang="nl-NL" sz="900" cap="all" dirty="0">
               <a:solidFill>
@@ -15152,7 +17138,7 @@
                   <a:srgbClr val="009036"/>
                 </a:solidFill>
               </a:rPr>
-              <a:t>12 juli 2017</a:t>
+              <a:t>16 juli 2017</a:t>
             </a:fld>
             <a:endParaRPr lang="nl-NL" sz="900" cap="all" dirty="0">
               <a:solidFill>
@@ -15555,7 +17541,7 @@
                   <a:srgbClr val="009036"/>
                 </a:solidFill>
               </a:rPr>
-              <a:t>12 juli 2017</a:t>
+              <a:t>16 juli 2017</a:t>
             </a:fld>
             <a:endParaRPr lang="nl-NL" sz="900" cap="all" dirty="0">
               <a:solidFill>
@@ -15753,7 +17739,7 @@
                   <a:srgbClr val="009036"/>
                 </a:solidFill>
               </a:rPr>
-              <a:t>12 juli 2017</a:t>
+              <a:t>16 juli 2017</a:t>
             </a:fld>
             <a:endParaRPr lang="nl-NL" sz="900" cap="all" dirty="0">
               <a:solidFill>
@@ -16026,7 +18012,7 @@
                   <a:srgbClr val="009036"/>
                 </a:solidFill>
               </a:rPr>
-              <a:t>12 juli 2017</a:t>
+              <a:t>16 juli 2017</a:t>
             </a:fld>
             <a:endParaRPr lang="nl-NL" sz="900" cap="all" dirty="0">
               <a:solidFill>
@@ -16283,7 +18269,7 @@
                   <a:srgbClr val="009036"/>
                 </a:solidFill>
               </a:rPr>
-              <a:t>12 juli 2017</a:t>
+              <a:t>16 juli 2017</a:t>
             </a:fld>
             <a:endParaRPr lang="nl-NL" sz="900" cap="all" dirty="0">
               <a:solidFill>
@@ -17483,6 +19469,21 @@
 </file>
 
 <file path=customXml/item1.xml><?xml version="1.0" encoding="utf-8"?>
+<p:properties xmlns:p="http://schemas.microsoft.com/office/2006/metadata/properties" xmlns:xsi="http://www.w3.org/2001/XMLSchema-instance" xmlns:pc="http://schemas.microsoft.com/office/infopath/2007/PartnerControls">
+  <documentManagement/>
+</p:properties>
+</file>
+
+<file path=customXml/item2.xml><?xml version="1.0" encoding="utf-8"?>
+<?mso-contentType ?>
+<FormTemplates xmlns="http://schemas.microsoft.com/sharepoint/v3/contenttype/forms">
+  <Display>DocumentLibraryForm</Display>
+  <Edit>DocumentLibraryForm</Edit>
+  <New>DocumentLibraryForm</New>
+</FormTemplates>
+</file>
+
+<file path=customXml/item3.xml><?xml version="1.0" encoding="utf-8"?>
 <ct:contentTypeSchema xmlns:ct="http://schemas.microsoft.com/office/2006/metadata/contentType" xmlns:ma="http://schemas.microsoft.com/office/2006/metadata/properties/metaAttributes" ct:_="" ma:_="" ma:contentTypeName="Document" ma:contentTypeID="0x0101009843F10021B1B74BA5DD583B6999787F" ma:contentTypeVersion="1" ma:contentTypeDescription="Een nieuw document maken." ma:contentTypeScope="" ma:versionID="9f7dad7ca3b37095ed9229a6a072267d">
   <xsd:schema xmlns:xsd="http://www.w3.org/2001/XMLSchema" xmlns:xs="http://www.w3.org/2001/XMLSchema" xmlns:p="http://schemas.microsoft.com/office/2006/metadata/properties" targetNamespace="http://schemas.microsoft.com/office/2006/metadata/properties" ma:root="true" ma:fieldsID="a17e5968c79d9fe2fc9f8835eee23f58">
     <xsd:element name="properties">
@@ -17596,22 +19597,30 @@
 </ct:contentTypeSchema>
 </file>
 
-<file path=customXml/item2.xml><?xml version="1.0" encoding="utf-8"?>
-<?mso-contentType ?>
-<FormTemplates xmlns="http://schemas.microsoft.com/sharepoint/v3/contenttype/forms">
-  <Display>DocumentLibraryForm</Display>
-  <Edit>DocumentLibraryForm</Edit>
-  <New>DocumentLibraryForm</New>
-</FormTemplates>
+<file path=customXml/itemProps1.xml><?xml version="1.0" encoding="utf-8"?>
+<ds:datastoreItem xmlns:ds="http://schemas.openxmlformats.org/officeDocument/2006/customXml" ds:itemID="{DE0A3E1F-B2EC-4B36-9F71-3169FFDE4AE0}">
+  <ds:schemaRefs>
+    <ds:schemaRef ds:uri="http://purl.org/dc/elements/1.1/"/>
+    <ds:schemaRef ds:uri="http://schemas.microsoft.com/office/2006/metadata/properties"/>
+    <ds:schemaRef ds:uri="http://schemas.microsoft.com/office/2006/documentManagement/types"/>
+    <ds:schemaRef ds:uri="http://purl.org/dc/terms/"/>
+    <ds:schemaRef ds:uri="http://schemas.openxmlformats.org/package/2006/metadata/core-properties"/>
+    <ds:schemaRef ds:uri="http://purl.org/dc/dcmitype/"/>
+    <ds:schemaRef ds:uri="http://schemas.microsoft.com/office/infopath/2007/PartnerControls"/>
+    <ds:schemaRef ds:uri="http://www.w3.org/XML/1998/namespace"/>
+  </ds:schemaRefs>
+</ds:datastoreItem>
 </file>
 
-<file path=customXml/item3.xml><?xml version="1.0" encoding="utf-8"?>
-<p:properties xmlns:p="http://schemas.microsoft.com/office/2006/metadata/properties" xmlns:xsi="http://www.w3.org/2001/XMLSchema-instance" xmlns:pc="http://schemas.microsoft.com/office/infopath/2007/PartnerControls">
-  <documentManagement/>
-</p:properties>
+<file path=customXml/itemProps2.xml><?xml version="1.0" encoding="utf-8"?>
+<ds:datastoreItem xmlns:ds="http://schemas.openxmlformats.org/officeDocument/2006/customXml" ds:itemID="{4A752D92-0ACC-48D2-A658-AB744FE70ECE}">
+  <ds:schemaRefs>
+    <ds:schemaRef ds:uri="http://schemas.microsoft.com/sharepoint/v3/contenttype/forms"/>
+  </ds:schemaRefs>
+</ds:datastoreItem>
 </file>
 
-<file path=customXml/itemProps1.xml><?xml version="1.0" encoding="utf-8"?>
+<file path=customXml/itemProps3.xml><?xml version="1.0" encoding="utf-8"?>
 <ds:datastoreItem xmlns:ds="http://schemas.openxmlformats.org/officeDocument/2006/customXml" ds:itemID="{3175F035-B069-4F0E-ADC8-454931FDE34D}">
   <ds:schemaRefs>
     <ds:schemaRef ds:uri="http://schemas.microsoft.com/office/2006/metadata/contentType"/>
@@ -17625,27 +19634,4 @@
     <ds:schemaRef ds:uri="http://schemas.microsoft.com/office/infopath/2007/PartnerControls"/>
   </ds:schemaRefs>
 </ds:datastoreItem>
-</file>
-
-<file path=customXml/itemProps2.xml><?xml version="1.0" encoding="utf-8"?>
-<ds:datastoreItem xmlns:ds="http://schemas.openxmlformats.org/officeDocument/2006/customXml" ds:itemID="{4A752D92-0ACC-48D2-A658-AB744FE70ECE}">
-  <ds:schemaRefs>
-    <ds:schemaRef ds:uri="http://schemas.microsoft.com/sharepoint/v3/contenttype/forms"/>
-  </ds:schemaRefs>
-</ds:datastoreItem>
-</file>
-
-<file path=customXml/itemProps3.xml><?xml version="1.0" encoding="utf-8"?>
-<ds:datastoreItem xmlns:ds="http://schemas.openxmlformats.org/officeDocument/2006/customXml" ds:itemID="{DE0A3E1F-B2EC-4B36-9F71-3169FFDE4AE0}">
-  <ds:schemaRefs>
-    <ds:schemaRef ds:uri="http://purl.org/dc/elements/1.1/"/>
-    <ds:schemaRef ds:uri="http://schemas.microsoft.com/office/2006/metadata/properties"/>
-    <ds:schemaRef ds:uri="http://schemas.microsoft.com/office/2006/documentManagement/types"/>
-    <ds:schemaRef ds:uri="http://purl.org/dc/terms/"/>
-    <ds:schemaRef ds:uri="http://schemas.openxmlformats.org/package/2006/metadata/core-properties"/>
-    <ds:schemaRef ds:uri="http://purl.org/dc/dcmitype/"/>
-    <ds:schemaRef ds:uri="http://schemas.microsoft.com/office/infopath/2007/PartnerControls"/>
-    <ds:schemaRef ds:uri="http://www.w3.org/XML/1998/namespace"/>
-  </ds:schemaRefs>
-</ds:datastoreItem>
 </file>
</xml_diff>

<commit_message>
html container ajax-call; env'd docker-compose.yml; added invitation
</commit_message>
<xml_diff>
--- a/Presentatie/Docker-based microservices.pptx
+++ b/Presentatie/Docker-based microservices.pptx
@@ -12,19 +12,19 @@
   </p:handoutMasterIdLst>
   <p:sldIdLst>
     <p:sldId id="257" r:id="rId5"/>
-    <p:sldId id="259" r:id="rId6"/>
-    <p:sldId id="279" r:id="rId7"/>
-    <p:sldId id="280" r:id="rId8"/>
-    <p:sldId id="266" r:id="rId9"/>
-    <p:sldId id="270" r:id="rId10"/>
-    <p:sldId id="274" r:id="rId11"/>
-    <p:sldId id="267" r:id="rId12"/>
-    <p:sldId id="268" r:id="rId13"/>
-    <p:sldId id="269" r:id="rId14"/>
-    <p:sldId id="272" r:id="rId15"/>
-    <p:sldId id="275" r:id="rId16"/>
-    <p:sldId id="276" r:id="rId17"/>
-    <p:sldId id="271" r:id="rId18"/>
+    <p:sldId id="281" r:id="rId6"/>
+    <p:sldId id="259" r:id="rId7"/>
+    <p:sldId id="279" r:id="rId8"/>
+    <p:sldId id="280" r:id="rId9"/>
+    <p:sldId id="266" r:id="rId10"/>
+    <p:sldId id="270" r:id="rId11"/>
+    <p:sldId id="274" r:id="rId12"/>
+    <p:sldId id="267" r:id="rId13"/>
+    <p:sldId id="268" r:id="rId14"/>
+    <p:sldId id="269" r:id="rId15"/>
+    <p:sldId id="272" r:id="rId16"/>
+    <p:sldId id="271" r:id="rId17"/>
+    <p:sldId id="275" r:id="rId18"/>
     <p:sldId id="263" r:id="rId19"/>
     <p:sldId id="277" r:id="rId20"/>
     <p:sldId id="278" r:id="rId21"/>
@@ -1405,6 +1405,1781 @@
       <dsp:cNvGrpSpPr/>
     </dsp:nvGrpSpPr>
     <dsp:grpSpPr/>
+    <dsp:sp modelId="{96D99B90-21EE-4E24-8C68-E8F3C02FA384}">
+      <dsp:nvSpPr>
+        <dsp:cNvPr id="0" name=""/>
+        <dsp:cNvSpPr/>
+      </dsp:nvSpPr>
+      <dsp:spPr>
+        <a:xfrm>
+          <a:off x="5921044" y="2179040"/>
+          <a:ext cx="174955" cy="174952"/>
+        </a:xfrm>
+        <a:prstGeom prst="ellipse">
+          <a:avLst/>
+        </a:prstGeom>
+        <a:solidFill>
+          <a:schemeClr val="accent1">
+            <a:hueOff val="0"/>
+            <a:satOff val="0"/>
+            <a:lumOff val="0"/>
+            <a:alphaOff val="0"/>
+          </a:schemeClr>
+        </a:solidFill>
+        <a:ln w="25400" cap="flat" cmpd="sng" algn="ctr">
+          <a:solidFill>
+            <a:schemeClr val="accent1">
+              <a:hueOff val="0"/>
+              <a:satOff val="0"/>
+              <a:lumOff val="0"/>
+              <a:alphaOff val="0"/>
+            </a:schemeClr>
+          </a:solidFill>
+          <a:prstDash val="solid"/>
+        </a:ln>
+        <a:effectLst/>
+      </dsp:spPr>
+      <dsp:style>
+        <a:lnRef idx="2">
+          <a:scrgbClr r="0" g="0" b="0"/>
+        </a:lnRef>
+        <a:fillRef idx="1">
+          <a:scrgbClr r="0" g="0" b="0"/>
+        </a:fillRef>
+        <a:effectRef idx="0">
+          <a:scrgbClr r="0" g="0" b="0"/>
+        </a:effectRef>
+        <a:fontRef idx="minor">
+          <a:schemeClr val="lt1"/>
+        </a:fontRef>
+      </dsp:style>
+    </dsp:sp>
+    <dsp:sp modelId="{24B979A6-B208-475D-B160-2781C8806C1A}">
+      <dsp:nvSpPr>
+        <dsp:cNvPr id="0" name=""/>
+        <dsp:cNvSpPr/>
+      </dsp:nvSpPr>
+      <dsp:spPr>
+        <a:xfrm>
+          <a:off x="5600395" y="2179040"/>
+          <a:ext cx="174955" cy="174952"/>
+        </a:xfrm>
+        <a:prstGeom prst="ellipse">
+          <a:avLst/>
+        </a:prstGeom>
+        <a:solidFill>
+          <a:schemeClr val="accent1">
+            <a:hueOff val="0"/>
+            <a:satOff val="0"/>
+            <a:lumOff val="0"/>
+            <a:alphaOff val="0"/>
+          </a:schemeClr>
+        </a:solidFill>
+        <a:ln w="25400" cap="flat" cmpd="sng" algn="ctr">
+          <a:solidFill>
+            <a:schemeClr val="accent1">
+              <a:hueOff val="0"/>
+              <a:satOff val="0"/>
+              <a:lumOff val="0"/>
+              <a:alphaOff val="0"/>
+            </a:schemeClr>
+          </a:solidFill>
+          <a:prstDash val="solid"/>
+        </a:ln>
+        <a:effectLst/>
+      </dsp:spPr>
+      <dsp:style>
+        <a:lnRef idx="2">
+          <a:scrgbClr r="0" g="0" b="0"/>
+        </a:lnRef>
+        <a:fillRef idx="1">
+          <a:scrgbClr r="0" g="0" b="0"/>
+        </a:fillRef>
+        <a:effectRef idx="0">
+          <a:scrgbClr r="0" g="0" b="0"/>
+        </a:effectRef>
+        <a:fontRef idx="minor">
+          <a:schemeClr val="lt1"/>
+        </a:fontRef>
+      </dsp:style>
+    </dsp:sp>
+    <dsp:sp modelId="{924296ED-8C75-48CB-9626-593904B92C58}">
+      <dsp:nvSpPr>
+        <dsp:cNvPr id="0" name=""/>
+        <dsp:cNvSpPr/>
+      </dsp:nvSpPr>
+      <dsp:spPr>
+        <a:xfrm>
+          <a:off x="5279745" y="2179040"/>
+          <a:ext cx="174955" cy="174952"/>
+        </a:xfrm>
+        <a:prstGeom prst="ellipse">
+          <a:avLst/>
+        </a:prstGeom>
+        <a:solidFill>
+          <a:schemeClr val="accent1">
+            <a:hueOff val="0"/>
+            <a:satOff val="0"/>
+            <a:lumOff val="0"/>
+            <a:alphaOff val="0"/>
+          </a:schemeClr>
+        </a:solidFill>
+        <a:ln w="25400" cap="flat" cmpd="sng" algn="ctr">
+          <a:solidFill>
+            <a:schemeClr val="accent1">
+              <a:hueOff val="0"/>
+              <a:satOff val="0"/>
+              <a:lumOff val="0"/>
+              <a:alphaOff val="0"/>
+            </a:schemeClr>
+          </a:solidFill>
+          <a:prstDash val="solid"/>
+        </a:ln>
+        <a:effectLst/>
+      </dsp:spPr>
+      <dsp:style>
+        <a:lnRef idx="2">
+          <a:scrgbClr r="0" g="0" b="0"/>
+        </a:lnRef>
+        <a:fillRef idx="1">
+          <a:scrgbClr r="0" g="0" b="0"/>
+        </a:fillRef>
+        <a:effectRef idx="0">
+          <a:scrgbClr r="0" g="0" b="0"/>
+        </a:effectRef>
+        <a:fontRef idx="minor">
+          <a:schemeClr val="lt1"/>
+        </a:fontRef>
+      </dsp:style>
+    </dsp:sp>
+    <dsp:sp modelId="{F6C4B849-D477-4825-A5C9-458488C8189D}">
+      <dsp:nvSpPr>
+        <dsp:cNvPr id="0" name=""/>
+        <dsp:cNvSpPr/>
+      </dsp:nvSpPr>
+      <dsp:spPr>
+        <a:xfrm>
+          <a:off x="4959705" y="2179040"/>
+          <a:ext cx="174955" cy="174952"/>
+        </a:xfrm>
+        <a:prstGeom prst="ellipse">
+          <a:avLst/>
+        </a:prstGeom>
+        <a:solidFill>
+          <a:schemeClr val="accent1">
+            <a:hueOff val="0"/>
+            <a:satOff val="0"/>
+            <a:lumOff val="0"/>
+            <a:alphaOff val="0"/>
+          </a:schemeClr>
+        </a:solidFill>
+        <a:ln w="25400" cap="flat" cmpd="sng" algn="ctr">
+          <a:solidFill>
+            <a:schemeClr val="accent1">
+              <a:hueOff val="0"/>
+              <a:satOff val="0"/>
+              <a:lumOff val="0"/>
+              <a:alphaOff val="0"/>
+            </a:schemeClr>
+          </a:solidFill>
+          <a:prstDash val="solid"/>
+        </a:ln>
+        <a:effectLst/>
+      </dsp:spPr>
+      <dsp:style>
+        <a:lnRef idx="2">
+          <a:scrgbClr r="0" g="0" b="0"/>
+        </a:lnRef>
+        <a:fillRef idx="1">
+          <a:scrgbClr r="0" g="0" b="0"/>
+        </a:fillRef>
+        <a:effectRef idx="0">
+          <a:scrgbClr r="0" g="0" b="0"/>
+        </a:effectRef>
+        <a:fontRef idx="minor">
+          <a:schemeClr val="lt1"/>
+        </a:fontRef>
+      </dsp:style>
+    </dsp:sp>
+    <dsp:sp modelId="{EFB3D377-7B34-4DF0-9D5E-FE52B7446D4E}">
+      <dsp:nvSpPr>
+        <dsp:cNvPr id="0" name=""/>
+        <dsp:cNvSpPr/>
+      </dsp:nvSpPr>
+      <dsp:spPr>
+        <a:xfrm>
+          <a:off x="4639056" y="2179040"/>
+          <a:ext cx="174955" cy="174952"/>
+        </a:xfrm>
+        <a:prstGeom prst="ellipse">
+          <a:avLst/>
+        </a:prstGeom>
+        <a:solidFill>
+          <a:schemeClr val="accent1">
+            <a:hueOff val="0"/>
+            <a:satOff val="0"/>
+            <a:lumOff val="0"/>
+            <a:alphaOff val="0"/>
+          </a:schemeClr>
+        </a:solidFill>
+        <a:ln w="25400" cap="flat" cmpd="sng" algn="ctr">
+          <a:solidFill>
+            <a:schemeClr val="accent1">
+              <a:hueOff val="0"/>
+              <a:satOff val="0"/>
+              <a:lumOff val="0"/>
+              <a:alphaOff val="0"/>
+            </a:schemeClr>
+          </a:solidFill>
+          <a:prstDash val="solid"/>
+        </a:ln>
+        <a:effectLst/>
+      </dsp:spPr>
+      <dsp:style>
+        <a:lnRef idx="2">
+          <a:scrgbClr r="0" g="0" b="0"/>
+        </a:lnRef>
+        <a:fillRef idx="1">
+          <a:scrgbClr r="0" g="0" b="0"/>
+        </a:fillRef>
+        <a:effectRef idx="0">
+          <a:scrgbClr r="0" g="0" b="0"/>
+        </a:effectRef>
+        <a:fontRef idx="minor">
+          <a:schemeClr val="lt1"/>
+        </a:fontRef>
+      </dsp:style>
+    </dsp:sp>
+    <dsp:sp modelId="{9663AE31-D203-463D-B0E8-0ADB3E3EED3A}">
+      <dsp:nvSpPr>
+        <dsp:cNvPr id="0" name=""/>
+        <dsp:cNvSpPr/>
+      </dsp:nvSpPr>
+      <dsp:spPr>
+        <a:xfrm>
+          <a:off x="4143451" y="2091564"/>
+          <a:ext cx="349910" cy="350192"/>
+        </a:xfrm>
+        <a:prstGeom prst="ellipse">
+          <a:avLst/>
+        </a:prstGeom>
+        <a:solidFill>
+          <a:schemeClr val="accent1">
+            <a:hueOff val="0"/>
+            <a:satOff val="0"/>
+            <a:lumOff val="0"/>
+            <a:alphaOff val="0"/>
+          </a:schemeClr>
+        </a:solidFill>
+        <a:ln w="25400" cap="flat" cmpd="sng" algn="ctr">
+          <a:solidFill>
+            <a:schemeClr val="accent1">
+              <a:hueOff val="0"/>
+              <a:satOff val="0"/>
+              <a:lumOff val="0"/>
+              <a:alphaOff val="0"/>
+            </a:schemeClr>
+          </a:solidFill>
+          <a:prstDash val="solid"/>
+        </a:ln>
+        <a:effectLst/>
+      </dsp:spPr>
+      <dsp:style>
+        <a:lnRef idx="2">
+          <a:scrgbClr r="0" g="0" b="0"/>
+        </a:lnRef>
+        <a:fillRef idx="1">
+          <a:scrgbClr r="0" g="0" b="0"/>
+        </a:fillRef>
+        <a:effectRef idx="0">
+          <a:scrgbClr r="0" g="0" b="0"/>
+        </a:effectRef>
+        <a:fontRef idx="minor">
+          <a:schemeClr val="lt1"/>
+        </a:fontRef>
+      </dsp:style>
+    </dsp:sp>
+    <dsp:sp modelId="{D796DF2B-46CF-47E1-A697-73B8BB91A50E}">
+      <dsp:nvSpPr>
+        <dsp:cNvPr id="0" name=""/>
+        <dsp:cNvSpPr/>
+      </dsp:nvSpPr>
+      <dsp:spPr>
+        <a:xfrm>
+          <a:off x="5635752" y="1817625"/>
+          <a:ext cx="174955" cy="174952"/>
+        </a:xfrm>
+        <a:prstGeom prst="ellipse">
+          <a:avLst/>
+        </a:prstGeom>
+        <a:solidFill>
+          <a:schemeClr val="accent1">
+            <a:hueOff val="0"/>
+            <a:satOff val="0"/>
+            <a:lumOff val="0"/>
+            <a:alphaOff val="0"/>
+          </a:schemeClr>
+        </a:solidFill>
+        <a:ln w="25400" cap="flat" cmpd="sng" algn="ctr">
+          <a:solidFill>
+            <a:schemeClr val="accent1">
+              <a:hueOff val="0"/>
+              <a:satOff val="0"/>
+              <a:lumOff val="0"/>
+              <a:alphaOff val="0"/>
+            </a:schemeClr>
+          </a:solidFill>
+          <a:prstDash val="solid"/>
+        </a:ln>
+        <a:effectLst/>
+      </dsp:spPr>
+      <dsp:style>
+        <a:lnRef idx="2">
+          <a:scrgbClr r="0" g="0" b="0"/>
+        </a:lnRef>
+        <a:fillRef idx="1">
+          <a:scrgbClr r="0" g="0" b="0"/>
+        </a:fillRef>
+        <a:effectRef idx="0">
+          <a:scrgbClr r="0" g="0" b="0"/>
+        </a:effectRef>
+        <a:fontRef idx="minor">
+          <a:schemeClr val="lt1"/>
+        </a:fontRef>
+      </dsp:style>
+    </dsp:sp>
+    <dsp:sp modelId="{D98CC950-624E-407F-949E-58C3FABF5F61}">
+      <dsp:nvSpPr>
+        <dsp:cNvPr id="0" name=""/>
+        <dsp:cNvSpPr/>
+      </dsp:nvSpPr>
+      <dsp:spPr>
+        <a:xfrm>
+          <a:off x="5635752" y="2543045"/>
+          <a:ext cx="174955" cy="174952"/>
+        </a:xfrm>
+        <a:prstGeom prst="ellipse">
+          <a:avLst/>
+        </a:prstGeom>
+        <a:solidFill>
+          <a:schemeClr val="accent1">
+            <a:hueOff val="0"/>
+            <a:satOff val="0"/>
+            <a:lumOff val="0"/>
+            <a:alphaOff val="0"/>
+          </a:schemeClr>
+        </a:solidFill>
+        <a:ln w="25400" cap="flat" cmpd="sng" algn="ctr">
+          <a:solidFill>
+            <a:schemeClr val="accent1">
+              <a:hueOff val="0"/>
+              <a:satOff val="0"/>
+              <a:lumOff val="0"/>
+              <a:alphaOff val="0"/>
+            </a:schemeClr>
+          </a:solidFill>
+          <a:prstDash val="solid"/>
+        </a:ln>
+        <a:effectLst/>
+      </dsp:spPr>
+      <dsp:style>
+        <a:lnRef idx="2">
+          <a:scrgbClr r="0" g="0" b="0"/>
+        </a:lnRef>
+        <a:fillRef idx="1">
+          <a:scrgbClr r="0" g="0" b="0"/>
+        </a:fillRef>
+        <a:effectRef idx="0">
+          <a:scrgbClr r="0" g="0" b="0"/>
+        </a:effectRef>
+        <a:fontRef idx="minor">
+          <a:schemeClr val="lt1"/>
+        </a:fontRef>
+      </dsp:style>
+    </dsp:sp>
+    <dsp:sp modelId="{3F6C78E2-8E9C-4489-9FF3-B304ABD248BA}">
+      <dsp:nvSpPr>
+        <dsp:cNvPr id="0" name=""/>
+        <dsp:cNvSpPr/>
+      </dsp:nvSpPr>
+      <dsp:spPr>
+        <a:xfrm>
+          <a:off x="5791809" y="1974737"/>
+          <a:ext cx="174955" cy="174952"/>
+        </a:xfrm>
+        <a:prstGeom prst="ellipse">
+          <a:avLst/>
+        </a:prstGeom>
+        <a:solidFill>
+          <a:schemeClr val="accent1">
+            <a:hueOff val="0"/>
+            <a:satOff val="0"/>
+            <a:lumOff val="0"/>
+            <a:alphaOff val="0"/>
+          </a:schemeClr>
+        </a:solidFill>
+        <a:ln w="25400" cap="flat" cmpd="sng" algn="ctr">
+          <a:solidFill>
+            <a:schemeClr val="accent1">
+              <a:hueOff val="0"/>
+              <a:satOff val="0"/>
+              <a:lumOff val="0"/>
+              <a:alphaOff val="0"/>
+            </a:schemeClr>
+          </a:solidFill>
+          <a:prstDash val="solid"/>
+        </a:ln>
+        <a:effectLst/>
+      </dsp:spPr>
+      <dsp:style>
+        <a:lnRef idx="2">
+          <a:scrgbClr r="0" g="0" b="0"/>
+        </a:lnRef>
+        <a:fillRef idx="1">
+          <a:scrgbClr r="0" g="0" b="0"/>
+        </a:fillRef>
+        <a:effectRef idx="0">
+          <a:scrgbClr r="0" g="0" b="0"/>
+        </a:effectRef>
+        <a:fontRef idx="minor">
+          <a:schemeClr val="lt1"/>
+        </a:fontRef>
+      </dsp:style>
+    </dsp:sp>
+    <dsp:sp modelId="{43443363-FF73-4056-9BE0-9C981662E2F1}">
+      <dsp:nvSpPr>
+        <dsp:cNvPr id="0" name=""/>
+        <dsp:cNvSpPr/>
+      </dsp:nvSpPr>
+      <dsp:spPr>
+        <a:xfrm>
+          <a:off x="5802172" y="2386796"/>
+          <a:ext cx="174955" cy="174952"/>
+        </a:xfrm>
+        <a:prstGeom prst="ellipse">
+          <a:avLst/>
+        </a:prstGeom>
+        <a:solidFill>
+          <a:schemeClr val="accent1">
+            <a:hueOff val="0"/>
+            <a:satOff val="0"/>
+            <a:lumOff val="0"/>
+            <a:alphaOff val="0"/>
+          </a:schemeClr>
+        </a:solidFill>
+        <a:ln w="25400" cap="flat" cmpd="sng" algn="ctr">
+          <a:solidFill>
+            <a:schemeClr val="accent1">
+              <a:hueOff val="0"/>
+              <a:satOff val="0"/>
+              <a:lumOff val="0"/>
+              <a:alphaOff val="0"/>
+            </a:schemeClr>
+          </a:solidFill>
+          <a:prstDash val="solid"/>
+        </a:ln>
+        <a:effectLst/>
+      </dsp:spPr>
+      <dsp:style>
+        <a:lnRef idx="2">
+          <a:scrgbClr r="0" g="0" b="0"/>
+        </a:lnRef>
+        <a:fillRef idx="1">
+          <a:scrgbClr r="0" g="0" b="0"/>
+        </a:fillRef>
+        <a:effectRef idx="0">
+          <a:scrgbClr r="0" g="0" b="0"/>
+        </a:effectRef>
+        <a:fontRef idx="minor">
+          <a:schemeClr val="lt1"/>
+        </a:fontRef>
+      </dsp:style>
+    </dsp:sp>
+    <dsp:sp modelId="{FE8ADDBD-AE7C-4F88-9D69-EE22066B3EB4}">
+      <dsp:nvSpPr>
+        <dsp:cNvPr id="0" name=""/>
+        <dsp:cNvSpPr/>
+      </dsp:nvSpPr>
+      <dsp:spPr>
+        <a:xfrm>
+          <a:off x="2226868" y="1380820"/>
+          <a:ext cx="1771497" cy="1771681"/>
+        </a:xfrm>
+        <a:prstGeom prst="ellipse">
+          <a:avLst/>
+        </a:prstGeom>
+        <a:solidFill>
+          <a:schemeClr val="accent1">
+            <a:hueOff val="0"/>
+            <a:satOff val="0"/>
+            <a:lumOff val="0"/>
+            <a:alphaOff val="0"/>
+          </a:schemeClr>
+        </a:solidFill>
+        <a:ln w="25400" cap="flat" cmpd="sng" algn="ctr">
+          <a:solidFill>
+            <a:schemeClr val="accent1">
+              <a:hueOff val="0"/>
+              <a:satOff val="0"/>
+              <a:lumOff val="0"/>
+              <a:alphaOff val="0"/>
+            </a:schemeClr>
+          </a:solidFill>
+          <a:prstDash val="solid"/>
+        </a:ln>
+        <a:effectLst/>
+      </dsp:spPr>
+      <dsp:style>
+        <a:lnRef idx="2">
+          <a:scrgbClr r="0" g="0" b="0"/>
+        </a:lnRef>
+        <a:fillRef idx="1">
+          <a:scrgbClr r="0" g="0" b="0"/>
+        </a:fillRef>
+        <a:effectRef idx="0">
+          <a:scrgbClr r="0" g="0" b="0"/>
+        </a:effectRef>
+        <a:fontRef idx="minor">
+          <a:schemeClr val="lt1"/>
+        </a:fontRef>
+      </dsp:style>
+      <dsp:txBody>
+        <a:bodyPr spcFirstLastPara="0" vert="horz" wrap="square" lIns="26670" tIns="26670" rIns="26670" bIns="26670" numCol="1" spcCol="1270" anchor="ctr" anchorCtr="0">
+          <a:noAutofit/>
+        </a:bodyPr>
+        <a:lstStyle/>
+        <a:p>
+          <a:pPr lvl="0" algn="ctr" defTabSz="933450">
+            <a:lnSpc>
+              <a:spcPct val="90000"/>
+            </a:lnSpc>
+            <a:spcBef>
+              <a:spcPct val="0"/>
+            </a:spcBef>
+            <a:spcAft>
+              <a:spcPct val="35000"/>
+            </a:spcAft>
+          </a:pPr>
+          <a:r>
+            <a:rPr lang="en-US" sz="2100" kern="1200" dirty="0" smtClean="0"/>
+            <a:t>Dashboard</a:t>
+          </a:r>
+          <a:endParaRPr lang="nl-NL" sz="2100" kern="1200" dirty="0"/>
+        </a:p>
+      </dsp:txBody>
+      <dsp:txXfrm>
+        <a:off x="2486298" y="1640277"/>
+        <a:ext cx="1252637" cy="1252767"/>
+      </dsp:txXfrm>
+    </dsp:sp>
+    <dsp:sp modelId="{42B92DFB-23E2-4426-A3C7-B81C964B6868}">
+      <dsp:nvSpPr>
+        <dsp:cNvPr id="0" name=""/>
+        <dsp:cNvSpPr/>
+      </dsp:nvSpPr>
+      <dsp:spPr>
+        <a:xfrm>
+          <a:off x="2094585" y="1229463"/>
+          <a:ext cx="349910" cy="350192"/>
+        </a:xfrm>
+        <a:prstGeom prst="ellipse">
+          <a:avLst/>
+        </a:prstGeom>
+        <a:solidFill>
+          <a:schemeClr val="accent1">
+            <a:hueOff val="0"/>
+            <a:satOff val="0"/>
+            <a:lumOff val="0"/>
+            <a:alphaOff val="0"/>
+          </a:schemeClr>
+        </a:solidFill>
+        <a:ln w="25400" cap="flat" cmpd="sng" algn="ctr">
+          <a:solidFill>
+            <a:schemeClr val="accent1">
+              <a:hueOff val="0"/>
+              <a:satOff val="0"/>
+              <a:lumOff val="0"/>
+              <a:alphaOff val="0"/>
+            </a:schemeClr>
+          </a:solidFill>
+          <a:prstDash val="solid"/>
+        </a:ln>
+        <a:effectLst/>
+      </dsp:spPr>
+      <dsp:style>
+        <a:lnRef idx="2">
+          <a:scrgbClr r="0" g="0" b="0"/>
+        </a:lnRef>
+        <a:fillRef idx="1">
+          <a:scrgbClr r="0" g="0" b="0"/>
+        </a:fillRef>
+        <a:effectRef idx="0">
+          <a:scrgbClr r="0" g="0" b="0"/>
+        </a:effectRef>
+        <a:fontRef idx="minor">
+          <a:schemeClr val="lt1"/>
+        </a:fontRef>
+      </dsp:style>
+    </dsp:sp>
+    <dsp:sp modelId="{AC10DCC2-C73B-41DE-A332-6D26A393474B}">
+      <dsp:nvSpPr>
+        <dsp:cNvPr id="0" name=""/>
+        <dsp:cNvSpPr/>
+      </dsp:nvSpPr>
+      <dsp:spPr>
+        <a:xfrm>
+          <a:off x="1870252" y="1044727"/>
+          <a:ext cx="174955" cy="174952"/>
+        </a:xfrm>
+        <a:prstGeom prst="ellipse">
+          <a:avLst/>
+        </a:prstGeom>
+        <a:solidFill>
+          <a:schemeClr val="accent1">
+            <a:hueOff val="0"/>
+            <a:satOff val="0"/>
+            <a:lumOff val="0"/>
+            <a:alphaOff val="0"/>
+          </a:schemeClr>
+        </a:solidFill>
+        <a:ln w="25400" cap="flat" cmpd="sng" algn="ctr">
+          <a:solidFill>
+            <a:schemeClr val="accent1">
+              <a:hueOff val="0"/>
+              <a:satOff val="0"/>
+              <a:lumOff val="0"/>
+              <a:alphaOff val="0"/>
+            </a:schemeClr>
+          </a:solidFill>
+          <a:prstDash val="solid"/>
+        </a:ln>
+        <a:effectLst/>
+      </dsp:spPr>
+      <dsp:style>
+        <a:lnRef idx="2">
+          <a:scrgbClr r="0" g="0" b="0"/>
+        </a:lnRef>
+        <a:fillRef idx="1">
+          <a:scrgbClr r="0" g="0" b="0"/>
+        </a:fillRef>
+        <a:effectRef idx="0">
+          <a:scrgbClr r="0" g="0" b="0"/>
+        </a:effectRef>
+        <a:fontRef idx="minor">
+          <a:schemeClr val="lt1"/>
+        </a:fontRef>
+      </dsp:style>
+    </dsp:sp>
+    <dsp:sp modelId="{81DB3B92-9940-4E01-832E-B4A0F9509294}">
+      <dsp:nvSpPr>
+        <dsp:cNvPr id="0" name=""/>
+        <dsp:cNvSpPr/>
+      </dsp:nvSpPr>
+      <dsp:spPr>
+        <a:xfrm>
+          <a:off x="1496568" y="1044727"/>
+          <a:ext cx="174955" cy="174952"/>
+        </a:xfrm>
+        <a:prstGeom prst="ellipse">
+          <a:avLst/>
+        </a:prstGeom>
+        <a:solidFill>
+          <a:schemeClr val="accent1">
+            <a:hueOff val="0"/>
+            <a:satOff val="0"/>
+            <a:lumOff val="0"/>
+            <a:alphaOff val="0"/>
+          </a:schemeClr>
+        </a:solidFill>
+        <a:ln w="25400" cap="flat" cmpd="sng" algn="ctr">
+          <a:solidFill>
+            <a:schemeClr val="accent1">
+              <a:hueOff val="0"/>
+              <a:satOff val="0"/>
+              <a:lumOff val="0"/>
+              <a:alphaOff val="0"/>
+            </a:schemeClr>
+          </a:solidFill>
+          <a:prstDash val="solid"/>
+        </a:ln>
+        <a:effectLst/>
+      </dsp:spPr>
+      <dsp:style>
+        <a:lnRef idx="2">
+          <a:scrgbClr r="0" g="0" b="0"/>
+        </a:lnRef>
+        <a:fillRef idx="1">
+          <a:scrgbClr r="0" g="0" b="0"/>
+        </a:fillRef>
+        <a:effectRef idx="0">
+          <a:scrgbClr r="0" g="0" b="0"/>
+        </a:effectRef>
+        <a:fontRef idx="minor">
+          <a:schemeClr val="lt1"/>
+        </a:fontRef>
+      </dsp:style>
+    </dsp:sp>
+    <dsp:sp modelId="{D24A4C1A-4DBB-42C8-BB64-FD9F5D5E7713}">
+      <dsp:nvSpPr>
+        <dsp:cNvPr id="0" name=""/>
+        <dsp:cNvSpPr/>
+      </dsp:nvSpPr>
+      <dsp:spPr>
+        <a:xfrm>
+          <a:off x="1122883" y="1044727"/>
+          <a:ext cx="174955" cy="174952"/>
+        </a:xfrm>
+        <a:prstGeom prst="ellipse">
+          <a:avLst/>
+        </a:prstGeom>
+        <a:solidFill>
+          <a:schemeClr val="accent1">
+            <a:hueOff val="0"/>
+            <a:satOff val="0"/>
+            <a:lumOff val="0"/>
+            <a:alphaOff val="0"/>
+          </a:schemeClr>
+        </a:solidFill>
+        <a:ln w="25400" cap="flat" cmpd="sng" algn="ctr">
+          <a:solidFill>
+            <a:schemeClr val="accent1">
+              <a:hueOff val="0"/>
+              <a:satOff val="0"/>
+              <a:lumOff val="0"/>
+              <a:alphaOff val="0"/>
+            </a:schemeClr>
+          </a:solidFill>
+          <a:prstDash val="solid"/>
+        </a:ln>
+        <a:effectLst/>
+      </dsp:spPr>
+      <dsp:style>
+        <a:lnRef idx="2">
+          <a:scrgbClr r="0" g="0" b="0"/>
+        </a:lnRef>
+        <a:fillRef idx="1">
+          <a:scrgbClr r="0" g="0" b="0"/>
+        </a:fillRef>
+        <a:effectRef idx="0">
+          <a:scrgbClr r="0" g="0" b="0"/>
+        </a:effectRef>
+        <a:fontRef idx="minor">
+          <a:schemeClr val="lt1"/>
+        </a:fontRef>
+      </dsp:style>
+    </dsp:sp>
+    <dsp:sp modelId="{9E373060-98F2-4DB3-B18D-A0715B652954}">
+      <dsp:nvSpPr>
+        <dsp:cNvPr id="0" name=""/>
+        <dsp:cNvSpPr/>
+      </dsp:nvSpPr>
+      <dsp:spPr>
+        <a:xfrm>
+          <a:off x="749198" y="1044727"/>
+          <a:ext cx="174955" cy="174952"/>
+        </a:xfrm>
+        <a:prstGeom prst="ellipse">
+          <a:avLst/>
+        </a:prstGeom>
+        <a:solidFill>
+          <a:schemeClr val="accent1">
+            <a:hueOff val="0"/>
+            <a:satOff val="0"/>
+            <a:lumOff val="0"/>
+            <a:alphaOff val="0"/>
+          </a:schemeClr>
+        </a:solidFill>
+        <a:ln w="25400" cap="flat" cmpd="sng" algn="ctr">
+          <a:solidFill>
+            <a:schemeClr val="accent1">
+              <a:hueOff val="0"/>
+              <a:satOff val="0"/>
+              <a:lumOff val="0"/>
+              <a:alphaOff val="0"/>
+            </a:schemeClr>
+          </a:solidFill>
+          <a:prstDash val="solid"/>
+        </a:ln>
+        <a:effectLst/>
+      </dsp:spPr>
+      <dsp:style>
+        <a:lnRef idx="2">
+          <a:scrgbClr r="0" g="0" b="0"/>
+        </a:lnRef>
+        <a:fillRef idx="1">
+          <a:scrgbClr r="0" g="0" b="0"/>
+        </a:fillRef>
+        <a:effectRef idx="0">
+          <a:scrgbClr r="0" g="0" b="0"/>
+        </a:effectRef>
+        <a:fontRef idx="minor">
+          <a:schemeClr val="lt1"/>
+        </a:fontRef>
+      </dsp:style>
+    </dsp:sp>
+    <dsp:sp modelId="{465197CF-44BD-4408-9EE4-50E3CDB85F69}">
+      <dsp:nvSpPr>
+        <dsp:cNvPr id="0" name=""/>
+        <dsp:cNvSpPr/>
+      </dsp:nvSpPr>
+      <dsp:spPr>
+        <a:xfrm>
+          <a:off x="374904" y="1044727"/>
+          <a:ext cx="174955" cy="174952"/>
+        </a:xfrm>
+        <a:prstGeom prst="ellipse">
+          <a:avLst/>
+        </a:prstGeom>
+        <a:solidFill>
+          <a:schemeClr val="accent1">
+            <a:hueOff val="0"/>
+            <a:satOff val="0"/>
+            <a:lumOff val="0"/>
+            <a:alphaOff val="0"/>
+          </a:schemeClr>
+        </a:solidFill>
+        <a:ln w="25400" cap="flat" cmpd="sng" algn="ctr">
+          <a:solidFill>
+            <a:schemeClr val="accent1">
+              <a:hueOff val="0"/>
+              <a:satOff val="0"/>
+              <a:lumOff val="0"/>
+              <a:alphaOff val="0"/>
+            </a:schemeClr>
+          </a:solidFill>
+          <a:prstDash val="solid"/>
+        </a:ln>
+        <a:effectLst/>
+      </dsp:spPr>
+      <dsp:style>
+        <a:lnRef idx="2">
+          <a:scrgbClr r="0" g="0" b="0"/>
+        </a:lnRef>
+        <a:fillRef idx="1">
+          <a:scrgbClr r="0" g="0" b="0"/>
+        </a:fillRef>
+        <a:effectRef idx="0">
+          <a:scrgbClr r="0" g="0" b="0"/>
+        </a:effectRef>
+        <a:fontRef idx="minor">
+          <a:schemeClr val="lt1"/>
+        </a:fontRef>
+      </dsp:style>
+    </dsp:sp>
+    <dsp:sp modelId="{744C965E-C9A9-4668-BA15-5F3979E52EB7}">
+      <dsp:nvSpPr>
+        <dsp:cNvPr id="0" name=""/>
+        <dsp:cNvSpPr/>
+      </dsp:nvSpPr>
+      <dsp:spPr>
+        <a:xfrm>
+          <a:off x="1219" y="1044727"/>
+          <a:ext cx="174955" cy="174952"/>
+        </a:xfrm>
+        <a:prstGeom prst="ellipse">
+          <a:avLst/>
+        </a:prstGeom>
+        <a:solidFill>
+          <a:schemeClr val="accent1">
+            <a:hueOff val="0"/>
+            <a:satOff val="0"/>
+            <a:lumOff val="0"/>
+            <a:alphaOff val="0"/>
+          </a:schemeClr>
+        </a:solidFill>
+        <a:ln w="25400" cap="flat" cmpd="sng" algn="ctr">
+          <a:solidFill>
+            <a:schemeClr val="accent1">
+              <a:hueOff val="0"/>
+              <a:satOff val="0"/>
+              <a:lumOff val="0"/>
+              <a:alphaOff val="0"/>
+            </a:schemeClr>
+          </a:solidFill>
+          <a:prstDash val="solid"/>
+        </a:ln>
+        <a:effectLst/>
+      </dsp:spPr>
+      <dsp:style>
+        <a:lnRef idx="2">
+          <a:scrgbClr r="0" g="0" b="0"/>
+        </a:lnRef>
+        <a:fillRef idx="1">
+          <a:scrgbClr r="0" g="0" b="0"/>
+        </a:fillRef>
+        <a:effectRef idx="0">
+          <a:scrgbClr r="0" g="0" b="0"/>
+        </a:effectRef>
+        <a:fontRef idx="minor">
+          <a:schemeClr val="lt1"/>
+        </a:fontRef>
+      </dsp:style>
+    </dsp:sp>
+    <dsp:sp modelId="{43DB5D80-8976-4381-91FF-CBEC941B2256}">
+      <dsp:nvSpPr>
+        <dsp:cNvPr id="0" name=""/>
+        <dsp:cNvSpPr/>
+      </dsp:nvSpPr>
+      <dsp:spPr>
+        <a:xfrm>
+          <a:off x="0" y="593246"/>
+          <a:ext cx="2050694" cy="450042"/>
+        </a:xfrm>
+        <a:prstGeom prst="rect">
+          <a:avLst/>
+        </a:prstGeom>
+        <a:noFill/>
+        <a:ln>
+          <a:noFill/>
+        </a:ln>
+        <a:effectLst/>
+      </dsp:spPr>
+      <dsp:style>
+        <a:lnRef idx="0">
+          <a:scrgbClr r="0" g="0" b="0"/>
+        </a:lnRef>
+        <a:fillRef idx="0">
+          <a:scrgbClr r="0" g="0" b="0"/>
+        </a:fillRef>
+        <a:effectRef idx="0">
+          <a:scrgbClr r="0" g="0" b="0"/>
+        </a:effectRef>
+        <a:fontRef idx="minor"/>
+      </dsp:style>
+      <dsp:txBody>
+        <a:bodyPr spcFirstLastPara="0" vert="horz" wrap="square" lIns="0" tIns="0" rIns="0" bIns="0" numCol="1" spcCol="1270" anchor="b" anchorCtr="0">
+          <a:noAutofit/>
+        </a:bodyPr>
+        <a:lstStyle/>
+        <a:p>
+          <a:pPr lvl="0" algn="l" defTabSz="933450">
+            <a:lnSpc>
+              <a:spcPct val="90000"/>
+            </a:lnSpc>
+            <a:spcBef>
+              <a:spcPct val="0"/>
+            </a:spcBef>
+            <a:spcAft>
+              <a:spcPct val="35000"/>
+            </a:spcAft>
+          </a:pPr>
+          <a:r>
+            <a:rPr lang="en-US" sz="2100" kern="1200" dirty="0" err="1" smtClean="0">
+              <a:solidFill>
+                <a:schemeClr val="bg1"/>
+              </a:solidFill>
+            </a:rPr>
+            <a:t>Groep</a:t>
+          </a:r>
+          <a:r>
+            <a:rPr lang="en-US" sz="2100" kern="1200" dirty="0" smtClean="0">
+              <a:solidFill>
+                <a:schemeClr val="bg1"/>
+              </a:solidFill>
+            </a:rPr>
+            <a:t> 1</a:t>
+          </a:r>
+          <a:endParaRPr lang="nl-NL" sz="2100" kern="1200" dirty="0">
+            <a:solidFill>
+              <a:schemeClr val="bg1"/>
+            </a:solidFill>
+          </a:endParaRPr>
+        </a:p>
+      </dsp:txBody>
+      <dsp:txXfrm>
+        <a:off x="0" y="593246"/>
+        <a:ext cx="2050694" cy="450042"/>
+      </dsp:txXfrm>
+    </dsp:sp>
+    <dsp:sp modelId="{170DFC02-5FD5-4939-932D-B31E9D41551B}">
+      <dsp:nvSpPr>
+        <dsp:cNvPr id="0" name=""/>
+        <dsp:cNvSpPr/>
+      </dsp:nvSpPr>
+      <dsp:spPr>
+        <a:xfrm>
+          <a:off x="1731264" y="2091564"/>
+          <a:ext cx="349910" cy="350192"/>
+        </a:xfrm>
+        <a:prstGeom prst="ellipse">
+          <a:avLst/>
+        </a:prstGeom>
+        <a:solidFill>
+          <a:schemeClr val="accent1">
+            <a:hueOff val="0"/>
+            <a:satOff val="0"/>
+            <a:lumOff val="0"/>
+            <a:alphaOff val="0"/>
+          </a:schemeClr>
+        </a:solidFill>
+        <a:ln w="25400" cap="flat" cmpd="sng" algn="ctr">
+          <a:solidFill>
+            <a:schemeClr val="accent1">
+              <a:hueOff val="0"/>
+              <a:satOff val="0"/>
+              <a:lumOff val="0"/>
+              <a:alphaOff val="0"/>
+            </a:schemeClr>
+          </a:solidFill>
+          <a:prstDash val="solid"/>
+        </a:ln>
+        <a:effectLst/>
+      </dsp:spPr>
+      <dsp:style>
+        <a:lnRef idx="2">
+          <a:scrgbClr r="0" g="0" b="0"/>
+        </a:lnRef>
+        <a:fillRef idx="1">
+          <a:scrgbClr r="0" g="0" b="0"/>
+        </a:fillRef>
+        <a:effectRef idx="0">
+          <a:scrgbClr r="0" g="0" b="0"/>
+        </a:effectRef>
+        <a:fontRef idx="minor">
+          <a:schemeClr val="lt1"/>
+        </a:fontRef>
+      </dsp:style>
+    </dsp:sp>
+    <dsp:sp modelId="{274877CC-D2A6-4630-A881-F16C3BA8E592}">
+      <dsp:nvSpPr>
+        <dsp:cNvPr id="0" name=""/>
+        <dsp:cNvSpPr/>
+      </dsp:nvSpPr>
+      <dsp:spPr>
+        <a:xfrm>
+          <a:off x="1385011" y="2179040"/>
+          <a:ext cx="174955" cy="174952"/>
+        </a:xfrm>
+        <a:prstGeom prst="ellipse">
+          <a:avLst/>
+        </a:prstGeom>
+        <a:solidFill>
+          <a:schemeClr val="accent1">
+            <a:hueOff val="0"/>
+            <a:satOff val="0"/>
+            <a:lumOff val="0"/>
+            <a:alphaOff val="0"/>
+          </a:schemeClr>
+        </a:solidFill>
+        <a:ln w="25400" cap="flat" cmpd="sng" algn="ctr">
+          <a:solidFill>
+            <a:schemeClr val="accent1">
+              <a:hueOff val="0"/>
+              <a:satOff val="0"/>
+              <a:lumOff val="0"/>
+              <a:alphaOff val="0"/>
+            </a:schemeClr>
+          </a:solidFill>
+          <a:prstDash val="solid"/>
+        </a:ln>
+        <a:effectLst/>
+      </dsp:spPr>
+      <dsp:style>
+        <a:lnRef idx="2">
+          <a:scrgbClr r="0" g="0" b="0"/>
+        </a:lnRef>
+        <a:fillRef idx="1">
+          <a:scrgbClr r="0" g="0" b="0"/>
+        </a:fillRef>
+        <a:effectRef idx="0">
+          <a:scrgbClr r="0" g="0" b="0"/>
+        </a:effectRef>
+        <a:fontRef idx="minor">
+          <a:schemeClr val="lt1"/>
+        </a:fontRef>
+      </dsp:style>
+    </dsp:sp>
+    <dsp:sp modelId="{5F1EB30C-D8A9-4A61-AA6D-06450E9764D9}">
+      <dsp:nvSpPr>
+        <dsp:cNvPr id="0" name=""/>
+        <dsp:cNvSpPr/>
+      </dsp:nvSpPr>
+      <dsp:spPr>
+        <a:xfrm>
+          <a:off x="1039368" y="2179040"/>
+          <a:ext cx="174955" cy="174952"/>
+        </a:xfrm>
+        <a:prstGeom prst="ellipse">
+          <a:avLst/>
+        </a:prstGeom>
+        <a:solidFill>
+          <a:schemeClr val="accent1">
+            <a:hueOff val="0"/>
+            <a:satOff val="0"/>
+            <a:lumOff val="0"/>
+            <a:alphaOff val="0"/>
+          </a:schemeClr>
+        </a:solidFill>
+        <a:ln w="25400" cap="flat" cmpd="sng" algn="ctr">
+          <a:solidFill>
+            <a:schemeClr val="accent1">
+              <a:hueOff val="0"/>
+              <a:satOff val="0"/>
+              <a:lumOff val="0"/>
+              <a:alphaOff val="0"/>
+            </a:schemeClr>
+          </a:solidFill>
+          <a:prstDash val="solid"/>
+        </a:ln>
+        <a:effectLst/>
+      </dsp:spPr>
+      <dsp:style>
+        <a:lnRef idx="2">
+          <a:scrgbClr r="0" g="0" b="0"/>
+        </a:lnRef>
+        <a:fillRef idx="1">
+          <a:scrgbClr r="0" g="0" b="0"/>
+        </a:fillRef>
+        <a:effectRef idx="0">
+          <a:scrgbClr r="0" g="0" b="0"/>
+        </a:effectRef>
+        <a:fontRef idx="minor">
+          <a:schemeClr val="lt1"/>
+        </a:fontRef>
+      </dsp:style>
+    </dsp:sp>
+    <dsp:sp modelId="{01CB21BE-9E3B-449B-9180-580F275EB109}">
+      <dsp:nvSpPr>
+        <dsp:cNvPr id="0" name=""/>
+        <dsp:cNvSpPr/>
+      </dsp:nvSpPr>
+      <dsp:spPr>
+        <a:xfrm>
+          <a:off x="693115" y="2179040"/>
+          <a:ext cx="174955" cy="174952"/>
+        </a:xfrm>
+        <a:prstGeom prst="ellipse">
+          <a:avLst/>
+        </a:prstGeom>
+        <a:solidFill>
+          <a:schemeClr val="accent1">
+            <a:hueOff val="0"/>
+            <a:satOff val="0"/>
+            <a:lumOff val="0"/>
+            <a:alphaOff val="0"/>
+          </a:schemeClr>
+        </a:solidFill>
+        <a:ln w="25400" cap="flat" cmpd="sng" algn="ctr">
+          <a:solidFill>
+            <a:schemeClr val="accent1">
+              <a:hueOff val="0"/>
+              <a:satOff val="0"/>
+              <a:lumOff val="0"/>
+              <a:alphaOff val="0"/>
+            </a:schemeClr>
+          </a:solidFill>
+          <a:prstDash val="solid"/>
+        </a:ln>
+        <a:effectLst/>
+      </dsp:spPr>
+      <dsp:style>
+        <a:lnRef idx="2">
+          <a:scrgbClr r="0" g="0" b="0"/>
+        </a:lnRef>
+        <a:fillRef idx="1">
+          <a:scrgbClr r="0" g="0" b="0"/>
+        </a:fillRef>
+        <a:effectRef idx="0">
+          <a:scrgbClr r="0" g="0" b="0"/>
+        </a:effectRef>
+        <a:fontRef idx="minor">
+          <a:schemeClr val="lt1"/>
+        </a:fontRef>
+      </dsp:style>
+    </dsp:sp>
+    <dsp:sp modelId="{FD02767C-038B-46FB-9BF4-A4F15041AA08}">
+      <dsp:nvSpPr>
+        <dsp:cNvPr id="0" name=""/>
+        <dsp:cNvSpPr/>
+      </dsp:nvSpPr>
+      <dsp:spPr>
+        <a:xfrm>
+          <a:off x="347472" y="2179040"/>
+          <a:ext cx="174955" cy="174952"/>
+        </a:xfrm>
+        <a:prstGeom prst="ellipse">
+          <a:avLst/>
+        </a:prstGeom>
+        <a:solidFill>
+          <a:schemeClr val="accent1">
+            <a:hueOff val="0"/>
+            <a:satOff val="0"/>
+            <a:lumOff val="0"/>
+            <a:alphaOff val="0"/>
+          </a:schemeClr>
+        </a:solidFill>
+        <a:ln w="25400" cap="flat" cmpd="sng" algn="ctr">
+          <a:solidFill>
+            <a:schemeClr val="accent1">
+              <a:hueOff val="0"/>
+              <a:satOff val="0"/>
+              <a:lumOff val="0"/>
+              <a:alphaOff val="0"/>
+            </a:schemeClr>
+          </a:solidFill>
+          <a:prstDash val="solid"/>
+        </a:ln>
+        <a:effectLst/>
+      </dsp:spPr>
+      <dsp:style>
+        <a:lnRef idx="2">
+          <a:scrgbClr r="0" g="0" b="0"/>
+        </a:lnRef>
+        <a:fillRef idx="1">
+          <a:scrgbClr r="0" g="0" b="0"/>
+        </a:fillRef>
+        <a:effectRef idx="0">
+          <a:scrgbClr r="0" g="0" b="0"/>
+        </a:effectRef>
+        <a:fontRef idx="minor">
+          <a:schemeClr val="lt1"/>
+        </a:fontRef>
+      </dsp:style>
+    </dsp:sp>
+    <dsp:sp modelId="{55780283-2ECB-4133-BFB8-0078BC02CD62}">
+      <dsp:nvSpPr>
+        <dsp:cNvPr id="0" name=""/>
+        <dsp:cNvSpPr/>
+      </dsp:nvSpPr>
+      <dsp:spPr>
+        <a:xfrm>
+          <a:off x="1219" y="2179040"/>
+          <a:ext cx="174955" cy="174952"/>
+        </a:xfrm>
+        <a:prstGeom prst="ellipse">
+          <a:avLst/>
+        </a:prstGeom>
+        <a:solidFill>
+          <a:schemeClr val="accent1">
+            <a:hueOff val="0"/>
+            <a:satOff val="0"/>
+            <a:lumOff val="0"/>
+            <a:alphaOff val="0"/>
+          </a:schemeClr>
+        </a:solidFill>
+        <a:ln w="25400" cap="flat" cmpd="sng" algn="ctr">
+          <a:solidFill>
+            <a:schemeClr val="accent1">
+              <a:hueOff val="0"/>
+              <a:satOff val="0"/>
+              <a:lumOff val="0"/>
+              <a:alphaOff val="0"/>
+            </a:schemeClr>
+          </a:solidFill>
+          <a:prstDash val="solid"/>
+        </a:ln>
+        <a:effectLst/>
+      </dsp:spPr>
+      <dsp:style>
+        <a:lnRef idx="2">
+          <a:scrgbClr r="0" g="0" b="0"/>
+        </a:lnRef>
+        <a:fillRef idx="1">
+          <a:scrgbClr r="0" g="0" b="0"/>
+        </a:fillRef>
+        <a:effectRef idx="0">
+          <a:scrgbClr r="0" g="0" b="0"/>
+        </a:effectRef>
+        <a:fontRef idx="minor">
+          <a:schemeClr val="lt1"/>
+        </a:fontRef>
+      </dsp:style>
+    </dsp:sp>
+    <dsp:sp modelId="{4A8CB79D-8090-4A56-9245-0792E3B4A2E0}">
+      <dsp:nvSpPr>
+        <dsp:cNvPr id="0" name=""/>
+        <dsp:cNvSpPr/>
+      </dsp:nvSpPr>
+      <dsp:spPr>
+        <a:xfrm>
+          <a:off x="0" y="1731300"/>
+          <a:ext cx="1550822" cy="450042"/>
+        </a:xfrm>
+        <a:prstGeom prst="rect">
+          <a:avLst/>
+        </a:prstGeom>
+        <a:noFill/>
+        <a:ln>
+          <a:noFill/>
+        </a:ln>
+        <a:effectLst/>
+      </dsp:spPr>
+      <dsp:style>
+        <a:lnRef idx="0">
+          <a:scrgbClr r="0" g="0" b="0"/>
+        </a:lnRef>
+        <a:fillRef idx="0">
+          <a:scrgbClr r="0" g="0" b="0"/>
+        </a:fillRef>
+        <a:effectRef idx="0">
+          <a:scrgbClr r="0" g="0" b="0"/>
+        </a:effectRef>
+        <a:fontRef idx="minor"/>
+      </dsp:style>
+      <dsp:txBody>
+        <a:bodyPr spcFirstLastPara="0" vert="horz" wrap="square" lIns="0" tIns="0" rIns="0" bIns="0" numCol="1" spcCol="1270" anchor="b" anchorCtr="0">
+          <a:noAutofit/>
+        </a:bodyPr>
+        <a:lstStyle/>
+        <a:p>
+          <a:pPr lvl="0" algn="l" defTabSz="933450">
+            <a:lnSpc>
+              <a:spcPct val="90000"/>
+            </a:lnSpc>
+            <a:spcBef>
+              <a:spcPct val="0"/>
+            </a:spcBef>
+            <a:spcAft>
+              <a:spcPct val="35000"/>
+            </a:spcAft>
+          </a:pPr>
+          <a:r>
+            <a:rPr lang="en-US" sz="2100" kern="1200" dirty="0" err="1" smtClean="0">
+              <a:solidFill>
+                <a:schemeClr val="bg1"/>
+              </a:solidFill>
+            </a:rPr>
+            <a:t>Groep</a:t>
+          </a:r>
+          <a:r>
+            <a:rPr lang="en-US" sz="2100" kern="1200" dirty="0" smtClean="0">
+              <a:solidFill>
+                <a:schemeClr val="bg1"/>
+              </a:solidFill>
+            </a:rPr>
+            <a:t> 2</a:t>
+          </a:r>
+          <a:endParaRPr lang="nl-NL" sz="2100" kern="1200" dirty="0">
+            <a:solidFill>
+              <a:schemeClr val="bg1"/>
+            </a:solidFill>
+          </a:endParaRPr>
+        </a:p>
+      </dsp:txBody>
+      <dsp:txXfrm>
+        <a:off x="0" y="1731300"/>
+        <a:ext cx="1550822" cy="450042"/>
+      </dsp:txXfrm>
+    </dsp:sp>
+    <dsp:sp modelId="{97DA29A6-CF53-40EA-8167-4875DE395972}">
+      <dsp:nvSpPr>
+        <dsp:cNvPr id="0" name=""/>
+        <dsp:cNvSpPr/>
+      </dsp:nvSpPr>
+      <dsp:spPr>
+        <a:xfrm>
+          <a:off x="2094585" y="2939278"/>
+          <a:ext cx="349910" cy="350192"/>
+        </a:xfrm>
+        <a:prstGeom prst="ellipse">
+          <a:avLst/>
+        </a:prstGeom>
+        <a:solidFill>
+          <a:schemeClr val="accent1">
+            <a:hueOff val="0"/>
+            <a:satOff val="0"/>
+            <a:lumOff val="0"/>
+            <a:alphaOff val="0"/>
+          </a:schemeClr>
+        </a:solidFill>
+        <a:ln w="25400" cap="flat" cmpd="sng" algn="ctr">
+          <a:solidFill>
+            <a:schemeClr val="accent1">
+              <a:hueOff val="0"/>
+              <a:satOff val="0"/>
+              <a:lumOff val="0"/>
+              <a:alphaOff val="0"/>
+            </a:schemeClr>
+          </a:solidFill>
+          <a:prstDash val="solid"/>
+        </a:ln>
+        <a:effectLst/>
+      </dsp:spPr>
+      <dsp:style>
+        <a:lnRef idx="2">
+          <a:scrgbClr r="0" g="0" b="0"/>
+        </a:lnRef>
+        <a:fillRef idx="1">
+          <a:scrgbClr r="0" g="0" b="0"/>
+        </a:fillRef>
+        <a:effectRef idx="0">
+          <a:scrgbClr r="0" g="0" b="0"/>
+        </a:effectRef>
+        <a:fontRef idx="minor">
+          <a:schemeClr val="lt1"/>
+        </a:fontRef>
+      </dsp:style>
+    </dsp:sp>
+    <dsp:sp modelId="{F3279A43-D68B-47FE-AD95-F69CBDFA4F5E}">
+      <dsp:nvSpPr>
+        <dsp:cNvPr id="0" name=""/>
+        <dsp:cNvSpPr/>
+      </dsp:nvSpPr>
+      <dsp:spPr>
+        <a:xfrm>
+          <a:off x="1870252" y="3295801"/>
+          <a:ext cx="174955" cy="174952"/>
+        </a:xfrm>
+        <a:prstGeom prst="ellipse">
+          <a:avLst/>
+        </a:prstGeom>
+        <a:solidFill>
+          <a:schemeClr val="accent1">
+            <a:hueOff val="0"/>
+            <a:satOff val="0"/>
+            <a:lumOff val="0"/>
+            <a:alphaOff val="0"/>
+          </a:schemeClr>
+        </a:solidFill>
+        <a:ln w="25400" cap="flat" cmpd="sng" algn="ctr">
+          <a:solidFill>
+            <a:schemeClr val="accent1">
+              <a:hueOff val="0"/>
+              <a:satOff val="0"/>
+              <a:lumOff val="0"/>
+              <a:alphaOff val="0"/>
+            </a:schemeClr>
+          </a:solidFill>
+          <a:prstDash val="solid"/>
+        </a:ln>
+        <a:effectLst/>
+      </dsp:spPr>
+      <dsp:style>
+        <a:lnRef idx="2">
+          <a:scrgbClr r="0" g="0" b="0"/>
+        </a:lnRef>
+        <a:fillRef idx="1">
+          <a:scrgbClr r="0" g="0" b="0"/>
+        </a:fillRef>
+        <a:effectRef idx="0">
+          <a:scrgbClr r="0" g="0" b="0"/>
+        </a:effectRef>
+        <a:fontRef idx="minor">
+          <a:schemeClr val="lt1"/>
+        </a:fontRef>
+      </dsp:style>
+    </dsp:sp>
+    <dsp:sp modelId="{DBABF39F-3927-4607-98E5-56B7F8AB08BC}">
+      <dsp:nvSpPr>
+        <dsp:cNvPr id="0" name=""/>
+        <dsp:cNvSpPr/>
+      </dsp:nvSpPr>
+      <dsp:spPr>
+        <a:xfrm>
+          <a:off x="1496568" y="3295801"/>
+          <a:ext cx="174955" cy="174952"/>
+        </a:xfrm>
+        <a:prstGeom prst="ellipse">
+          <a:avLst/>
+        </a:prstGeom>
+        <a:solidFill>
+          <a:schemeClr val="accent1">
+            <a:hueOff val="0"/>
+            <a:satOff val="0"/>
+            <a:lumOff val="0"/>
+            <a:alphaOff val="0"/>
+          </a:schemeClr>
+        </a:solidFill>
+        <a:ln w="25400" cap="flat" cmpd="sng" algn="ctr">
+          <a:solidFill>
+            <a:schemeClr val="accent1">
+              <a:hueOff val="0"/>
+              <a:satOff val="0"/>
+              <a:lumOff val="0"/>
+              <a:alphaOff val="0"/>
+            </a:schemeClr>
+          </a:solidFill>
+          <a:prstDash val="solid"/>
+        </a:ln>
+        <a:effectLst/>
+      </dsp:spPr>
+      <dsp:style>
+        <a:lnRef idx="2">
+          <a:scrgbClr r="0" g="0" b="0"/>
+        </a:lnRef>
+        <a:fillRef idx="1">
+          <a:scrgbClr r="0" g="0" b="0"/>
+        </a:fillRef>
+        <a:effectRef idx="0">
+          <a:scrgbClr r="0" g="0" b="0"/>
+        </a:effectRef>
+        <a:fontRef idx="minor">
+          <a:schemeClr val="lt1"/>
+        </a:fontRef>
+      </dsp:style>
+    </dsp:sp>
+    <dsp:sp modelId="{B92E45C0-2FDD-4103-8A22-824EE6F91626}">
+      <dsp:nvSpPr>
+        <dsp:cNvPr id="0" name=""/>
+        <dsp:cNvSpPr/>
+      </dsp:nvSpPr>
+      <dsp:spPr>
+        <a:xfrm>
+          <a:off x="1122883" y="3295801"/>
+          <a:ext cx="174955" cy="174952"/>
+        </a:xfrm>
+        <a:prstGeom prst="ellipse">
+          <a:avLst/>
+        </a:prstGeom>
+        <a:solidFill>
+          <a:schemeClr val="accent1">
+            <a:hueOff val="0"/>
+            <a:satOff val="0"/>
+            <a:lumOff val="0"/>
+            <a:alphaOff val="0"/>
+          </a:schemeClr>
+        </a:solidFill>
+        <a:ln w="25400" cap="flat" cmpd="sng" algn="ctr">
+          <a:solidFill>
+            <a:schemeClr val="accent1">
+              <a:hueOff val="0"/>
+              <a:satOff val="0"/>
+              <a:lumOff val="0"/>
+              <a:alphaOff val="0"/>
+            </a:schemeClr>
+          </a:solidFill>
+          <a:prstDash val="solid"/>
+        </a:ln>
+        <a:effectLst/>
+      </dsp:spPr>
+      <dsp:style>
+        <a:lnRef idx="2">
+          <a:scrgbClr r="0" g="0" b="0"/>
+        </a:lnRef>
+        <a:fillRef idx="1">
+          <a:scrgbClr r="0" g="0" b="0"/>
+        </a:fillRef>
+        <a:effectRef idx="0">
+          <a:scrgbClr r="0" g="0" b="0"/>
+        </a:effectRef>
+        <a:fontRef idx="minor">
+          <a:schemeClr val="lt1"/>
+        </a:fontRef>
+      </dsp:style>
+    </dsp:sp>
+    <dsp:sp modelId="{52A8FE42-DD1B-4EF0-94DE-618ADE769CE9}">
+      <dsp:nvSpPr>
+        <dsp:cNvPr id="0" name=""/>
+        <dsp:cNvSpPr/>
+      </dsp:nvSpPr>
+      <dsp:spPr>
+        <a:xfrm>
+          <a:off x="749198" y="3295801"/>
+          <a:ext cx="174955" cy="174952"/>
+        </a:xfrm>
+        <a:prstGeom prst="ellipse">
+          <a:avLst/>
+        </a:prstGeom>
+        <a:solidFill>
+          <a:schemeClr val="accent1">
+            <a:hueOff val="0"/>
+            <a:satOff val="0"/>
+            <a:lumOff val="0"/>
+            <a:alphaOff val="0"/>
+          </a:schemeClr>
+        </a:solidFill>
+        <a:ln w="25400" cap="flat" cmpd="sng" algn="ctr">
+          <a:solidFill>
+            <a:schemeClr val="accent1">
+              <a:hueOff val="0"/>
+              <a:satOff val="0"/>
+              <a:lumOff val="0"/>
+              <a:alphaOff val="0"/>
+            </a:schemeClr>
+          </a:solidFill>
+          <a:prstDash val="solid"/>
+        </a:ln>
+        <a:effectLst/>
+      </dsp:spPr>
+      <dsp:style>
+        <a:lnRef idx="2">
+          <a:scrgbClr r="0" g="0" b="0"/>
+        </a:lnRef>
+        <a:fillRef idx="1">
+          <a:scrgbClr r="0" g="0" b="0"/>
+        </a:fillRef>
+        <a:effectRef idx="0">
+          <a:scrgbClr r="0" g="0" b="0"/>
+        </a:effectRef>
+        <a:fontRef idx="minor">
+          <a:schemeClr val="lt1"/>
+        </a:fontRef>
+      </dsp:style>
+    </dsp:sp>
+    <dsp:sp modelId="{5A9AF302-1185-486E-90D0-45CD6A57B261}">
+      <dsp:nvSpPr>
+        <dsp:cNvPr id="0" name=""/>
+        <dsp:cNvSpPr/>
+      </dsp:nvSpPr>
+      <dsp:spPr>
+        <a:xfrm>
+          <a:off x="374904" y="3295801"/>
+          <a:ext cx="174955" cy="174952"/>
+        </a:xfrm>
+        <a:prstGeom prst="ellipse">
+          <a:avLst/>
+        </a:prstGeom>
+        <a:solidFill>
+          <a:schemeClr val="accent1">
+            <a:hueOff val="0"/>
+            <a:satOff val="0"/>
+            <a:lumOff val="0"/>
+            <a:alphaOff val="0"/>
+          </a:schemeClr>
+        </a:solidFill>
+        <a:ln w="25400" cap="flat" cmpd="sng" algn="ctr">
+          <a:solidFill>
+            <a:schemeClr val="accent1">
+              <a:hueOff val="0"/>
+              <a:satOff val="0"/>
+              <a:lumOff val="0"/>
+              <a:alphaOff val="0"/>
+            </a:schemeClr>
+          </a:solidFill>
+          <a:prstDash val="solid"/>
+        </a:ln>
+        <a:effectLst/>
+      </dsp:spPr>
+      <dsp:style>
+        <a:lnRef idx="2">
+          <a:scrgbClr r="0" g="0" b="0"/>
+        </a:lnRef>
+        <a:fillRef idx="1">
+          <a:scrgbClr r="0" g="0" b="0"/>
+        </a:fillRef>
+        <a:effectRef idx="0">
+          <a:scrgbClr r="0" g="0" b="0"/>
+        </a:effectRef>
+        <a:fontRef idx="minor">
+          <a:schemeClr val="lt1"/>
+        </a:fontRef>
+      </dsp:style>
+    </dsp:sp>
+    <dsp:sp modelId="{4126ABD2-5CCE-44F1-A201-FEF5E427F5D4}">
+      <dsp:nvSpPr>
+        <dsp:cNvPr id="0" name=""/>
+        <dsp:cNvSpPr/>
+      </dsp:nvSpPr>
+      <dsp:spPr>
+        <a:xfrm>
+          <a:off x="1219" y="3295801"/>
+          <a:ext cx="174955" cy="174952"/>
+        </a:xfrm>
+        <a:prstGeom prst="ellipse">
+          <a:avLst/>
+        </a:prstGeom>
+        <a:solidFill>
+          <a:schemeClr val="accent1">
+            <a:hueOff val="0"/>
+            <a:satOff val="0"/>
+            <a:lumOff val="0"/>
+            <a:alphaOff val="0"/>
+          </a:schemeClr>
+        </a:solidFill>
+        <a:ln w="25400" cap="flat" cmpd="sng" algn="ctr">
+          <a:solidFill>
+            <a:schemeClr val="accent1">
+              <a:hueOff val="0"/>
+              <a:satOff val="0"/>
+              <a:lumOff val="0"/>
+              <a:alphaOff val="0"/>
+            </a:schemeClr>
+          </a:solidFill>
+          <a:prstDash val="solid"/>
+        </a:ln>
+        <a:effectLst/>
+      </dsp:spPr>
+      <dsp:style>
+        <a:lnRef idx="2">
+          <a:scrgbClr r="0" g="0" b="0"/>
+        </a:lnRef>
+        <a:fillRef idx="1">
+          <a:scrgbClr r="0" g="0" b="0"/>
+        </a:fillRef>
+        <a:effectRef idx="0">
+          <a:scrgbClr r="0" g="0" b="0"/>
+        </a:effectRef>
+        <a:fontRef idx="minor">
+          <a:schemeClr val="lt1"/>
+        </a:fontRef>
+      </dsp:style>
+    </dsp:sp>
+    <dsp:sp modelId="{54B5F346-661D-4B57-9FF9-2BC495ECE97A}">
+      <dsp:nvSpPr>
+        <dsp:cNvPr id="0" name=""/>
+        <dsp:cNvSpPr/>
+      </dsp:nvSpPr>
+      <dsp:spPr>
+        <a:xfrm>
+          <a:off x="0" y="2844032"/>
+          <a:ext cx="2050694" cy="450042"/>
+        </a:xfrm>
+        <a:prstGeom prst="rect">
+          <a:avLst/>
+        </a:prstGeom>
+        <a:noFill/>
+        <a:ln>
+          <a:noFill/>
+        </a:ln>
+        <a:effectLst/>
+      </dsp:spPr>
+      <dsp:style>
+        <a:lnRef idx="0">
+          <a:scrgbClr r="0" g="0" b="0"/>
+        </a:lnRef>
+        <a:fillRef idx="0">
+          <a:scrgbClr r="0" g="0" b="0"/>
+        </a:fillRef>
+        <a:effectRef idx="0">
+          <a:scrgbClr r="0" g="0" b="0"/>
+        </a:effectRef>
+        <a:fontRef idx="minor"/>
+      </dsp:style>
+      <dsp:txBody>
+        <a:bodyPr spcFirstLastPara="0" vert="horz" wrap="square" lIns="0" tIns="0" rIns="0" bIns="0" numCol="1" spcCol="1270" anchor="b" anchorCtr="0">
+          <a:noAutofit/>
+        </a:bodyPr>
+        <a:lstStyle/>
+        <a:p>
+          <a:pPr lvl="0" algn="l" defTabSz="933450">
+            <a:lnSpc>
+              <a:spcPct val="90000"/>
+            </a:lnSpc>
+            <a:spcBef>
+              <a:spcPct val="0"/>
+            </a:spcBef>
+            <a:spcAft>
+              <a:spcPct val="35000"/>
+            </a:spcAft>
+          </a:pPr>
+          <a:r>
+            <a:rPr lang="en-US" sz="2100" kern="1200" dirty="0" err="1" smtClean="0">
+              <a:solidFill>
+                <a:schemeClr val="bg1"/>
+              </a:solidFill>
+            </a:rPr>
+            <a:t>Groep</a:t>
+          </a:r>
+          <a:r>
+            <a:rPr lang="en-US" sz="2100" kern="1200" dirty="0" smtClean="0">
+              <a:solidFill>
+                <a:schemeClr val="bg1"/>
+              </a:solidFill>
+            </a:rPr>
+            <a:t> …</a:t>
+          </a:r>
+          <a:endParaRPr lang="nl-NL" sz="2100" kern="1200" dirty="0">
+            <a:solidFill>
+              <a:schemeClr val="bg1"/>
+            </a:solidFill>
+          </a:endParaRPr>
+        </a:p>
+      </dsp:txBody>
+      <dsp:txXfrm>
+        <a:off x="0" y="2844032"/>
+        <a:ext cx="2050694" cy="450042"/>
+      </dsp:txXfrm>
+    </dsp:sp>
   </dsp:spTree>
 </dsp:drawing>
 </file>
@@ -5578,7 +7353,7 @@
           <a:p>
             <a:fld id="{2DB1139D-5AC7-4B0B-A715-E40E0591EF82}" type="slidenum">
               <a:rPr lang="nl-NL" smtClean="0"/>
-              <a:t>11</a:t>
+              <a:t>12</a:t>
             </a:fld>
             <a:endParaRPr lang="nl-NL" dirty="0"/>
           </a:p>
@@ -5773,7 +7548,7 @@
           <a:p>
             <a:fld id="{2DB1139D-5AC7-4B0B-A715-E40E0591EF82}" type="slidenum">
               <a:rPr lang="nl-NL" smtClean="0"/>
-              <a:t>14</a:t>
+              <a:t>13</a:t>
             </a:fld>
             <a:endParaRPr lang="nl-NL" dirty="0"/>
           </a:p>
@@ -6167,7 +7942,7 @@
           <a:p>
             <a:fld id="{2DB1139D-5AC7-4B0B-A715-E40E0591EF82}" type="slidenum">
               <a:rPr lang="nl-NL" smtClean="0"/>
-              <a:t>2</a:t>
+              <a:t>3</a:t>
             </a:fld>
             <a:endParaRPr lang="nl-NL" dirty="0"/>
           </a:p>
@@ -6251,7 +8026,7 @@
           <a:p>
             <a:fld id="{2DB1139D-5AC7-4B0B-A715-E40E0591EF82}" type="slidenum">
               <a:rPr lang="nl-NL" smtClean="0"/>
-              <a:t>3</a:t>
+              <a:t>4</a:t>
             </a:fld>
             <a:endParaRPr lang="nl-NL" dirty="0"/>
           </a:p>
@@ -6335,7 +8110,7 @@
           <a:p>
             <a:fld id="{2DB1139D-5AC7-4B0B-A715-E40E0591EF82}" type="slidenum">
               <a:rPr lang="nl-NL" smtClean="0"/>
-              <a:t>4</a:t>
+              <a:t>5</a:t>
             </a:fld>
             <a:endParaRPr lang="nl-NL" dirty="0"/>
           </a:p>
@@ -6450,7 +8225,7 @@
           <a:p>
             <a:fld id="{2DB1139D-5AC7-4B0B-A715-E40E0591EF82}" type="slidenum">
               <a:rPr lang="nl-NL" smtClean="0"/>
-              <a:t>5</a:t>
+              <a:t>6</a:t>
             </a:fld>
             <a:endParaRPr lang="nl-NL" dirty="0"/>
           </a:p>
@@ -6640,7 +8415,7 @@
           <a:p>
             <a:fld id="{2DB1139D-5AC7-4B0B-A715-E40E0591EF82}" type="slidenum">
               <a:rPr lang="nl-NL" smtClean="0"/>
-              <a:t>6</a:t>
+              <a:t>7</a:t>
             </a:fld>
             <a:endParaRPr lang="nl-NL" dirty="0"/>
           </a:p>
@@ -6766,7 +8541,7 @@
           <a:p>
             <a:fld id="{2DB1139D-5AC7-4B0B-A715-E40E0591EF82}" type="slidenum">
               <a:rPr lang="nl-NL" smtClean="0"/>
-              <a:t>7</a:t>
+              <a:t>8</a:t>
             </a:fld>
             <a:endParaRPr lang="nl-NL" dirty="0"/>
           </a:p>
@@ -6900,11 +8675,7 @@
             </a:r>
             <a:r>
               <a:rPr lang="en-US" baseline="0" dirty="0" smtClean="0"/>
-              <a:t> van services (extra) te waarborgen. Pas op met eigen framework-libraries</a:t>
-            </a:r>
-            <a:r>
-              <a:rPr lang="en-US" baseline="0" dirty="0" smtClean="0"/>
-              <a:t>. (</a:t>
+              <a:t> van services (extra) te waarborgen. Pas op met eigen framework-libraries. (</a:t>
             </a:r>
             <a:r>
               <a:rPr lang="en-US" baseline="0" dirty="0" err="1" smtClean="0"/>
@@ -6922,7 +8693,6 @@
               <a:rPr lang="en-US" baseline="0" dirty="0" smtClean="0"/>
               <a:t>)</a:t>
             </a:r>
-            <a:endParaRPr lang="en-US" baseline="0" dirty="0" smtClean="0"/>
           </a:p>
           <a:p>
             <a:endParaRPr lang="en-US" baseline="0" dirty="0" smtClean="0"/>
@@ -7007,7 +8777,7 @@
           <a:p>
             <a:fld id="{2DB1139D-5AC7-4B0B-A715-E40E0591EF82}" type="slidenum">
               <a:rPr lang="nl-NL" smtClean="0"/>
-              <a:t>8</a:t>
+              <a:t>9</a:t>
             </a:fld>
             <a:endParaRPr lang="nl-NL" dirty="0"/>
           </a:p>
@@ -7104,11 +8874,7 @@
             </a:r>
             <a:r>
               <a:rPr lang="en-US" baseline="0" dirty="0" smtClean="0"/>
-              <a:t> </a:t>
-            </a:r>
-            <a:r>
-              <a:rPr lang="en-US" baseline="0" dirty="0" smtClean="0"/>
-              <a:t>is niet praktisch</a:t>
+              <a:t> is niet praktisch</a:t>
             </a:r>
           </a:p>
           <a:p>
@@ -7142,11 +8908,7 @@
             </a:r>
             <a:r>
               <a:rPr lang="nl-NL" baseline="0" dirty="0" smtClean="0"/>
-              <a:t> </a:t>
-            </a:r>
-            <a:r>
-              <a:rPr lang="nl-NL" baseline="0" dirty="0" smtClean="0"/>
-              <a:t>item/</a:t>
+              <a:t> item/</a:t>
             </a:r>
             <a:r>
               <a:rPr lang="nl-NL" baseline="0" dirty="0" err="1" smtClean="0"/>
@@ -7154,11 +8916,7 @@
             </a:r>
             <a:r>
               <a:rPr lang="nl-NL" baseline="0" dirty="0" smtClean="0"/>
-              <a:t> </a:t>
-            </a:r>
-            <a:r>
-              <a:rPr lang="nl-NL" baseline="0" dirty="0" smtClean="0"/>
-              <a:t>(</a:t>
+              <a:t> (</a:t>
             </a:r>
             <a:r>
               <a:rPr lang="nl-NL" baseline="0" dirty="0" err="1" smtClean="0"/>
@@ -7197,7 +8955,7 @@
           <a:p>
             <a:fld id="{2DB1139D-5AC7-4B0B-A715-E40E0591EF82}" type="slidenum">
               <a:rPr lang="nl-NL" smtClean="0"/>
-              <a:t>9</a:t>
+              <a:t>10</a:t>
             </a:fld>
             <a:endParaRPr lang="nl-NL" dirty="0"/>
           </a:p>
@@ -7984,10 +9742,22 @@
         <p:spPr/>
         <p:txBody>
           <a:bodyPr/>
-          <a:lstStyle/>
+          <a:lstStyle>
+            <a:lvl1pPr>
+              <a:defRPr lang="nl-NL" sz="900" b="1" kern="1200" cap="all" smtClean="0">
+                <a:solidFill>
+                  <a:srgbClr val="009036"/>
+                </a:solidFill>
+                <a:latin typeface="Arial" pitchFamily="34" charset="0"/>
+                <a:ea typeface="+mn-ea"/>
+                <a:cs typeface="Arial" pitchFamily="34" charset="0"/>
+              </a:defRPr>
+            </a:lvl1pPr>
+          </a:lstStyle>
           <a:p>
             <a:fld id="{249B52C1-75DC-496B-AF3F-4978B95BB865}" type="datetime4">
               <a:rPr lang="nl-NL" smtClean="0"/>
+              <a:pPr/>
               <a:t>1 augustus 2017</a:t>
             </a:fld>
             <a:endParaRPr lang="nl-NL" dirty="0"/>
@@ -8013,18 +9783,25 @@
         <p:txBody>
           <a:bodyPr/>
           <a:lstStyle>
-            <a:lvl1pPr>
-              <a:defRPr b="1">
+            <a:lvl1pPr marL="0" algn="l" defTabSz="914400" rtl="0" eaLnBrk="1" latinLnBrk="0" hangingPunct="1">
+              <a:defRPr lang="nl-NL" sz="900" b="1" kern="1200" cap="all" smtClean="0">
                 <a:solidFill>
-                  <a:schemeClr val="bg1"/>
+                  <a:srgbClr val="009036"/>
                 </a:solidFill>
+                <a:latin typeface="Arial" pitchFamily="34" charset="0"/>
+                <a:ea typeface="+mn-ea"/>
+                <a:cs typeface="Arial" pitchFamily="34" charset="0"/>
               </a:defRPr>
             </a:lvl1pPr>
           </a:lstStyle>
           <a:p>
             <a:r>
-              <a:rPr lang="nl-NL" smtClean="0"/>
-              <a:t>Johannes Sim &amp; Renzo veldkamp</a:t>
+              <a:rPr lang="nl-NL" dirty="0" smtClean="0"/>
+              <a:t>Johannes Sim &amp; Renzo </a:t>
+            </a:r>
+            <a:r>
+              <a:rPr lang="nl-NL" dirty="0" err="1" smtClean="0"/>
+              <a:t>veldkamp</a:t>
             </a:r>
             <a:endParaRPr lang="nl-NL" dirty="0"/>
           </a:p>
@@ -10218,14 +11995,7 @@
             </a:pPr>
             <a:r>
               <a:rPr lang="nl-NL" dirty="0" smtClean="0"/>
-              <a:t>Gevolgen voor beheer</a:t>
-            </a:r>
-            <a:br>
-              <a:rPr lang="nl-NL" dirty="0" smtClean="0"/>
-            </a:br>
-            <a:r>
-              <a:rPr lang="nl-NL" dirty="0" smtClean="0"/>
-              <a:t/>
+              <a:t>Gevolgen voor deployment</a:t>
             </a:r>
             <a:br>
               <a:rPr lang="nl-NL" dirty="0" smtClean="0"/>
@@ -10256,7 +12026,25 @@
             </a:pPr>
             <a:r>
               <a:rPr lang="nl-NL" dirty="0" smtClean="0"/>
-              <a:t>Bewaking</a:t>
+              <a:t>Zoveel mogelijk geautomatiseerde </a:t>
+            </a:r>
+            <a:r>
+              <a:rPr lang="nl-NL" dirty="0" err="1" smtClean="0"/>
+              <a:t>deployment</a:t>
+            </a:r>
+            <a:r>
+              <a:rPr lang="nl-NL" dirty="0" smtClean="0"/>
+              <a:t> </a:t>
+            </a:r>
+            <a:r>
+              <a:rPr lang="nl-NL" dirty="0" smtClean="0">
+                <a:sym typeface="Wingdings" panose="05000000000000000000" pitchFamily="2" charset="2"/>
+              </a:rPr>
+              <a:t> </a:t>
+            </a:r>
+            <a:r>
+              <a:rPr lang="nl-NL" dirty="0" smtClean="0"/>
+              <a:t>CI/CD!</a:t>
             </a:r>
           </a:p>
           <a:p>
@@ -10266,10 +12054,9 @@
               </a:spcAft>
             </a:pPr>
             <a:r>
-              <a:rPr lang="nl-NL" dirty="0" err="1" smtClean="0"/>
-              <a:t>Logging</a:t>
-            </a:r>
-            <a:endParaRPr lang="nl-NL" dirty="0" smtClean="0"/>
+              <a:rPr lang="nl-NL" dirty="0" smtClean="0"/>
+              <a:t>‘Rolling updates’</a:t>
+            </a:r>
           </a:p>
           <a:p>
             <a:pPr>
@@ -10279,33 +12066,7 @@
             </a:pPr>
             <a:r>
               <a:rPr lang="nl-NL" dirty="0" smtClean="0"/>
-              <a:t>Foutopsporing</a:t>
-            </a:r>
-          </a:p>
-          <a:p>
-            <a:pPr>
-              <a:spcAft>
-                <a:spcPts val="600"/>
-              </a:spcAft>
-            </a:pPr>
-            <a:r>
-              <a:rPr lang="nl-NL" dirty="0" err="1" smtClean="0"/>
-              <a:t>Capacity</a:t>
-            </a:r>
-            <a:r>
-              <a:rPr lang="nl-NL" dirty="0" smtClean="0"/>
-              <a:t> management</a:t>
-            </a:r>
-          </a:p>
-          <a:p>
-            <a:pPr>
-              <a:spcAft>
-                <a:spcPts val="600"/>
-              </a:spcAft>
-            </a:pPr>
-            <a:r>
-              <a:rPr lang="nl-NL" dirty="0" smtClean="0"/>
-              <a:t>Extra component voor communicatie (eventueel)</a:t>
+              <a:t>Traceerbaarheid</a:t>
             </a:r>
             <a:endParaRPr lang="nl-NL" dirty="0"/>
           </a:p>
@@ -10326,7 +12087,7 @@
           <a:bodyPr vert="horz" lIns="91440" tIns="45720" rIns="91440" bIns="45720" rtlCol="0" anchor="ctr"/>
           <a:lstStyle/>
           <a:p>
-            <a:fld id="{B2AEA59B-01EB-45FF-9C78-C234F8428C87}" type="datetime4">
+            <a:fld id="{3A2B0FBA-51B9-435A-843F-7AC2A474B4B8}" type="datetime4">
               <a:rPr lang="nl-NL" sz="900" cap="all" smtClean="0">
                 <a:solidFill>
                   <a:srgbClr val="009036"/>
@@ -10373,10 +12134,69 @@
           </a:p>
         </p:txBody>
       </p:sp>
+      <p:pic>
+        <p:nvPicPr>
+          <p:cNvPr id="6" name="Afbeelding 5"/>
+          <p:cNvPicPr>
+            <a:picLocks noChangeAspect="1"/>
+          </p:cNvPicPr>
+          <p:nvPr/>
+        </p:nvPicPr>
+        <p:blipFill rotWithShape="1">
+          <a:blip r:embed="rId3">
+            <a:extLst>
+              <a:ext uri="{28A0092B-C50C-407E-A947-70E740481C1C}">
+                <a14:useLocalDpi xmlns:a14="http://schemas.microsoft.com/office/drawing/2010/main" val="0"/>
+              </a:ext>
+            </a:extLst>
+          </a:blip>
+          <a:srcRect b="18685"/>
+          <a:stretch/>
+        </p:blipFill>
+        <p:spPr>
+          <a:xfrm>
+            <a:off x="826265" y="3125997"/>
+            <a:ext cx="5328396" cy="2438031"/>
+          </a:xfrm>
+          <a:prstGeom prst="rect">
+            <a:avLst/>
+          </a:prstGeom>
+        </p:spPr>
+      </p:pic>
+      <p:pic>
+        <p:nvPicPr>
+          <p:cNvPr id="7" name="Afbeelding 6"/>
+          <p:cNvPicPr>
+            <a:picLocks noChangeAspect="1"/>
+          </p:cNvPicPr>
+          <p:nvPr/>
+        </p:nvPicPr>
+        <p:blipFill>
+          <a:blip r:embed="rId4">
+            <a:extLst>
+              <a:ext uri="{28A0092B-C50C-407E-A947-70E740481C1C}">
+                <a14:useLocalDpi xmlns:a14="http://schemas.microsoft.com/office/drawing/2010/main" val="0"/>
+              </a:ext>
+            </a:extLst>
+          </a:blip>
+          <a:stretch>
+            <a:fillRect/>
+          </a:stretch>
+        </p:blipFill>
+        <p:spPr>
+          <a:xfrm>
+            <a:off x="4699120" y="2072646"/>
+            <a:ext cx="3057267" cy="594635"/>
+          </a:xfrm>
+          <a:prstGeom prst="rect">
+            <a:avLst/>
+          </a:prstGeom>
+        </p:spPr>
+      </p:pic>
     </p:spTree>
     <p:extLst>
       <p:ext uri="{BB962C8B-B14F-4D97-AF65-F5344CB8AC3E}">
-        <p14:creationId xmlns:p14="http://schemas.microsoft.com/office/powerpoint/2010/main" val="1080359528"/>
+        <p14:creationId xmlns:p14="http://schemas.microsoft.com/office/powerpoint/2010/main" val="1535190211"/>
       </p:ext>
     </p:extLst>
   </p:cSld>
@@ -10412,7 +12232,7 @@
       </p:grpSpPr>
       <p:sp>
         <p:nvSpPr>
-          <p:cNvPr id="2" name="Titel 1"/>
+          <p:cNvPr id="2" name="Title 1"/>
           <p:cNvSpPr>
             <a:spLocks noGrp="1"/>
           </p:cNvSpPr>
@@ -10425,17 +12245,32 @@
           <a:bodyPr/>
           <a:lstStyle/>
           <a:p>
+            <a:pPr>
+              <a:spcAft>
+                <a:spcPts val="600"/>
+              </a:spcAft>
+            </a:pPr>
             <a:r>
               <a:rPr lang="nl-NL" dirty="0" smtClean="0"/>
-              <a:t>nadelen</a:t>
-            </a:r>
+              <a:t>Gevolgen voor beheer</a:t>
+            </a:r>
+            <a:br>
+              <a:rPr lang="nl-NL" dirty="0" smtClean="0"/>
+            </a:br>
+            <a:r>
+              <a:rPr lang="nl-NL" dirty="0" smtClean="0"/>
+              <a:t/>
+            </a:r>
+            <a:br>
+              <a:rPr lang="nl-NL" dirty="0" smtClean="0"/>
+            </a:br>
             <a:endParaRPr lang="nl-NL" dirty="0"/>
           </a:p>
         </p:txBody>
       </p:sp>
       <p:sp>
         <p:nvSpPr>
-          <p:cNvPr id="3" name="Tijdelijke aanduiding voor inhoud 2"/>
+          <p:cNvPr id="3" name="Content Placeholder 2"/>
           <p:cNvSpPr>
             <a:spLocks noGrp="1"/>
           </p:cNvSpPr>
@@ -10454,14 +12289,9 @@
               </a:spcAft>
             </a:pPr>
             <a:r>
-              <a:rPr lang="nl-NL" sz="2400" dirty="0" smtClean="0"/>
-              <a:t>Met stip op no 1: </a:t>
-            </a:r>
-            <a:r>
-              <a:rPr lang="nl-NL" sz="2400" b="1" dirty="0" smtClean="0"/>
-              <a:t>API-management</a:t>
-            </a:r>
-            <a:endParaRPr lang="nl-NL" sz="2800" b="1" dirty="0" smtClean="0"/>
+              <a:rPr lang="nl-NL" dirty="0" smtClean="0"/>
+              <a:t>Bewaking</a:t>
+            </a:r>
           </a:p>
           <a:p>
             <a:pPr>
@@ -10470,13 +12300,10 @@
               </a:spcAft>
             </a:pPr>
             <a:r>
-              <a:rPr lang="nl-NL" dirty="0" smtClean="0"/>
-              <a:t>Architectenrol </a:t>
-            </a:r>
-            <a:r>
-              <a:rPr lang="nl-NL" dirty="0" smtClean="0"/>
-              <a:t>wordt belangrijker</a:t>
-            </a:r>
+              <a:rPr lang="nl-NL" dirty="0" err="1" smtClean="0"/>
+              <a:t>Logging</a:t>
+            </a:r>
+            <a:endParaRPr lang="nl-NL" dirty="0" smtClean="0"/>
           </a:p>
           <a:p>
             <a:pPr>
@@ -10486,7 +12313,7 @@
             </a:pPr>
             <a:r>
               <a:rPr lang="nl-NL" dirty="0" smtClean="0"/>
-              <a:t>Meer deployments</a:t>
+              <a:t>Foutopsporing</a:t>
             </a:r>
           </a:p>
           <a:p>
@@ -10496,44 +12323,12 @@
               </a:spcAft>
             </a:pPr>
             <a:r>
+              <a:rPr lang="nl-NL" dirty="0" err="1" smtClean="0"/>
+              <a:t>Capacity</a:t>
+            </a:r>
+            <a:r>
               <a:rPr lang="nl-NL" dirty="0" smtClean="0"/>
-              <a:t>Lastiger te beheren:</a:t>
-            </a:r>
-          </a:p>
-          <a:p>
-            <a:pPr marL="617537" lvl="3" indent="-263525">
-              <a:spcAft>
-                <a:spcPts val="600"/>
-              </a:spcAft>
-              <a:buSzPct val="135000"/>
-            </a:pPr>
-            <a:r>
-              <a:rPr lang="nl-NL" sz="2000" dirty="0" smtClean="0"/>
-              <a:t>logging</a:t>
-            </a:r>
-          </a:p>
-          <a:p>
-            <a:pPr marL="617537" lvl="3" indent="-263525">
-              <a:spcAft>
-                <a:spcPts val="600"/>
-              </a:spcAft>
-              <a:buSzPct val="135000"/>
-            </a:pPr>
-            <a:r>
-              <a:rPr lang="nl-NL" sz="2000" dirty="0" smtClean="0"/>
-              <a:t>capacity management</a:t>
-            </a:r>
-          </a:p>
-          <a:p>
-            <a:pPr marL="617537" lvl="3" indent="-263525">
-              <a:spcAft>
-                <a:spcPts val="600"/>
-              </a:spcAft>
-              <a:buSzPct val="135000"/>
-            </a:pPr>
-            <a:r>
-              <a:rPr lang="nl-NL" sz="2000" dirty="0" smtClean="0"/>
-              <a:t>foutanalyse</a:t>
+              <a:t> management</a:t>
             </a:r>
           </a:p>
           <a:p>
@@ -10544,37 +12339,15 @@
             </a:pPr>
             <a:r>
               <a:rPr lang="nl-NL" dirty="0" smtClean="0"/>
-              <a:t>Configuratiebeheer wordt complexer</a:t>
-            </a:r>
-          </a:p>
-          <a:p>
-            <a:pPr>
-              <a:spcAft>
-                <a:spcPts val="600"/>
-              </a:spcAft>
-            </a:pPr>
-            <a:r>
-              <a:rPr lang="nl-NL" dirty="0" smtClean="0"/>
-              <a:t>Een beetje meer </a:t>
-            </a:r>
-            <a:r>
-              <a:rPr lang="nl-NL" dirty="0" err="1" smtClean="0"/>
-              <a:t>latency</a:t>
-            </a:r>
-            <a:r>
-              <a:rPr lang="nl-NL" dirty="0" smtClean="0"/>
-              <a:t/>
-            </a:r>
-            <a:br>
-              <a:rPr lang="nl-NL" dirty="0" smtClean="0"/>
-            </a:br>
+              <a:t>Extra component voor communicatie (eventueel)</a:t>
+            </a:r>
             <a:endParaRPr lang="nl-NL" dirty="0"/>
           </a:p>
         </p:txBody>
       </p:sp>
       <p:sp>
         <p:nvSpPr>
-          <p:cNvPr id="4" name="Tijdelijke aanduiding voor datum 3"/>
+          <p:cNvPr id="4" name="Date Placeholder 3"/>
           <p:cNvSpPr>
             <a:spLocks noGrp="1"/>
           </p:cNvSpPr>
@@ -10587,7 +12360,7 @@
           <a:bodyPr vert="horz" lIns="91440" tIns="45720" rIns="91440" bIns="45720" rtlCol="0" anchor="ctr"/>
           <a:lstStyle/>
           <a:p>
-            <a:fld id="{447821B2-C838-43FD-AFB7-8AF50F263499}" type="datetime4">
+            <a:fld id="{B2AEA59B-01EB-45FF-9C78-C234F8428C87}" type="datetime4">
               <a:rPr lang="nl-NL" sz="900" cap="all" smtClean="0">
                 <a:solidFill>
                   <a:srgbClr val="009036"/>
@@ -10605,7 +12378,7 @@
       </p:sp>
       <p:sp>
         <p:nvSpPr>
-          <p:cNvPr id="5" name="Tijdelijke aanduiding voor voettekst 4"/>
+          <p:cNvPr id="5" name="Footer Placeholder 4"/>
           <p:cNvSpPr>
             <a:spLocks noGrp="1"/>
           </p:cNvSpPr>
@@ -10619,20 +12392,12 @@
           <a:lstStyle/>
           <a:p>
             <a:r>
-              <a:rPr lang="nl-NL" dirty="0" smtClean="0">
+              <a:rPr lang="nl-NL" smtClean="0">
                 <a:solidFill>
                   <a:srgbClr val="009036"/>
                 </a:solidFill>
               </a:rPr>
-              <a:t>Johannes Sim &amp; Renzo </a:t>
-            </a:r>
-            <a:r>
-              <a:rPr lang="nl-NL" dirty="0" err="1" smtClean="0">
-                <a:solidFill>
-                  <a:srgbClr val="009036"/>
-                </a:solidFill>
-              </a:rPr>
-              <a:t>veldkamp</a:t>
+              <a:t>Johannes Sim &amp; Renzo veldkamp</a:t>
             </a:r>
             <a:endParaRPr lang="nl-NL" dirty="0">
               <a:solidFill>
@@ -10642,250 +12407,10 @@
           </a:p>
         </p:txBody>
       </p:sp>
-      <p:sp>
-        <p:nvSpPr>
-          <p:cNvPr id="6" name="Stroomdiagram: Voorbereiding 5"/>
-          <p:cNvSpPr/>
-          <p:nvPr/>
-        </p:nvSpPr>
-        <p:spPr>
-          <a:xfrm>
-            <a:off x="7227065" y="1795749"/>
-            <a:ext cx="749147" cy="727114"/>
-          </a:xfrm>
-          <a:prstGeom prst="flowChartPreparation">
-            <a:avLst/>
-          </a:prstGeom>
-        </p:spPr>
-        <p:style>
-          <a:lnRef idx="2">
-            <a:schemeClr val="accent4">
-              <a:shade val="50000"/>
-            </a:schemeClr>
-          </a:lnRef>
-          <a:fillRef idx="1">
-            <a:schemeClr val="accent4"/>
-          </a:fillRef>
-          <a:effectRef idx="0">
-            <a:schemeClr val="accent4"/>
-          </a:effectRef>
-          <a:fontRef idx="minor">
-            <a:schemeClr val="lt1"/>
-          </a:fontRef>
-        </p:style>
-        <p:txBody>
-          <a:bodyPr rtlCol="0" anchor="ctr"/>
-          <a:lstStyle/>
-          <a:p>
-            <a:pPr algn="ctr"/>
-            <a:endParaRPr lang="nl-NL"/>
-          </a:p>
-        </p:txBody>
-      </p:sp>
-      <p:sp>
-        <p:nvSpPr>
-          <p:cNvPr id="7" name="Stroomdiagram: Voorbereiding 6"/>
-          <p:cNvSpPr/>
-          <p:nvPr/>
-        </p:nvSpPr>
-        <p:spPr>
-          <a:xfrm>
-            <a:off x="6180462" y="2787267"/>
-            <a:ext cx="749147" cy="727114"/>
-          </a:xfrm>
-          <a:prstGeom prst="flowChartPreparation">
-            <a:avLst/>
-          </a:prstGeom>
-        </p:spPr>
-        <p:style>
-          <a:lnRef idx="2">
-            <a:schemeClr val="accent5">
-              <a:shade val="50000"/>
-            </a:schemeClr>
-          </a:lnRef>
-          <a:fillRef idx="1">
-            <a:schemeClr val="accent5"/>
-          </a:fillRef>
-          <a:effectRef idx="0">
-            <a:schemeClr val="accent5"/>
-          </a:effectRef>
-          <a:fontRef idx="minor">
-            <a:schemeClr val="lt1"/>
-          </a:fontRef>
-        </p:style>
-        <p:txBody>
-          <a:bodyPr rtlCol="0" anchor="ctr"/>
-          <a:lstStyle/>
-          <a:p>
-            <a:pPr algn="ctr"/>
-            <a:endParaRPr lang="nl-NL"/>
-          </a:p>
-        </p:txBody>
-      </p:sp>
-      <p:sp>
-        <p:nvSpPr>
-          <p:cNvPr id="8" name="Stroomdiagram: Voorbereiding 7"/>
-          <p:cNvSpPr/>
-          <p:nvPr/>
-        </p:nvSpPr>
-        <p:spPr>
-          <a:xfrm>
-            <a:off x="7660550" y="3242922"/>
-            <a:ext cx="749147" cy="727114"/>
-          </a:xfrm>
-          <a:prstGeom prst="flowChartPreparation">
-            <a:avLst/>
-          </a:prstGeom>
-        </p:spPr>
-        <p:style>
-          <a:lnRef idx="2">
-            <a:schemeClr val="accent6">
-              <a:shade val="50000"/>
-            </a:schemeClr>
-          </a:lnRef>
-          <a:fillRef idx="1">
-            <a:schemeClr val="accent6"/>
-          </a:fillRef>
-          <a:effectRef idx="0">
-            <a:schemeClr val="accent6"/>
-          </a:effectRef>
-          <a:fontRef idx="minor">
-            <a:schemeClr val="lt1"/>
-          </a:fontRef>
-        </p:style>
-        <p:txBody>
-          <a:bodyPr rtlCol="0" anchor="ctr"/>
-          <a:lstStyle/>
-          <a:p>
-            <a:pPr algn="ctr"/>
-            <a:endParaRPr lang="nl-NL"/>
-          </a:p>
-        </p:txBody>
-      </p:sp>
-      <p:sp>
-        <p:nvSpPr>
-          <p:cNvPr id="9" name="PIJL-LINKS en -RECHTS 8"/>
-          <p:cNvSpPr/>
-          <p:nvPr/>
-        </p:nvSpPr>
-        <p:spPr>
-          <a:xfrm rot="19031355">
-            <a:off x="6816256" y="2554259"/>
-            <a:ext cx="495499" cy="253388"/>
-          </a:xfrm>
-          <a:prstGeom prst="leftRightArrow">
-            <a:avLst/>
-          </a:prstGeom>
-        </p:spPr>
-        <p:style>
-          <a:lnRef idx="2">
-            <a:schemeClr val="accent1">
-              <a:shade val="50000"/>
-            </a:schemeClr>
-          </a:lnRef>
-          <a:fillRef idx="1">
-            <a:schemeClr val="accent1"/>
-          </a:fillRef>
-          <a:effectRef idx="0">
-            <a:schemeClr val="accent1"/>
-          </a:effectRef>
-          <a:fontRef idx="minor">
-            <a:schemeClr val="lt1"/>
-          </a:fontRef>
-        </p:style>
-        <p:txBody>
-          <a:bodyPr rtlCol="0" anchor="ctr"/>
-          <a:lstStyle/>
-          <a:p>
-            <a:pPr algn="ctr"/>
-            <a:endParaRPr lang="nl-NL"/>
-          </a:p>
-        </p:txBody>
-      </p:sp>
-      <p:sp>
-        <p:nvSpPr>
-          <p:cNvPr id="10" name="PIJL-LINKS en -RECHTS 9"/>
-          <p:cNvSpPr/>
-          <p:nvPr/>
-        </p:nvSpPr>
-        <p:spPr>
-          <a:xfrm rot="3955412">
-            <a:off x="7591785" y="2756199"/>
-            <a:ext cx="495499" cy="253388"/>
-          </a:xfrm>
-          <a:prstGeom prst="leftRightArrow">
-            <a:avLst/>
-          </a:prstGeom>
-        </p:spPr>
-        <p:style>
-          <a:lnRef idx="2">
-            <a:schemeClr val="accent1">
-              <a:shade val="50000"/>
-            </a:schemeClr>
-          </a:lnRef>
-          <a:fillRef idx="1">
-            <a:schemeClr val="accent1"/>
-          </a:fillRef>
-          <a:effectRef idx="0">
-            <a:schemeClr val="accent1"/>
-          </a:effectRef>
-          <a:fontRef idx="minor">
-            <a:schemeClr val="lt1"/>
-          </a:fontRef>
-        </p:style>
-        <p:txBody>
-          <a:bodyPr rtlCol="0" anchor="ctr"/>
-          <a:lstStyle/>
-          <a:p>
-            <a:pPr algn="ctr"/>
-            <a:endParaRPr lang="nl-NL"/>
-          </a:p>
-        </p:txBody>
-      </p:sp>
-      <p:sp>
-        <p:nvSpPr>
-          <p:cNvPr id="11" name="PIJL-LINKS en -RECHTS 10"/>
-          <p:cNvSpPr/>
-          <p:nvPr/>
-        </p:nvSpPr>
-        <p:spPr>
-          <a:xfrm rot="1042610">
-            <a:off x="7009399" y="3353311"/>
-            <a:ext cx="495499" cy="253388"/>
-          </a:xfrm>
-          <a:prstGeom prst="leftRightArrow">
-            <a:avLst/>
-          </a:prstGeom>
-        </p:spPr>
-        <p:style>
-          <a:lnRef idx="2">
-            <a:schemeClr val="accent1">
-              <a:shade val="50000"/>
-            </a:schemeClr>
-          </a:lnRef>
-          <a:fillRef idx="1">
-            <a:schemeClr val="accent1"/>
-          </a:fillRef>
-          <a:effectRef idx="0">
-            <a:schemeClr val="accent1"/>
-          </a:effectRef>
-          <a:fontRef idx="minor">
-            <a:schemeClr val="lt1"/>
-          </a:fontRef>
-        </p:style>
-        <p:txBody>
-          <a:bodyPr rtlCol="0" anchor="ctr"/>
-          <a:lstStyle/>
-          <a:p>
-            <a:pPr algn="ctr"/>
-            <a:endParaRPr lang="nl-NL"/>
-          </a:p>
-        </p:txBody>
-      </p:sp>
     </p:spTree>
     <p:extLst>
       <p:ext uri="{BB962C8B-B14F-4D97-AF65-F5344CB8AC3E}">
-        <p14:creationId xmlns:p14="http://schemas.microsoft.com/office/powerpoint/2010/main" val="984705171"/>
+        <p14:creationId xmlns:p14="http://schemas.microsoft.com/office/powerpoint/2010/main" val="1080359528"/>
       </p:ext>
     </p:extLst>
   </p:cSld>
@@ -10921,7 +12446,7 @@
       </p:grpSpPr>
       <p:sp>
         <p:nvSpPr>
-          <p:cNvPr id="2" name="Title 1"/>
+          <p:cNvPr id="2" name="Titel 1"/>
           <p:cNvSpPr>
             <a:spLocks noGrp="1"/>
           </p:cNvSpPr>
@@ -10935,8 +12460,8 @@
           <a:lstStyle/>
           <a:p>
             <a:r>
-              <a:rPr lang="en-US" dirty="0" err="1" smtClean="0"/>
-              <a:t>docker</a:t>
+              <a:rPr lang="nl-NL" dirty="0" smtClean="0"/>
+              <a:t>nadelen</a:t>
             </a:r>
             <a:endParaRPr lang="nl-NL" dirty="0"/>
           </a:p>
@@ -10944,7 +12469,7 @@
       </p:sp>
       <p:sp>
         <p:nvSpPr>
-          <p:cNvPr id="3" name="Content Placeholder 2"/>
+          <p:cNvPr id="3" name="Tijdelijke aanduiding voor inhoud 2"/>
           <p:cNvSpPr>
             <a:spLocks noGrp="1"/>
           </p:cNvSpPr>
@@ -10957,13 +12482,129 @@
           <a:bodyPr/>
           <a:lstStyle/>
           <a:p>
-            <a:endParaRPr lang="nl-NL"/>
+            <a:pPr>
+              <a:spcAft>
+                <a:spcPts val="600"/>
+              </a:spcAft>
+            </a:pPr>
+            <a:r>
+              <a:rPr lang="nl-NL" sz="2400" dirty="0" smtClean="0"/>
+              <a:t>Met stip op no 1: </a:t>
+            </a:r>
+            <a:r>
+              <a:rPr lang="nl-NL" sz="2400" b="1" dirty="0" smtClean="0"/>
+              <a:t>API-management</a:t>
+            </a:r>
+            <a:endParaRPr lang="nl-NL" sz="2800" b="1" dirty="0" smtClean="0"/>
+          </a:p>
+          <a:p>
+            <a:pPr>
+              <a:spcAft>
+                <a:spcPts val="600"/>
+              </a:spcAft>
+            </a:pPr>
+            <a:r>
+              <a:rPr lang="nl-NL" dirty="0" smtClean="0"/>
+              <a:t>Architectenrol wordt belangrijker</a:t>
+            </a:r>
+          </a:p>
+          <a:p>
+            <a:pPr>
+              <a:spcAft>
+                <a:spcPts val="600"/>
+              </a:spcAft>
+            </a:pPr>
+            <a:r>
+              <a:rPr lang="nl-NL" dirty="0" smtClean="0"/>
+              <a:t>Meer deployments</a:t>
+            </a:r>
+          </a:p>
+          <a:p>
+            <a:pPr>
+              <a:spcAft>
+                <a:spcPts val="600"/>
+              </a:spcAft>
+            </a:pPr>
+            <a:r>
+              <a:rPr lang="nl-NL" dirty="0" smtClean="0"/>
+              <a:t>Lastiger te beheren:</a:t>
+            </a:r>
+          </a:p>
+          <a:p>
+            <a:pPr marL="617537" lvl="3" indent="-263525">
+              <a:spcAft>
+                <a:spcPts val="600"/>
+              </a:spcAft>
+              <a:buSzPct val="135000"/>
+            </a:pPr>
+            <a:r>
+              <a:rPr lang="nl-NL" sz="2000" dirty="0" smtClean="0"/>
+              <a:t>logging</a:t>
+            </a:r>
+          </a:p>
+          <a:p>
+            <a:pPr marL="617537" lvl="3" indent="-263525">
+              <a:spcAft>
+                <a:spcPts val="600"/>
+              </a:spcAft>
+              <a:buSzPct val="135000"/>
+            </a:pPr>
+            <a:r>
+              <a:rPr lang="nl-NL" sz="2000" dirty="0" smtClean="0"/>
+              <a:t>capacity management</a:t>
+            </a:r>
+          </a:p>
+          <a:p>
+            <a:pPr marL="617537" lvl="3" indent="-263525">
+              <a:spcAft>
+                <a:spcPts val="600"/>
+              </a:spcAft>
+              <a:buSzPct val="135000"/>
+            </a:pPr>
+            <a:r>
+              <a:rPr lang="nl-NL" sz="2000" dirty="0" smtClean="0"/>
+              <a:t>foutanalyse</a:t>
+            </a:r>
+          </a:p>
+          <a:p>
+            <a:pPr>
+              <a:spcAft>
+                <a:spcPts val="600"/>
+              </a:spcAft>
+            </a:pPr>
+            <a:r>
+              <a:rPr lang="nl-NL" dirty="0" smtClean="0"/>
+              <a:t>Configuratiebeheer wordt complexer</a:t>
+            </a:r>
+          </a:p>
+          <a:p>
+            <a:pPr>
+              <a:spcAft>
+                <a:spcPts val="600"/>
+              </a:spcAft>
+            </a:pPr>
+            <a:r>
+              <a:rPr lang="nl-NL" dirty="0" smtClean="0"/>
+              <a:t>Een beetje meer </a:t>
+            </a:r>
+            <a:r>
+              <a:rPr lang="nl-NL" dirty="0" err="1" smtClean="0"/>
+              <a:t>latency</a:t>
+            </a:r>
+            <a:r>
+              <a:rPr lang="nl-NL" dirty="0" smtClean="0"/>
+              <a:t/>
+            </a:r>
+            <a:br>
+              <a:rPr lang="nl-NL" dirty="0" smtClean="0"/>
+            </a:br>
+            <a:endParaRPr lang="nl-NL" dirty="0"/>
           </a:p>
         </p:txBody>
       </p:sp>
       <p:sp>
         <p:nvSpPr>
-          <p:cNvPr id="4" name="Date Placeholder 3"/>
+          <p:cNvPr id="4" name="Tijdelijke aanduiding voor datum 3"/>
           <p:cNvSpPr>
             <a:spLocks noGrp="1"/>
           </p:cNvSpPr>
@@ -10976,7 +12617,7 @@
           <a:bodyPr vert="horz" lIns="91440" tIns="45720" rIns="91440" bIns="45720" rtlCol="0" anchor="ctr"/>
           <a:lstStyle/>
           <a:p>
-            <a:fld id="{F1AB6312-83EC-4EC1-A593-E0D1CF285DA2}" type="datetime4">
+            <a:fld id="{447821B2-C838-43FD-AFB7-8AF50F263499}" type="datetime4">
               <a:rPr lang="nl-NL" sz="900" cap="all" smtClean="0">
                 <a:solidFill>
                   <a:srgbClr val="009036"/>
@@ -10994,7 +12635,7 @@
       </p:sp>
       <p:sp>
         <p:nvSpPr>
-          <p:cNvPr id="5" name="Footer Placeholder 4"/>
+          <p:cNvPr id="5" name="Tijdelijke aanduiding voor voettekst 4"/>
           <p:cNvSpPr>
             <a:spLocks noGrp="1"/>
           </p:cNvSpPr>
@@ -11008,7 +12649,7 @@
           <a:lstStyle/>
           <a:p>
             <a:r>
-              <a:rPr lang="nl-NL" dirty="0">
+              <a:rPr lang="nl-NL" dirty="0" smtClean="0">
                 <a:solidFill>
                   <a:srgbClr val="009036"/>
                 </a:solidFill>
@@ -11016,7 +12657,7 @@
               <a:t>Johannes Sim &amp; Renzo </a:t>
             </a:r>
             <a:r>
-              <a:rPr lang="nl-NL" dirty="0" err="1">
+              <a:rPr lang="nl-NL" dirty="0" err="1" smtClean="0">
                 <a:solidFill>
                   <a:srgbClr val="009036"/>
                 </a:solidFill>
@@ -11031,10 +12672,250 @@
           </a:p>
         </p:txBody>
       </p:sp>
+      <p:sp>
+        <p:nvSpPr>
+          <p:cNvPr id="6" name="Stroomdiagram: Voorbereiding 5"/>
+          <p:cNvSpPr/>
+          <p:nvPr/>
+        </p:nvSpPr>
+        <p:spPr>
+          <a:xfrm>
+            <a:off x="7227065" y="1795749"/>
+            <a:ext cx="749147" cy="727114"/>
+          </a:xfrm>
+          <a:prstGeom prst="flowChartPreparation">
+            <a:avLst/>
+          </a:prstGeom>
+        </p:spPr>
+        <p:style>
+          <a:lnRef idx="2">
+            <a:schemeClr val="accent4">
+              <a:shade val="50000"/>
+            </a:schemeClr>
+          </a:lnRef>
+          <a:fillRef idx="1">
+            <a:schemeClr val="accent4"/>
+          </a:fillRef>
+          <a:effectRef idx="0">
+            <a:schemeClr val="accent4"/>
+          </a:effectRef>
+          <a:fontRef idx="minor">
+            <a:schemeClr val="lt1"/>
+          </a:fontRef>
+        </p:style>
+        <p:txBody>
+          <a:bodyPr rtlCol="0" anchor="ctr"/>
+          <a:lstStyle/>
+          <a:p>
+            <a:pPr algn="ctr"/>
+            <a:endParaRPr lang="nl-NL"/>
+          </a:p>
+        </p:txBody>
+      </p:sp>
+      <p:sp>
+        <p:nvSpPr>
+          <p:cNvPr id="7" name="Stroomdiagram: Voorbereiding 6"/>
+          <p:cNvSpPr/>
+          <p:nvPr/>
+        </p:nvSpPr>
+        <p:spPr>
+          <a:xfrm>
+            <a:off x="6180462" y="2787267"/>
+            <a:ext cx="749147" cy="727114"/>
+          </a:xfrm>
+          <a:prstGeom prst="flowChartPreparation">
+            <a:avLst/>
+          </a:prstGeom>
+        </p:spPr>
+        <p:style>
+          <a:lnRef idx="2">
+            <a:schemeClr val="accent5">
+              <a:shade val="50000"/>
+            </a:schemeClr>
+          </a:lnRef>
+          <a:fillRef idx="1">
+            <a:schemeClr val="accent5"/>
+          </a:fillRef>
+          <a:effectRef idx="0">
+            <a:schemeClr val="accent5"/>
+          </a:effectRef>
+          <a:fontRef idx="minor">
+            <a:schemeClr val="lt1"/>
+          </a:fontRef>
+        </p:style>
+        <p:txBody>
+          <a:bodyPr rtlCol="0" anchor="ctr"/>
+          <a:lstStyle/>
+          <a:p>
+            <a:pPr algn="ctr"/>
+            <a:endParaRPr lang="nl-NL"/>
+          </a:p>
+        </p:txBody>
+      </p:sp>
+      <p:sp>
+        <p:nvSpPr>
+          <p:cNvPr id="8" name="Stroomdiagram: Voorbereiding 7"/>
+          <p:cNvSpPr/>
+          <p:nvPr/>
+        </p:nvSpPr>
+        <p:spPr>
+          <a:xfrm>
+            <a:off x="7660550" y="3242922"/>
+            <a:ext cx="749147" cy="727114"/>
+          </a:xfrm>
+          <a:prstGeom prst="flowChartPreparation">
+            <a:avLst/>
+          </a:prstGeom>
+        </p:spPr>
+        <p:style>
+          <a:lnRef idx="2">
+            <a:schemeClr val="accent6">
+              <a:shade val="50000"/>
+            </a:schemeClr>
+          </a:lnRef>
+          <a:fillRef idx="1">
+            <a:schemeClr val="accent6"/>
+          </a:fillRef>
+          <a:effectRef idx="0">
+            <a:schemeClr val="accent6"/>
+          </a:effectRef>
+          <a:fontRef idx="minor">
+            <a:schemeClr val="lt1"/>
+          </a:fontRef>
+        </p:style>
+        <p:txBody>
+          <a:bodyPr rtlCol="0" anchor="ctr"/>
+          <a:lstStyle/>
+          <a:p>
+            <a:pPr algn="ctr"/>
+            <a:endParaRPr lang="nl-NL"/>
+          </a:p>
+        </p:txBody>
+      </p:sp>
+      <p:sp>
+        <p:nvSpPr>
+          <p:cNvPr id="9" name="PIJL-LINKS en -RECHTS 8"/>
+          <p:cNvSpPr/>
+          <p:nvPr/>
+        </p:nvSpPr>
+        <p:spPr>
+          <a:xfrm rot="19031355">
+            <a:off x="6816256" y="2554259"/>
+            <a:ext cx="495499" cy="253388"/>
+          </a:xfrm>
+          <a:prstGeom prst="leftRightArrow">
+            <a:avLst/>
+          </a:prstGeom>
+        </p:spPr>
+        <p:style>
+          <a:lnRef idx="2">
+            <a:schemeClr val="accent1">
+              <a:shade val="50000"/>
+            </a:schemeClr>
+          </a:lnRef>
+          <a:fillRef idx="1">
+            <a:schemeClr val="accent1"/>
+          </a:fillRef>
+          <a:effectRef idx="0">
+            <a:schemeClr val="accent1"/>
+          </a:effectRef>
+          <a:fontRef idx="minor">
+            <a:schemeClr val="lt1"/>
+          </a:fontRef>
+        </p:style>
+        <p:txBody>
+          <a:bodyPr rtlCol="0" anchor="ctr"/>
+          <a:lstStyle/>
+          <a:p>
+            <a:pPr algn="ctr"/>
+            <a:endParaRPr lang="nl-NL"/>
+          </a:p>
+        </p:txBody>
+      </p:sp>
+      <p:sp>
+        <p:nvSpPr>
+          <p:cNvPr id="10" name="PIJL-LINKS en -RECHTS 9"/>
+          <p:cNvSpPr/>
+          <p:nvPr/>
+        </p:nvSpPr>
+        <p:spPr>
+          <a:xfrm rot="3955412">
+            <a:off x="7591785" y="2756199"/>
+            <a:ext cx="495499" cy="253388"/>
+          </a:xfrm>
+          <a:prstGeom prst="leftRightArrow">
+            <a:avLst/>
+          </a:prstGeom>
+        </p:spPr>
+        <p:style>
+          <a:lnRef idx="2">
+            <a:schemeClr val="accent1">
+              <a:shade val="50000"/>
+            </a:schemeClr>
+          </a:lnRef>
+          <a:fillRef idx="1">
+            <a:schemeClr val="accent1"/>
+          </a:fillRef>
+          <a:effectRef idx="0">
+            <a:schemeClr val="accent1"/>
+          </a:effectRef>
+          <a:fontRef idx="minor">
+            <a:schemeClr val="lt1"/>
+          </a:fontRef>
+        </p:style>
+        <p:txBody>
+          <a:bodyPr rtlCol="0" anchor="ctr"/>
+          <a:lstStyle/>
+          <a:p>
+            <a:pPr algn="ctr"/>
+            <a:endParaRPr lang="nl-NL"/>
+          </a:p>
+        </p:txBody>
+      </p:sp>
+      <p:sp>
+        <p:nvSpPr>
+          <p:cNvPr id="11" name="PIJL-LINKS en -RECHTS 10"/>
+          <p:cNvSpPr/>
+          <p:nvPr/>
+        </p:nvSpPr>
+        <p:spPr>
+          <a:xfrm rot="1042610">
+            <a:off x="7009399" y="3353311"/>
+            <a:ext cx="495499" cy="253388"/>
+          </a:xfrm>
+          <a:prstGeom prst="leftRightArrow">
+            <a:avLst/>
+          </a:prstGeom>
+        </p:spPr>
+        <p:style>
+          <a:lnRef idx="2">
+            <a:schemeClr val="accent1">
+              <a:shade val="50000"/>
+            </a:schemeClr>
+          </a:lnRef>
+          <a:fillRef idx="1">
+            <a:schemeClr val="accent1"/>
+          </a:fillRef>
+          <a:effectRef idx="0">
+            <a:schemeClr val="accent1"/>
+          </a:effectRef>
+          <a:fontRef idx="minor">
+            <a:schemeClr val="lt1"/>
+          </a:fontRef>
+        </p:style>
+        <p:txBody>
+          <a:bodyPr rtlCol="0" anchor="ctr"/>
+          <a:lstStyle/>
+          <a:p>
+            <a:pPr algn="ctr"/>
+            <a:endParaRPr lang="nl-NL"/>
+          </a:p>
+        </p:txBody>
+      </p:sp>
     </p:spTree>
     <p:extLst>
       <p:ext uri="{BB962C8B-B14F-4D97-AF65-F5344CB8AC3E}">
-        <p14:creationId xmlns:p14="http://schemas.microsoft.com/office/powerpoint/2010/main" val="228284538"/>
+        <p14:creationId xmlns:p14="http://schemas.microsoft.com/office/powerpoint/2010/main" val="984705171"/>
       </p:ext>
     </p:extLst>
   </p:cSld>
@@ -11052,147 +12933,6 @@
 </file>
 
 <file path=ppt/slides/slide13.xml><?xml version="1.0" encoding="utf-8"?>
-<p:sld xmlns:a="http://schemas.openxmlformats.org/drawingml/2006/main" xmlns:r="http://schemas.openxmlformats.org/officeDocument/2006/relationships" xmlns:p="http://schemas.openxmlformats.org/presentationml/2006/main">
-  <p:cSld>
-    <p:spTree>
-      <p:nvGrpSpPr>
-        <p:cNvPr id="1" name=""/>
-        <p:cNvGrpSpPr/>
-        <p:nvPr/>
-      </p:nvGrpSpPr>
-      <p:grpSpPr>
-        <a:xfrm>
-          <a:off x="0" y="0"/>
-          <a:ext cx="0" cy="0"/>
-          <a:chOff x="0" y="0"/>
-          <a:chExt cx="0" cy="0"/>
-        </a:xfrm>
-      </p:grpSpPr>
-      <p:sp>
-        <p:nvSpPr>
-          <p:cNvPr id="2" name="Title 1"/>
-          <p:cNvSpPr>
-            <a:spLocks noGrp="1"/>
-          </p:cNvSpPr>
-          <p:nvPr>
-            <p:ph type="title"/>
-          </p:nvPr>
-        </p:nvSpPr>
-        <p:spPr/>
-        <p:txBody>
-          <a:bodyPr/>
-          <a:lstStyle/>
-          <a:p>
-            <a:r>
-              <a:rPr lang="en-US" dirty="0" smtClean="0"/>
-              <a:t>containers</a:t>
-            </a:r>
-            <a:endParaRPr lang="nl-NL" dirty="0"/>
-          </a:p>
-        </p:txBody>
-      </p:sp>
-      <p:sp>
-        <p:nvSpPr>
-          <p:cNvPr id="3" name="Content Placeholder 2"/>
-          <p:cNvSpPr>
-            <a:spLocks noGrp="1"/>
-          </p:cNvSpPr>
-          <p:nvPr>
-            <p:ph idx="1"/>
-          </p:nvPr>
-        </p:nvSpPr>
-        <p:spPr/>
-        <p:txBody>
-          <a:bodyPr/>
-          <a:lstStyle/>
-          <a:p>
-            <a:endParaRPr lang="nl-NL"/>
-          </a:p>
-        </p:txBody>
-      </p:sp>
-      <p:sp>
-        <p:nvSpPr>
-          <p:cNvPr id="4" name="Date Placeholder 3"/>
-          <p:cNvSpPr>
-            <a:spLocks noGrp="1"/>
-          </p:cNvSpPr>
-          <p:nvPr>
-            <p:ph type="dt" sz="half" idx="10"/>
-          </p:nvPr>
-        </p:nvSpPr>
-        <p:spPr/>
-        <p:txBody>
-          <a:bodyPr vert="horz" lIns="91440" tIns="45720" rIns="91440" bIns="45720" rtlCol="0" anchor="ctr"/>
-          <a:lstStyle/>
-          <a:p>
-            <a:fld id="{04CD1086-3B71-4C25-837E-4E0818FA3416}" type="datetime4">
-              <a:rPr lang="nl-NL" sz="900" cap="all" smtClean="0">
-                <a:solidFill>
-                  <a:srgbClr val="009036"/>
-                </a:solidFill>
-              </a:rPr>
-              <a:t>1 augustus 2017</a:t>
-            </a:fld>
-            <a:endParaRPr lang="nl-NL" sz="900" cap="all" dirty="0">
-              <a:solidFill>
-                <a:srgbClr val="009036"/>
-              </a:solidFill>
-            </a:endParaRPr>
-          </a:p>
-        </p:txBody>
-      </p:sp>
-      <p:sp>
-        <p:nvSpPr>
-          <p:cNvPr id="5" name="Footer Placeholder 4"/>
-          <p:cNvSpPr>
-            <a:spLocks noGrp="1"/>
-          </p:cNvSpPr>
-          <p:nvPr>
-            <p:ph type="ftr" sz="quarter" idx="11"/>
-          </p:nvPr>
-        </p:nvSpPr>
-        <p:spPr/>
-        <p:txBody>
-          <a:bodyPr vert="horz" lIns="91440" tIns="45720" rIns="91440" bIns="45720" rtlCol="0" anchor="ctr"/>
-          <a:lstStyle/>
-          <a:p>
-            <a:r>
-              <a:rPr lang="nl-NL">
-                <a:solidFill>
-                  <a:srgbClr val="009036"/>
-                </a:solidFill>
-              </a:rPr>
-              <a:t>Johannes Sim &amp; Renzo veldkamp</a:t>
-            </a:r>
-            <a:endParaRPr lang="nl-NL" dirty="0">
-              <a:solidFill>
-                <a:srgbClr val="009036"/>
-              </a:solidFill>
-            </a:endParaRPr>
-          </a:p>
-        </p:txBody>
-      </p:sp>
-    </p:spTree>
-    <p:extLst>
-      <p:ext uri="{BB962C8B-B14F-4D97-AF65-F5344CB8AC3E}">
-        <p14:creationId xmlns:p14="http://schemas.microsoft.com/office/powerpoint/2010/main" val="1746241969"/>
-      </p:ext>
-    </p:extLst>
-  </p:cSld>
-  <p:clrMapOvr>
-    <a:masterClrMapping/>
-  </p:clrMapOvr>
-  <p:timing>
-    <p:tnLst>
-      <p:par>
-        <p:cTn id="1" dur="indefinite" restart="never" nodeType="tmRoot"/>
-      </p:par>
-    </p:tnLst>
-  </p:timing>
-</p:sld>
-</file>
-
-<file path=ppt/slides/slide14.xml><?xml version="1.0" encoding="utf-8"?>
 <p:sld xmlns:a="http://schemas.openxmlformats.org/drawingml/2006/main" xmlns:r="http://schemas.openxmlformats.org/officeDocument/2006/relationships" xmlns:p="http://schemas.openxmlformats.org/presentationml/2006/main">
   <p:cSld>
     <p:spTree>
@@ -11511,6 +13251,159 @@
 </p:sld>
 </file>
 
+<file path=ppt/slides/slide14.xml><?xml version="1.0" encoding="utf-8"?>
+<p:sld xmlns:a="http://schemas.openxmlformats.org/drawingml/2006/main" xmlns:r="http://schemas.openxmlformats.org/officeDocument/2006/relationships" xmlns:p="http://schemas.openxmlformats.org/presentationml/2006/main">
+  <p:cSld>
+    <p:spTree>
+      <p:nvGrpSpPr>
+        <p:cNvPr id="1" name=""/>
+        <p:cNvGrpSpPr/>
+        <p:nvPr/>
+      </p:nvGrpSpPr>
+      <p:grpSpPr>
+        <a:xfrm>
+          <a:off x="0" y="0"/>
+          <a:ext cx="0" cy="0"/>
+          <a:chOff x="0" y="0"/>
+          <a:chExt cx="0" cy="0"/>
+        </a:xfrm>
+      </p:grpSpPr>
+      <p:sp>
+        <p:nvSpPr>
+          <p:cNvPr id="2" name="Title 1"/>
+          <p:cNvSpPr>
+            <a:spLocks noGrp="1"/>
+          </p:cNvSpPr>
+          <p:nvPr>
+            <p:ph type="title"/>
+          </p:nvPr>
+        </p:nvSpPr>
+        <p:spPr/>
+        <p:txBody>
+          <a:bodyPr/>
+          <a:lstStyle/>
+          <a:p>
+            <a:r>
+              <a:rPr lang="en-US" dirty="0" err="1" smtClean="0"/>
+              <a:t>docker</a:t>
+            </a:r>
+            <a:r>
+              <a:rPr lang="en-US" dirty="0" smtClean="0"/>
+              <a:t> 101</a:t>
+            </a:r>
+            <a:endParaRPr lang="nl-NL" dirty="0"/>
+          </a:p>
+        </p:txBody>
+      </p:sp>
+      <p:sp>
+        <p:nvSpPr>
+          <p:cNvPr id="3" name="Content Placeholder 2"/>
+          <p:cNvSpPr>
+            <a:spLocks noGrp="1"/>
+          </p:cNvSpPr>
+          <p:nvPr>
+            <p:ph idx="1"/>
+          </p:nvPr>
+        </p:nvSpPr>
+        <p:spPr/>
+        <p:txBody>
+          <a:bodyPr/>
+          <a:lstStyle/>
+          <a:p>
+            <a:endParaRPr lang="nl-NL"/>
+          </a:p>
+        </p:txBody>
+      </p:sp>
+      <p:sp>
+        <p:nvSpPr>
+          <p:cNvPr id="4" name="Date Placeholder 3"/>
+          <p:cNvSpPr>
+            <a:spLocks noGrp="1"/>
+          </p:cNvSpPr>
+          <p:nvPr>
+            <p:ph type="dt" sz="half" idx="10"/>
+          </p:nvPr>
+        </p:nvSpPr>
+        <p:spPr/>
+        <p:txBody>
+          <a:bodyPr vert="horz" lIns="91440" tIns="45720" rIns="91440" bIns="45720" rtlCol="0" anchor="ctr"/>
+          <a:lstStyle/>
+          <a:p>
+            <a:fld id="{F1AB6312-83EC-4EC1-A593-E0D1CF285DA2}" type="datetime4">
+              <a:rPr lang="nl-NL" sz="900" cap="all" smtClean="0">
+                <a:solidFill>
+                  <a:srgbClr val="009036"/>
+                </a:solidFill>
+              </a:rPr>
+              <a:t>1 augustus 2017</a:t>
+            </a:fld>
+            <a:endParaRPr lang="nl-NL" sz="900" cap="all" dirty="0">
+              <a:solidFill>
+                <a:srgbClr val="009036"/>
+              </a:solidFill>
+            </a:endParaRPr>
+          </a:p>
+        </p:txBody>
+      </p:sp>
+      <p:sp>
+        <p:nvSpPr>
+          <p:cNvPr id="5" name="Footer Placeholder 4"/>
+          <p:cNvSpPr>
+            <a:spLocks noGrp="1"/>
+          </p:cNvSpPr>
+          <p:nvPr>
+            <p:ph type="ftr" sz="quarter" idx="11"/>
+          </p:nvPr>
+        </p:nvSpPr>
+        <p:spPr/>
+        <p:txBody>
+          <a:bodyPr vert="horz" lIns="91440" tIns="45720" rIns="91440" bIns="45720" rtlCol="0" anchor="ctr"/>
+          <a:lstStyle/>
+          <a:p>
+            <a:r>
+              <a:rPr lang="nl-NL" dirty="0">
+                <a:solidFill>
+                  <a:srgbClr val="009036"/>
+                </a:solidFill>
+              </a:rPr>
+              <a:t>Johannes Sim &amp; Renzo </a:t>
+            </a:r>
+            <a:r>
+              <a:rPr lang="nl-NL" dirty="0" err="1">
+                <a:solidFill>
+                  <a:srgbClr val="009036"/>
+                </a:solidFill>
+              </a:rPr>
+              <a:t>veldkamp</a:t>
+            </a:r>
+            <a:endParaRPr lang="nl-NL" dirty="0">
+              <a:solidFill>
+                <a:srgbClr val="009036"/>
+              </a:solidFill>
+            </a:endParaRPr>
+          </a:p>
+        </p:txBody>
+      </p:sp>
+    </p:spTree>
+    <p:extLst>
+      <p:ext uri="{BB962C8B-B14F-4D97-AF65-F5344CB8AC3E}">
+        <p14:creationId xmlns:p14="http://schemas.microsoft.com/office/powerpoint/2010/main" val="228284538"/>
+      </p:ext>
+    </p:extLst>
+  </p:cSld>
+  <p:clrMapOvr>
+    <a:masterClrMapping/>
+  </p:clrMapOvr>
+  <p:timing>
+    <p:tnLst>
+      <p:par>
+        <p:cTn id="1" dur="indefinite" restart="never" nodeType="tmRoot"/>
+      </p:par>
+    </p:tnLst>
+  </p:timing>
+</p:sld>
+</file>
+
 <file path=ppt/slides/slide15.xml><?xml version="1.0" encoding="utf-8"?>
 <p:sld xmlns:a="http://schemas.openxmlformats.org/drawingml/2006/main" xmlns:r="http://schemas.openxmlformats.org/officeDocument/2006/relationships" xmlns:p="http://schemas.openxmlformats.org/presentationml/2006/main">
   <p:cSld>
@@ -11980,6 +13873,13 @@
   <p:clrMapOvr>
     <a:masterClrMapping/>
   </p:clrMapOvr>
+  <p:timing>
+    <p:tnLst>
+      <p:par>
+        <p:cTn id="1" dur="indefinite" restart="never" nodeType="tmRoot"/>
+      </p:par>
+    </p:tnLst>
+  </p:timing>
 </p:sld>
 </file>
 
@@ -12359,6 +14259,213 @@
       </p:grpSpPr>
       <p:sp>
         <p:nvSpPr>
+          <p:cNvPr id="2" name="Title 1"/>
+          <p:cNvSpPr>
+            <a:spLocks noGrp="1"/>
+          </p:cNvSpPr>
+          <p:nvPr>
+            <p:ph type="title"/>
+          </p:nvPr>
+        </p:nvSpPr>
+        <p:spPr/>
+        <p:txBody>
+          <a:bodyPr/>
+          <a:lstStyle/>
+          <a:p>
+            <a:r>
+              <a:rPr lang="nl-NL" dirty="0" smtClean="0"/>
+              <a:t>Doelstellingen</a:t>
+            </a:r>
+            <a:endParaRPr lang="nl-NL" dirty="0"/>
+          </a:p>
+        </p:txBody>
+      </p:sp>
+      <p:sp>
+        <p:nvSpPr>
+          <p:cNvPr id="3" name="Content Placeholder 2"/>
+          <p:cNvSpPr>
+            <a:spLocks noGrp="1"/>
+          </p:cNvSpPr>
+          <p:nvPr>
+            <p:ph idx="1"/>
+          </p:nvPr>
+        </p:nvSpPr>
+        <p:spPr/>
+        <p:txBody>
+          <a:bodyPr/>
+          <a:lstStyle/>
+          <a:p>
+            <a:r>
+              <a:rPr lang="en-US" dirty="0" err="1" smtClean="0"/>
+              <a:t>Kennis</a:t>
+            </a:r>
+            <a:r>
+              <a:rPr lang="en-US" dirty="0" smtClean="0"/>
+              <a:t> </a:t>
+            </a:r>
+            <a:r>
+              <a:rPr lang="en-US" dirty="0"/>
+              <a:t>over </a:t>
+            </a:r>
+            <a:r>
+              <a:rPr lang="en-US" dirty="0" err="1" smtClean="0"/>
+              <a:t>microservices</a:t>
+            </a:r>
+            <a:endParaRPr lang="en-US" dirty="0"/>
+          </a:p>
+          <a:p>
+            <a:r>
+              <a:rPr lang="en-US" dirty="0" err="1" smtClean="0"/>
+              <a:t>Kennis</a:t>
+            </a:r>
+            <a:r>
+              <a:rPr lang="en-US" dirty="0" smtClean="0"/>
+              <a:t> </a:t>
+            </a:r>
+            <a:r>
+              <a:rPr lang="en-US" dirty="0"/>
+              <a:t>over Docker / </a:t>
+            </a:r>
+            <a:r>
+              <a:rPr lang="en-US" dirty="0" smtClean="0"/>
+              <a:t>containers</a:t>
+            </a:r>
+          </a:p>
+          <a:p>
+            <a:r>
+              <a:rPr lang="en-US" dirty="0" err="1" smtClean="0"/>
+              <a:t>Praktische</a:t>
+            </a:r>
+            <a:r>
+              <a:rPr lang="en-US" dirty="0" smtClean="0"/>
+              <a:t> </a:t>
+            </a:r>
+            <a:r>
+              <a:rPr lang="en-US" dirty="0" err="1"/>
+              <a:t>ervaring</a:t>
+            </a:r>
+            <a:r>
+              <a:rPr lang="en-US" dirty="0"/>
+              <a:t> (workshop)</a:t>
+            </a:r>
+          </a:p>
+          <a:p>
+            <a:pPr marL="0" indent="0">
+              <a:buNone/>
+            </a:pPr>
+            <a:endParaRPr lang="nl-NL" dirty="0"/>
+          </a:p>
+        </p:txBody>
+      </p:sp>
+      <p:sp>
+        <p:nvSpPr>
+          <p:cNvPr id="4" name="Date Placeholder 3"/>
+          <p:cNvSpPr>
+            <a:spLocks noGrp="1"/>
+          </p:cNvSpPr>
+          <p:nvPr>
+            <p:ph type="dt" sz="half" idx="10"/>
+          </p:nvPr>
+        </p:nvSpPr>
+        <p:spPr/>
+        <p:txBody>
+          <a:bodyPr/>
+          <a:lstStyle/>
+          <a:p>
+            <a:fld id="{249B52C1-75DC-496B-AF3F-4978B95BB865}" type="datetime4">
+              <a:rPr lang="nl-NL" sz="900" cap="all">
+                <a:solidFill>
+                  <a:srgbClr val="009036"/>
+                </a:solidFill>
+              </a:rPr>
+              <a:t>1 augustus 2017</a:t>
+            </a:fld>
+            <a:endParaRPr lang="nl-NL" sz="900" cap="all" dirty="0">
+              <a:solidFill>
+                <a:srgbClr val="009036"/>
+              </a:solidFill>
+            </a:endParaRPr>
+          </a:p>
+        </p:txBody>
+      </p:sp>
+      <p:sp>
+        <p:nvSpPr>
+          <p:cNvPr id="5" name="Footer Placeholder 4"/>
+          <p:cNvSpPr>
+            <a:spLocks noGrp="1"/>
+          </p:cNvSpPr>
+          <p:nvPr>
+            <p:ph type="ftr" sz="quarter" idx="11"/>
+          </p:nvPr>
+        </p:nvSpPr>
+        <p:spPr/>
+        <p:txBody>
+          <a:bodyPr/>
+          <a:lstStyle/>
+          <a:p>
+            <a:r>
+              <a:rPr lang="nl-NL" dirty="0">
+                <a:solidFill>
+                  <a:srgbClr val="009036"/>
+                </a:solidFill>
+              </a:rPr>
+              <a:t>Johannes Sim &amp; Renzo </a:t>
+            </a:r>
+            <a:r>
+              <a:rPr lang="nl-NL" dirty="0" err="1">
+                <a:solidFill>
+                  <a:srgbClr val="009036"/>
+                </a:solidFill>
+              </a:rPr>
+              <a:t>veldkamp</a:t>
+            </a:r>
+            <a:endParaRPr lang="nl-NL" dirty="0">
+              <a:solidFill>
+                <a:srgbClr val="009036"/>
+              </a:solidFill>
+            </a:endParaRPr>
+          </a:p>
+        </p:txBody>
+      </p:sp>
+    </p:spTree>
+    <p:extLst>
+      <p:ext uri="{BB962C8B-B14F-4D97-AF65-F5344CB8AC3E}">
+        <p14:creationId xmlns:p14="http://schemas.microsoft.com/office/powerpoint/2010/main" val="2474596652"/>
+      </p:ext>
+    </p:extLst>
+  </p:cSld>
+  <p:clrMapOvr>
+    <a:masterClrMapping/>
+  </p:clrMapOvr>
+  <p:timing>
+    <p:tnLst>
+      <p:par>
+        <p:cTn id="1" dur="indefinite" restart="never" nodeType="tmRoot"/>
+      </p:par>
+    </p:tnLst>
+  </p:timing>
+</p:sld>
+</file>
+
+<file path=ppt/slides/slide3.xml><?xml version="1.0" encoding="utf-8"?>
+<p:sld xmlns:a="http://schemas.openxmlformats.org/drawingml/2006/main" xmlns:r="http://schemas.openxmlformats.org/officeDocument/2006/relationships" xmlns:p="http://schemas.openxmlformats.org/presentationml/2006/main">
+  <p:cSld>
+    <p:spTree>
+      <p:nvGrpSpPr>
+        <p:cNvPr id="1" name=""/>
+        <p:cNvGrpSpPr/>
+        <p:nvPr/>
+      </p:nvGrpSpPr>
+      <p:grpSpPr>
+        <a:xfrm>
+          <a:off x="0" y="0"/>
+          <a:ext cx="0" cy="0"/>
+          <a:chOff x="0" y="0"/>
+          <a:chExt cx="0" cy="0"/>
+        </a:xfrm>
+      </p:grpSpPr>
+      <p:sp>
+        <p:nvSpPr>
           <p:cNvPr id="2" name="Titel 1"/>
           <p:cNvSpPr>
             <a:spLocks noGrp="1"/>
@@ -12409,7 +14516,11 @@
             </a:pPr>
             <a:r>
               <a:rPr lang="nl-NL" dirty="0" smtClean="0"/>
-              <a:t>Microservices architectuur</a:t>
+              <a:t>Microservices </a:t>
+            </a:r>
+            <a:r>
+              <a:rPr lang="nl-NL" dirty="0" smtClean="0"/>
+              <a:t>architectuur</a:t>
             </a:r>
           </a:p>
           <a:p>
@@ -12626,7 +14737,7 @@
 </p:sld>
 </file>
 
-<file path=ppt/slides/slide3.xml><?xml version="1.0" encoding="utf-8"?>
+<file path=ppt/slides/slide4.xml><?xml version="1.0" encoding="utf-8"?>
 <p:sld xmlns:a="http://schemas.openxmlformats.org/drawingml/2006/main" xmlns:r="http://schemas.openxmlformats.org/officeDocument/2006/relationships" xmlns:p="http://schemas.openxmlformats.org/presentationml/2006/main">
   <p:cSld>
     <p:spTree>
@@ -12860,7 +14971,7 @@
 </p:sld>
 </file>
 
-<file path=ppt/slides/slide4.xml><?xml version="1.0" encoding="utf-8"?>
+<file path=ppt/slides/slide5.xml><?xml version="1.0" encoding="utf-8"?>
 <p:sld xmlns:a="http://schemas.openxmlformats.org/drawingml/2006/main" xmlns:r="http://schemas.openxmlformats.org/officeDocument/2006/relationships" xmlns:p="http://schemas.openxmlformats.org/presentationml/2006/main">
   <p:cSld>
     <p:spTree>
@@ -13082,7 +15193,7 @@
 </p:sld>
 </file>
 
-<file path=ppt/slides/slide5.xml><?xml version="1.0" encoding="utf-8"?>
+<file path=ppt/slides/slide6.xml><?xml version="1.0" encoding="utf-8"?>
 <p:sld xmlns:a="http://schemas.openxmlformats.org/drawingml/2006/main" xmlns:r="http://schemas.openxmlformats.org/officeDocument/2006/relationships" xmlns:p="http://schemas.openxmlformats.org/presentationml/2006/main">
   <p:cSld>
     <p:spTree>
@@ -16364,7 +18475,7 @@
 </p:sld>
 </file>
 
-<file path=ppt/slides/slide6.xml><?xml version="1.0" encoding="utf-8"?>
+<file path=ppt/slides/slide7.xml><?xml version="1.0" encoding="utf-8"?>
 <p:sld xmlns:a="http://schemas.openxmlformats.org/drawingml/2006/main" xmlns:r="http://schemas.openxmlformats.org/officeDocument/2006/relationships" xmlns:p="http://schemas.openxmlformats.org/presentationml/2006/main">
   <p:cSld>
     <p:spTree>
@@ -16682,7 +18793,7 @@
 </p:sld>
 </file>
 
-<file path=ppt/slides/slide7.xml><?xml version="1.0" encoding="utf-8"?>
+<file path=ppt/slides/slide8.xml><?xml version="1.0" encoding="utf-8"?>
 <p:sld xmlns:a="http://schemas.openxmlformats.org/drawingml/2006/main" xmlns:r="http://schemas.openxmlformats.org/officeDocument/2006/relationships" xmlns:p="http://schemas.openxmlformats.org/presentationml/2006/main">
   <p:cSld>
     <p:spTree>
@@ -17037,229 +19148,6 @@
 </p:sld>
 </file>
 
-<file path=ppt/slides/slide8.xml><?xml version="1.0" encoding="utf-8"?>
-<p:sld xmlns:a="http://schemas.openxmlformats.org/drawingml/2006/main" xmlns:r="http://schemas.openxmlformats.org/officeDocument/2006/relationships" xmlns:p="http://schemas.openxmlformats.org/presentationml/2006/main">
-  <p:cSld>
-    <p:spTree>
-      <p:nvGrpSpPr>
-        <p:cNvPr id="1" name=""/>
-        <p:cNvGrpSpPr/>
-        <p:nvPr/>
-      </p:nvGrpSpPr>
-      <p:grpSpPr>
-        <a:xfrm>
-          <a:off x="0" y="0"/>
-          <a:ext cx="0" cy="0"/>
-          <a:chOff x="0" y="0"/>
-          <a:chExt cx="0" cy="0"/>
-        </a:xfrm>
-      </p:grpSpPr>
-      <p:sp>
-        <p:nvSpPr>
-          <p:cNvPr id="2" name="Title 1"/>
-          <p:cNvSpPr>
-            <a:spLocks noGrp="1"/>
-          </p:cNvSpPr>
-          <p:nvPr>
-            <p:ph type="title"/>
-          </p:nvPr>
-        </p:nvSpPr>
-        <p:spPr/>
-        <p:txBody>
-          <a:bodyPr/>
-          <a:lstStyle/>
-          <a:p>
-            <a:pPr>
-              <a:spcAft>
-                <a:spcPts val="600"/>
-              </a:spcAft>
-            </a:pPr>
-            <a:r>
-              <a:rPr lang="nl-NL" dirty="0" smtClean="0"/>
-              <a:t>Gevolgen voor bouw</a:t>
-            </a:r>
-            <a:endParaRPr lang="nl-NL" dirty="0"/>
-          </a:p>
-        </p:txBody>
-      </p:sp>
-      <p:sp>
-        <p:nvSpPr>
-          <p:cNvPr id="3" name="Content Placeholder 2"/>
-          <p:cNvSpPr>
-            <a:spLocks noGrp="1"/>
-          </p:cNvSpPr>
-          <p:nvPr>
-            <p:ph idx="1"/>
-          </p:nvPr>
-        </p:nvSpPr>
-        <p:spPr/>
-        <p:txBody>
-          <a:bodyPr/>
-          <a:lstStyle/>
-          <a:p>
-            <a:pPr>
-              <a:spcAft>
-                <a:spcPts val="600"/>
-              </a:spcAft>
-            </a:pPr>
-            <a:r>
-              <a:rPr lang="nl-NL" dirty="0" smtClean="0"/>
-              <a:t>API-management</a:t>
-            </a:r>
-          </a:p>
-          <a:p>
-            <a:pPr>
-              <a:spcAft>
-                <a:spcPts val="600"/>
-              </a:spcAft>
-            </a:pPr>
-            <a:r>
-              <a:rPr lang="nl-NL" dirty="0" smtClean="0"/>
-              <a:t>(Technisch) ontwerp</a:t>
-            </a:r>
-          </a:p>
-          <a:p>
-            <a:pPr>
-              <a:spcAft>
-                <a:spcPts val="600"/>
-              </a:spcAft>
-            </a:pPr>
-            <a:r>
-              <a:rPr lang="nl-NL" dirty="0"/>
-              <a:t>Source </a:t>
-            </a:r>
-            <a:r>
-              <a:rPr lang="nl-NL" dirty="0" smtClean="0"/>
-              <a:t>control</a:t>
-            </a:r>
-          </a:p>
-          <a:p>
-            <a:pPr>
-              <a:spcAft>
-                <a:spcPts val="600"/>
-              </a:spcAft>
-            </a:pPr>
-            <a:r>
-              <a:rPr lang="en-US" dirty="0" smtClean="0"/>
-              <a:t>Per service minder code:</a:t>
-            </a:r>
-          </a:p>
-          <a:p>
-            <a:pPr lvl="1">
-              <a:spcAft>
-                <a:spcPts val="600"/>
-              </a:spcAft>
-            </a:pPr>
-            <a:r>
-              <a:rPr lang="en-US" dirty="0" smtClean="0"/>
-              <a:t>Meer </a:t>
-            </a:r>
-            <a:r>
-              <a:rPr lang="en-US" dirty="0" err="1" smtClean="0"/>
-              <a:t>overzicht</a:t>
-            </a:r>
-            <a:endParaRPr lang="nl-NL" dirty="0" smtClean="0"/>
-          </a:p>
-          <a:p>
-            <a:pPr lvl="1">
-              <a:spcAft>
-                <a:spcPts val="600"/>
-              </a:spcAft>
-            </a:pPr>
-            <a:r>
-              <a:rPr lang="nl-NL" dirty="0" smtClean="0"/>
-              <a:t>Gemakkelijker </a:t>
-            </a:r>
-            <a:r>
-              <a:rPr lang="nl-NL" dirty="0" err="1" smtClean="0"/>
-              <a:t>testbaar</a:t>
-            </a:r>
-            <a:endParaRPr lang="nl-NL" dirty="0"/>
-          </a:p>
-        </p:txBody>
-      </p:sp>
-      <p:sp>
-        <p:nvSpPr>
-          <p:cNvPr id="4" name="Date Placeholder 3"/>
-          <p:cNvSpPr>
-            <a:spLocks noGrp="1"/>
-          </p:cNvSpPr>
-          <p:nvPr>
-            <p:ph type="dt" sz="half" idx="10"/>
-          </p:nvPr>
-        </p:nvSpPr>
-        <p:spPr/>
-        <p:txBody>
-          <a:bodyPr vert="horz" lIns="91440" tIns="45720" rIns="91440" bIns="45720" rtlCol="0" anchor="ctr"/>
-          <a:lstStyle/>
-          <a:p>
-            <a:fld id="{4C9CBE32-DCA6-48E5-A467-8D4549A09931}" type="datetime4">
-              <a:rPr lang="nl-NL" sz="900" cap="all" smtClean="0">
-                <a:solidFill>
-                  <a:srgbClr val="009036"/>
-                </a:solidFill>
-              </a:rPr>
-              <a:t>1 augustus 2017</a:t>
-            </a:fld>
-            <a:endParaRPr lang="nl-NL" sz="900" cap="all" dirty="0">
-              <a:solidFill>
-                <a:srgbClr val="009036"/>
-              </a:solidFill>
-            </a:endParaRPr>
-          </a:p>
-        </p:txBody>
-      </p:sp>
-      <p:sp>
-        <p:nvSpPr>
-          <p:cNvPr id="5" name="Footer Placeholder 4"/>
-          <p:cNvSpPr>
-            <a:spLocks noGrp="1"/>
-          </p:cNvSpPr>
-          <p:nvPr>
-            <p:ph type="ftr" sz="quarter" idx="11"/>
-          </p:nvPr>
-        </p:nvSpPr>
-        <p:spPr/>
-        <p:txBody>
-          <a:bodyPr vert="horz" lIns="91440" tIns="45720" rIns="91440" bIns="45720" rtlCol="0" anchor="ctr"/>
-          <a:lstStyle/>
-          <a:p>
-            <a:r>
-              <a:rPr lang="nl-NL" smtClean="0">
-                <a:solidFill>
-                  <a:srgbClr val="009036"/>
-                </a:solidFill>
-              </a:rPr>
-              <a:t>Johannes Sim &amp; Renzo veldkamp</a:t>
-            </a:r>
-            <a:endParaRPr lang="nl-NL" dirty="0">
-              <a:solidFill>
-                <a:srgbClr val="009036"/>
-              </a:solidFill>
-            </a:endParaRPr>
-          </a:p>
-        </p:txBody>
-      </p:sp>
-    </p:spTree>
-    <p:extLst>
-      <p:ext uri="{BB962C8B-B14F-4D97-AF65-F5344CB8AC3E}">
-        <p14:creationId xmlns:p14="http://schemas.microsoft.com/office/powerpoint/2010/main" val="1207939636"/>
-      </p:ext>
-    </p:extLst>
-  </p:cSld>
-  <p:clrMapOvr>
-    <a:masterClrMapping/>
-  </p:clrMapOvr>
-  <p:timing>
-    <p:tnLst>
-      <p:par>
-        <p:cTn id="1" dur="indefinite" restart="never" nodeType="tmRoot"/>
-      </p:par>
-    </p:tnLst>
-  </p:timing>
-</p:sld>
-</file>
-
 <file path=ppt/slides/slide9.xml><?xml version="1.0" encoding="utf-8"?>
 <p:sld xmlns:a="http://schemas.openxmlformats.org/drawingml/2006/main" xmlns:r="http://schemas.openxmlformats.org/officeDocument/2006/relationships" xmlns:p="http://schemas.openxmlformats.org/presentationml/2006/main">
   <p:cSld>
@@ -17299,11 +19187,8 @@
             </a:pPr>
             <a:r>
               <a:rPr lang="nl-NL" dirty="0" smtClean="0"/>
-              <a:t>Gevolgen voor deployment</a:t>
-            </a:r>
-            <a:br>
-              <a:rPr lang="nl-NL" dirty="0" smtClean="0"/>
-            </a:br>
+              <a:t>Gevolgen voor bouw</a:t>
+            </a:r>
             <a:endParaRPr lang="nl-NL" dirty="0"/>
           </a:p>
         </p:txBody>
@@ -17330,25 +19215,7 @@
             </a:pPr>
             <a:r>
               <a:rPr lang="nl-NL" dirty="0" smtClean="0"/>
-              <a:t>Zoveel mogelijk geautomatiseerde </a:t>
-            </a:r>
-            <a:r>
-              <a:rPr lang="nl-NL" dirty="0" err="1" smtClean="0"/>
-              <a:t>deployment</a:t>
-            </a:r>
-            <a:r>
-              <a:rPr lang="nl-NL" dirty="0" smtClean="0"/>
-              <a:t> </a:t>
-            </a:r>
-            <a:r>
-              <a:rPr lang="nl-NL" dirty="0" smtClean="0">
-                <a:sym typeface="Wingdings" panose="05000000000000000000" pitchFamily="2" charset="2"/>
-              </a:rPr>
-              <a:t> </a:t>
-            </a:r>
-            <a:r>
-              <a:rPr lang="nl-NL" dirty="0" smtClean="0"/>
-              <a:t>CI/CD!</a:t>
+              <a:t>API-management</a:t>
             </a:r>
           </a:p>
           <a:p>
@@ -17359,7 +19226,7 @@
             </a:pPr>
             <a:r>
               <a:rPr lang="nl-NL" dirty="0" smtClean="0"/>
-              <a:t>‘Rolling updates’</a:t>
+              <a:t>(Technisch) ontwerp</a:t>
             </a:r>
           </a:p>
           <a:p>
@@ -17369,8 +19236,54 @@
               </a:spcAft>
             </a:pPr>
             <a:r>
+              <a:rPr lang="nl-NL" dirty="0"/>
+              <a:t>Source </a:t>
+            </a:r>
+            <a:r>
               <a:rPr lang="nl-NL" dirty="0" smtClean="0"/>
-              <a:t>Traceerbaarheid</a:t>
+              <a:t>control</a:t>
+            </a:r>
+          </a:p>
+          <a:p>
+            <a:pPr>
+              <a:spcAft>
+                <a:spcPts val="600"/>
+              </a:spcAft>
+            </a:pPr>
+            <a:r>
+              <a:rPr lang="en-US" dirty="0" smtClean="0"/>
+              <a:t>Per service minder code:</a:t>
+            </a:r>
+          </a:p>
+          <a:p>
+            <a:pPr lvl="1">
+              <a:spcAft>
+                <a:spcPts val="600"/>
+              </a:spcAft>
+            </a:pPr>
+            <a:r>
+              <a:rPr lang="en-US" dirty="0" smtClean="0"/>
+              <a:t>Meer </a:t>
+            </a:r>
+            <a:r>
+              <a:rPr lang="en-US" dirty="0" err="1" smtClean="0"/>
+              <a:t>overzicht</a:t>
+            </a:r>
+            <a:endParaRPr lang="nl-NL" dirty="0" smtClean="0"/>
+          </a:p>
+          <a:p>
+            <a:pPr lvl="1">
+              <a:spcAft>
+                <a:spcPts val="600"/>
+              </a:spcAft>
+            </a:pPr>
+            <a:r>
+              <a:rPr lang="nl-NL" dirty="0" smtClean="0"/>
+              <a:t>Gemakkelijker </a:t>
+            </a:r>
+            <a:r>
+              <a:rPr lang="nl-NL" dirty="0" err="1" smtClean="0"/>
+              <a:t>testbaar</a:t>
             </a:r>
             <a:endParaRPr lang="nl-NL" dirty="0"/>
           </a:p>
@@ -17391,7 +19304,7 @@
           <a:bodyPr vert="horz" lIns="91440" tIns="45720" rIns="91440" bIns="45720" rtlCol="0" anchor="ctr"/>
           <a:lstStyle/>
           <a:p>
-            <a:fld id="{3A2B0FBA-51B9-435A-843F-7AC2A474B4B8}" type="datetime4">
+            <a:fld id="{4C9CBE32-DCA6-48E5-A467-8D4549A09931}" type="datetime4">
               <a:rPr lang="nl-NL" sz="900" cap="all" smtClean="0">
                 <a:solidFill>
                   <a:srgbClr val="009036"/>
@@ -17438,69 +19351,10 @@
           </a:p>
         </p:txBody>
       </p:sp>
-      <p:pic>
-        <p:nvPicPr>
-          <p:cNvPr id="6" name="Afbeelding 5"/>
-          <p:cNvPicPr>
-            <a:picLocks noChangeAspect="1"/>
-          </p:cNvPicPr>
-          <p:nvPr/>
-        </p:nvPicPr>
-        <p:blipFill rotWithShape="1">
-          <a:blip r:embed="rId3">
-            <a:extLst>
-              <a:ext uri="{28A0092B-C50C-407E-A947-70E740481C1C}">
-                <a14:useLocalDpi xmlns:a14="http://schemas.microsoft.com/office/drawing/2010/main" val="0"/>
-              </a:ext>
-            </a:extLst>
-          </a:blip>
-          <a:srcRect b="18685"/>
-          <a:stretch/>
-        </p:blipFill>
-        <p:spPr>
-          <a:xfrm>
-            <a:off x="826265" y="3125997"/>
-            <a:ext cx="5328396" cy="2438031"/>
-          </a:xfrm>
-          <a:prstGeom prst="rect">
-            <a:avLst/>
-          </a:prstGeom>
-        </p:spPr>
-      </p:pic>
-      <p:pic>
-        <p:nvPicPr>
-          <p:cNvPr id="7" name="Afbeelding 6"/>
-          <p:cNvPicPr>
-            <a:picLocks noChangeAspect="1"/>
-          </p:cNvPicPr>
-          <p:nvPr/>
-        </p:nvPicPr>
-        <p:blipFill>
-          <a:blip r:embed="rId4">
-            <a:extLst>
-              <a:ext uri="{28A0092B-C50C-407E-A947-70E740481C1C}">
-                <a14:useLocalDpi xmlns:a14="http://schemas.microsoft.com/office/drawing/2010/main" val="0"/>
-              </a:ext>
-            </a:extLst>
-          </a:blip>
-          <a:stretch>
-            <a:fillRect/>
-          </a:stretch>
-        </p:blipFill>
-        <p:spPr>
-          <a:xfrm>
-            <a:off x="4699120" y="2072646"/>
-            <a:ext cx="3057267" cy="594635"/>
-          </a:xfrm>
-          <a:prstGeom prst="rect">
-            <a:avLst/>
-          </a:prstGeom>
-        </p:spPr>
-      </p:pic>
     </p:spTree>
     <p:extLst>
       <p:ext uri="{BB962C8B-B14F-4D97-AF65-F5344CB8AC3E}">
-        <p14:creationId xmlns:p14="http://schemas.microsoft.com/office/powerpoint/2010/main" val="1535190211"/>
+        <p14:creationId xmlns:p14="http://schemas.microsoft.com/office/powerpoint/2010/main" val="1207939636"/>
       </p:ext>
     </p:extLst>
   </p:cSld>
@@ -18408,21 +20262,6 @@
 </file>
 
 <file path=customXml/item1.xml><?xml version="1.0" encoding="utf-8"?>
-<p:properties xmlns:p="http://schemas.microsoft.com/office/2006/metadata/properties" xmlns:xsi="http://www.w3.org/2001/XMLSchema-instance" xmlns:pc="http://schemas.microsoft.com/office/infopath/2007/PartnerControls">
-  <documentManagement/>
-</p:properties>
-</file>
-
-<file path=customXml/item2.xml><?xml version="1.0" encoding="utf-8"?>
-<?mso-contentType ?>
-<FormTemplates xmlns="http://schemas.microsoft.com/sharepoint/v3/contenttype/forms">
-  <Display>DocumentLibraryForm</Display>
-  <Edit>DocumentLibraryForm</Edit>
-  <New>DocumentLibraryForm</New>
-</FormTemplates>
-</file>
-
-<file path=customXml/item3.xml><?xml version="1.0" encoding="utf-8"?>
 <ct:contentTypeSchema xmlns:ct="http://schemas.microsoft.com/office/2006/metadata/contentType" xmlns:ma="http://schemas.microsoft.com/office/2006/metadata/properties/metaAttributes" ct:_="" ma:_="" ma:contentTypeName="Document" ma:contentTypeID="0x0101009843F10021B1B74BA5DD583B6999787F" ma:contentTypeVersion="1" ma:contentTypeDescription="Een nieuw document maken." ma:contentTypeScope="" ma:versionID="9f7dad7ca3b37095ed9229a6a072267d">
   <xsd:schema xmlns:xsd="http://www.w3.org/2001/XMLSchema" xmlns:xs="http://www.w3.org/2001/XMLSchema" xmlns:p="http://schemas.microsoft.com/office/2006/metadata/properties" targetNamespace="http://schemas.microsoft.com/office/2006/metadata/properties" ma:root="true" ma:fieldsID="a17e5968c79d9fe2fc9f8835eee23f58">
     <xsd:element name="properties">
@@ -18536,17 +20375,33 @@
 </ct:contentTypeSchema>
 </file>
 
+<file path=customXml/item2.xml><?xml version="1.0" encoding="utf-8"?>
+<?mso-contentType ?>
+<FormTemplates xmlns="http://schemas.microsoft.com/sharepoint/v3/contenttype/forms">
+  <Display>DocumentLibraryForm</Display>
+  <Edit>DocumentLibraryForm</Edit>
+  <New>DocumentLibraryForm</New>
+</FormTemplates>
+</file>
+
+<file path=customXml/item3.xml><?xml version="1.0" encoding="utf-8"?>
+<p:properties xmlns:p="http://schemas.microsoft.com/office/2006/metadata/properties" xmlns:xsi="http://www.w3.org/2001/XMLSchema-instance" xmlns:pc="http://schemas.microsoft.com/office/infopath/2007/PartnerControls">
+  <documentManagement/>
+</p:properties>
+</file>
+
 <file path=customXml/itemProps1.xml><?xml version="1.0" encoding="utf-8"?>
-<ds:datastoreItem xmlns:ds="http://schemas.openxmlformats.org/officeDocument/2006/customXml" ds:itemID="{DE0A3E1F-B2EC-4B36-9F71-3169FFDE4AE0}">
+<ds:datastoreItem xmlns:ds="http://schemas.openxmlformats.org/officeDocument/2006/customXml" ds:itemID="{3175F035-B069-4F0E-ADC8-454931FDE34D}">
   <ds:schemaRefs>
+    <ds:schemaRef ds:uri="http://schemas.microsoft.com/office/2006/metadata/contentType"/>
+    <ds:schemaRef ds:uri="http://schemas.microsoft.com/office/2006/metadata/properties/metaAttributes"/>
+    <ds:schemaRef ds:uri="http://www.w3.org/2001/XMLSchema"/>
+    <ds:schemaRef ds:uri="http://schemas.microsoft.com/office/2006/metadata/properties"/>
+    <ds:schemaRef ds:uri="http://schemas.openxmlformats.org/package/2006/metadata/core-properties"/>
     <ds:schemaRef ds:uri="http://purl.org/dc/elements/1.1/"/>
-    <ds:schemaRef ds:uri="http://schemas.microsoft.com/office/2006/metadata/properties"/>
-    <ds:schemaRef ds:uri="http://schemas.microsoft.com/office/2006/documentManagement/types"/>
     <ds:schemaRef ds:uri="http://purl.org/dc/terms/"/>
-    <ds:schemaRef ds:uri="http://schemas.openxmlformats.org/package/2006/metadata/core-properties"/>
-    <ds:schemaRef ds:uri="http://purl.org/dc/dcmitype/"/>
+    <ds:schemaRef ds:uri="http://schemas.microsoft.com/internal/obd"/>
     <ds:schemaRef ds:uri="http://schemas.microsoft.com/office/infopath/2007/PartnerControls"/>
-    <ds:schemaRef ds:uri="http://www.w3.org/XML/1998/namespace"/>
   </ds:schemaRefs>
 </ds:datastoreItem>
 </file>
@@ -18560,17 +20415,16 @@
 </file>
 
 <file path=customXml/itemProps3.xml><?xml version="1.0" encoding="utf-8"?>
-<ds:datastoreItem xmlns:ds="http://schemas.openxmlformats.org/officeDocument/2006/customXml" ds:itemID="{3175F035-B069-4F0E-ADC8-454931FDE34D}">
+<ds:datastoreItem xmlns:ds="http://schemas.openxmlformats.org/officeDocument/2006/customXml" ds:itemID="{DE0A3E1F-B2EC-4B36-9F71-3169FFDE4AE0}">
   <ds:schemaRefs>
-    <ds:schemaRef ds:uri="http://schemas.microsoft.com/office/2006/metadata/contentType"/>
-    <ds:schemaRef ds:uri="http://schemas.microsoft.com/office/2006/metadata/properties/metaAttributes"/>
-    <ds:schemaRef ds:uri="http://www.w3.org/2001/XMLSchema"/>
+    <ds:schemaRef ds:uri="http://purl.org/dc/elements/1.1/"/>
     <ds:schemaRef ds:uri="http://schemas.microsoft.com/office/2006/metadata/properties"/>
+    <ds:schemaRef ds:uri="http://schemas.microsoft.com/office/2006/documentManagement/types"/>
+    <ds:schemaRef ds:uri="http://purl.org/dc/terms/"/>
     <ds:schemaRef ds:uri="http://schemas.openxmlformats.org/package/2006/metadata/core-properties"/>
-    <ds:schemaRef ds:uri="http://purl.org/dc/elements/1.1/"/>
-    <ds:schemaRef ds:uri="http://purl.org/dc/terms/"/>
-    <ds:schemaRef ds:uri="http://schemas.microsoft.com/internal/obd"/>
+    <ds:schemaRef ds:uri="http://purl.org/dc/dcmitype/"/>
     <ds:schemaRef ds:uri="http://schemas.microsoft.com/office/infopath/2007/PartnerControls"/>
+    <ds:schemaRef ds:uri="http://www.w3.org/XML/1998/namespace"/>
   </ds:schemaRefs>
 </ds:datastoreItem>
 </file>
</xml_diff>